<commit_message>
Updated presentation Added tons of images and results Updates main algorithm Added BB extraction function
</commit_message>
<xml_diff>
--- a/updated_presentation.pptx
+++ b/updated_presentation.pptx
@@ -5,7 +5,7 @@
     <p:sldMasterId id="2147483874" r:id="rId1"/>
   </p:sldMasterIdLst>
   <p:notesMasterIdLst>
-    <p:notesMasterId r:id="rId13"/>
+    <p:notesMasterId r:id="rId15"/>
   </p:notesMasterIdLst>
   <p:sldIdLst>
     <p:sldId id="256" r:id="rId2"/>
@@ -16,9 +16,11 @@
     <p:sldId id="261" r:id="rId7"/>
     <p:sldId id="313" r:id="rId8"/>
     <p:sldId id="264" r:id="rId9"/>
-    <p:sldId id="265" r:id="rId10"/>
-    <p:sldId id="269" r:id="rId11"/>
-    <p:sldId id="268" r:id="rId12"/>
+    <p:sldId id="314" r:id="rId10"/>
+    <p:sldId id="265" r:id="rId11"/>
+    <p:sldId id="315" r:id="rId12"/>
+    <p:sldId id="269" r:id="rId13"/>
+    <p:sldId id="268" r:id="rId14"/>
   </p:sldIdLst>
   <p:sldSz cx="12192000" cy="6858000"/>
   <p:notesSz cx="6858000" cy="9144000"/>
@@ -135,139 +137,6 @@
 
 <file path=ppt/changesInfos/changesInfo1.xml><?xml version="1.0" encoding="utf-8"?>
 <pc:chgInfo xmlns:a="http://schemas.openxmlformats.org/drawingml/2006/main" xmlns:r="http://schemas.openxmlformats.org/officeDocument/2006/relationships" xmlns:ac="http://schemas.microsoft.com/office/drawing/2013/main/command" xmlns:pc="http://schemas.microsoft.com/office/powerpoint/2013/main/command">
-  <pc:docChgLst>
-    <pc:chgData name="Neta Becker" userId="cef0aa30-4247-4db8-9bc0-d63efc0d3a53" providerId="ADAL" clId="{F41227B9-745C-4395-9C71-3772E855083B}"/>
-    <pc:docChg chg="undo redo custSel addSld delSld modSld sldOrd">
-      <pc:chgData name="Neta Becker" userId="cef0aa30-4247-4db8-9bc0-d63efc0d3a53" providerId="ADAL" clId="{F41227B9-745C-4395-9C71-3772E855083B}" dt="2024-04-20T09:22:38.819" v="403" actId="20577"/>
-      <pc:docMkLst>
-        <pc:docMk/>
-      </pc:docMkLst>
-      <pc:sldChg chg="modSp mod">
-        <pc:chgData name="Neta Becker" userId="cef0aa30-4247-4db8-9bc0-d63efc0d3a53" providerId="ADAL" clId="{F41227B9-745C-4395-9C71-3772E855083B}" dt="2024-04-20T09:05:12.200" v="33" actId="404"/>
-        <pc:sldMkLst>
-          <pc:docMk/>
-          <pc:sldMk cId="2179648205" sldId="256"/>
-        </pc:sldMkLst>
-        <pc:spChg chg="mod">
-          <ac:chgData name="Neta Becker" userId="cef0aa30-4247-4db8-9bc0-d63efc0d3a53" providerId="ADAL" clId="{F41227B9-745C-4395-9C71-3772E855083B}" dt="2024-04-20T09:05:12.200" v="33" actId="404"/>
-          <ac:spMkLst>
-            <pc:docMk/>
-            <pc:sldMk cId="2179648205" sldId="256"/>
-            <ac:spMk id="2" creationId="{672AD88C-22F7-6099-31A3-259788130B42}"/>
-          </ac:spMkLst>
-        </pc:spChg>
-        <pc:spChg chg="mod">
-          <ac:chgData name="Neta Becker" userId="cef0aa30-4247-4db8-9bc0-d63efc0d3a53" providerId="ADAL" clId="{F41227B9-745C-4395-9C71-3772E855083B}" dt="2024-04-20T09:04:59.482" v="22" actId="20577"/>
-          <ac:spMkLst>
-            <pc:docMk/>
-            <pc:sldMk cId="2179648205" sldId="256"/>
-            <ac:spMk id="3" creationId="{0D89FC02-A4AB-8F19-7B48-608FCF3D55D3}"/>
-          </ac:spMkLst>
-        </pc:spChg>
-        <pc:spChg chg="mod">
-          <ac:chgData name="Neta Becker" userId="cef0aa30-4247-4db8-9bc0-d63efc0d3a53" providerId="ADAL" clId="{F41227B9-745C-4395-9C71-3772E855083B}" dt="2024-04-20T09:04:53.365" v="17" actId="21"/>
-          <ac:spMkLst>
-            <pc:docMk/>
-            <pc:sldMk cId="2179648205" sldId="256"/>
-            <ac:spMk id="4" creationId="{CE588B98-B49F-CE19-44E8-F1BAB7128CA6}"/>
-          </ac:spMkLst>
-        </pc:spChg>
-      </pc:sldChg>
-      <pc:sldChg chg="addSp delSp modSp new mod setBg">
-        <pc:chgData name="Neta Becker" userId="cef0aa30-4247-4db8-9bc0-d63efc0d3a53" providerId="ADAL" clId="{F41227B9-745C-4395-9C71-3772E855083B}" dt="2024-04-20T09:16:24.400" v="303" actId="20577"/>
-        <pc:sldMkLst>
-          <pc:docMk/>
-          <pc:sldMk cId="1769220115" sldId="257"/>
-        </pc:sldMkLst>
-        <pc:spChg chg="mod">
-          <ac:chgData name="Neta Becker" userId="cef0aa30-4247-4db8-9bc0-d63efc0d3a53" providerId="ADAL" clId="{F41227B9-745C-4395-9C71-3772E855083B}" dt="2024-04-20T09:14:00.551" v="259" actId="26606"/>
-          <ac:spMkLst>
-            <pc:docMk/>
-            <pc:sldMk cId="1769220115" sldId="257"/>
-            <ac:spMk id="2" creationId="{BBABCC05-9708-FD2A-9DD0-01CF0D3836F2}"/>
-          </ac:spMkLst>
-        </pc:spChg>
-        <pc:spChg chg="mod">
-          <ac:chgData name="Neta Becker" userId="cef0aa30-4247-4db8-9bc0-d63efc0d3a53" providerId="ADAL" clId="{F41227B9-745C-4395-9C71-3772E855083B}" dt="2024-04-20T09:16:24.400" v="303" actId="20577"/>
-          <ac:spMkLst>
-            <pc:docMk/>
-            <pc:sldMk cId="1769220115" sldId="257"/>
-            <ac:spMk id="3" creationId="{138B8362-48C3-13F0-617A-B8A3256120CA}"/>
-          </ac:spMkLst>
-        </pc:spChg>
-        <pc:spChg chg="add del mod">
-          <ac:chgData name="Neta Becker" userId="cef0aa30-4247-4db8-9bc0-d63efc0d3a53" providerId="ADAL" clId="{F41227B9-745C-4395-9C71-3772E855083B}" dt="2024-04-20T09:15:34.913" v="291" actId="478"/>
-          <ac:spMkLst>
-            <pc:docMk/>
-            <pc:sldMk cId="1769220115" sldId="257"/>
-            <ac:spMk id="4" creationId="{492A418C-EDA6-5C14-CA1B-8B1153793768}"/>
-          </ac:spMkLst>
-        </pc:spChg>
-        <pc:spChg chg="add del mod">
-          <ac:chgData name="Neta Becker" userId="cef0aa30-4247-4db8-9bc0-d63efc0d3a53" providerId="ADAL" clId="{F41227B9-745C-4395-9C71-3772E855083B}" dt="2024-04-20T09:15:35.867" v="292" actId="478"/>
-          <ac:spMkLst>
-            <pc:docMk/>
-            <pc:sldMk cId="1769220115" sldId="257"/>
-            <ac:spMk id="5" creationId="{F52AD1AC-C919-DD06-5AB8-EFA7921D4E7A}"/>
-          </ac:spMkLst>
-        </pc:spChg>
-        <pc:picChg chg="add mod modCrop">
-          <ac:chgData name="Neta Becker" userId="cef0aa30-4247-4db8-9bc0-d63efc0d3a53" providerId="ADAL" clId="{F41227B9-745C-4395-9C71-3772E855083B}" dt="2024-04-20T09:16:08.710" v="302" actId="1076"/>
-          <ac:picMkLst>
-            <pc:docMk/>
-            <pc:sldMk cId="1769220115" sldId="257"/>
-            <ac:picMk id="7" creationId="{5D2567AD-A929-17F9-A858-A92AA2CDC031}"/>
-          </ac:picMkLst>
-        </pc:picChg>
-        <pc:picChg chg="add mod">
-          <ac:chgData name="Neta Becker" userId="cef0aa30-4247-4db8-9bc0-d63efc0d3a53" providerId="ADAL" clId="{F41227B9-745C-4395-9C71-3772E855083B}" dt="2024-04-20T09:13:19.810" v="247" actId="14100"/>
-          <ac:picMkLst>
-            <pc:docMk/>
-            <pc:sldMk cId="1769220115" sldId="257"/>
-            <ac:picMk id="1026" creationId="{4AC9365A-FC03-7DAC-AC59-C7F37271B2CA}"/>
-          </ac:picMkLst>
-        </pc:picChg>
-        <pc:picChg chg="add del mod">
-          <ac:chgData name="Neta Becker" userId="cef0aa30-4247-4db8-9bc0-d63efc0d3a53" providerId="ADAL" clId="{F41227B9-745C-4395-9C71-3772E855083B}" dt="2024-04-20T09:15:32.552" v="290" actId="478"/>
-          <ac:picMkLst>
-            <pc:docMk/>
-            <pc:sldMk cId="1769220115" sldId="257"/>
-            <ac:picMk id="1028" creationId="{73822209-7A05-7768-AD1F-91B7C0E469B0}"/>
-          </ac:picMkLst>
-        </pc:picChg>
-      </pc:sldChg>
-      <pc:sldChg chg="modSp new mod ord">
-        <pc:chgData name="Neta Becker" userId="cef0aa30-4247-4db8-9bc0-d63efc0d3a53" providerId="ADAL" clId="{F41227B9-745C-4395-9C71-3772E855083B}" dt="2024-04-20T09:22:38.819" v="403" actId="20577"/>
-        <pc:sldMkLst>
-          <pc:docMk/>
-          <pc:sldMk cId="4065677750" sldId="258"/>
-        </pc:sldMkLst>
-        <pc:spChg chg="mod">
-          <ac:chgData name="Neta Becker" userId="cef0aa30-4247-4db8-9bc0-d63efc0d3a53" providerId="ADAL" clId="{F41227B9-745C-4395-9C71-3772E855083B}" dt="2024-04-20T09:07:01.867" v="68" actId="20577"/>
-          <ac:spMkLst>
-            <pc:docMk/>
-            <pc:sldMk cId="4065677750" sldId="258"/>
-            <ac:spMk id="2" creationId="{7698AAED-D1FD-B89F-2DA0-BBC929912FFA}"/>
-          </ac:spMkLst>
-        </pc:spChg>
-        <pc:spChg chg="mod">
-          <ac:chgData name="Neta Becker" userId="cef0aa30-4247-4db8-9bc0-d63efc0d3a53" providerId="ADAL" clId="{F41227B9-745C-4395-9C71-3772E855083B}" dt="2024-04-20T09:22:38.819" v="403" actId="20577"/>
-          <ac:spMkLst>
-            <pc:docMk/>
-            <pc:sldMk cId="4065677750" sldId="258"/>
-            <ac:spMk id="3" creationId="{12642EC7-8503-E8AB-52BC-06C912BABE9F}"/>
-          </ac:spMkLst>
-        </pc:spChg>
-      </pc:sldChg>
-      <pc:sldChg chg="new del">
-        <pc:chgData name="Neta Becker" userId="cef0aa30-4247-4db8-9bc0-d63efc0d3a53" providerId="ADAL" clId="{F41227B9-745C-4395-9C71-3772E855083B}" dt="2024-04-20T09:05:25.744" v="35" actId="47"/>
-        <pc:sldMkLst>
-          <pc:docMk/>
-          <pc:sldMk cId="4140540780" sldId="258"/>
-        </pc:sldMkLst>
-      </pc:sldChg>
-    </pc:docChg>
-  </pc:docChgLst>
   <pc:docChgLst>
     <pc:chgData name="Neta Becker" userId="cef0aa30-4247-4db8-9bc0-d63efc0d3a53" providerId="ADAL" clId="{08E06E4B-2E16-4BC0-80E9-E5B23CDC5CD9}"/>
     <pc:docChg chg="undo redo custSel modSld">
@@ -1087,6 +956,294 @@
             <ac:spMk id="321" creationId="{00000000-0000-0000-0000-000000000000}"/>
           </ac:spMkLst>
         </pc:spChg>
+      </pc:sldChg>
+    </pc:docChg>
+  </pc:docChgLst>
+  <pc:docChgLst>
+    <pc:chgData name="Neta Becker" userId="cef0aa30-4247-4db8-9bc0-d63efc0d3a53" providerId="ADAL" clId="{8E39725F-6EEF-4D4D-92C3-0465B79E9629}"/>
+    <pc:docChg chg="undo custSel addSld delSld modSld">
+      <pc:chgData name="Neta Becker" userId="cef0aa30-4247-4db8-9bc0-d63efc0d3a53" providerId="ADAL" clId="{8E39725F-6EEF-4D4D-92C3-0465B79E9629}" dt="2024-05-09T15:58:07.762" v="23" actId="1076"/>
+      <pc:docMkLst>
+        <pc:docMk/>
+      </pc:docMkLst>
+      <pc:sldChg chg="modSp mod">
+        <pc:chgData name="Neta Becker" userId="cef0aa30-4247-4db8-9bc0-d63efc0d3a53" providerId="ADAL" clId="{8E39725F-6EEF-4D4D-92C3-0465B79E9629}" dt="2024-05-09T15:58:07.762" v="23" actId="1076"/>
+        <pc:sldMkLst>
+          <pc:docMk/>
+          <pc:sldMk cId="461867753" sldId="261"/>
+        </pc:sldMkLst>
+        <pc:spChg chg="mod">
+          <ac:chgData name="Neta Becker" userId="cef0aa30-4247-4db8-9bc0-d63efc0d3a53" providerId="ADAL" clId="{8E39725F-6EEF-4D4D-92C3-0465B79E9629}" dt="2024-05-09T15:58:02.847" v="22" actId="14100"/>
+          <ac:spMkLst>
+            <pc:docMk/>
+            <pc:sldMk cId="461867753" sldId="261"/>
+            <ac:spMk id="2" creationId="{27F2BC14-3B96-5B86-2DD7-96DF3F92CEED}"/>
+          </ac:spMkLst>
+        </pc:spChg>
+        <pc:spChg chg="mod">
+          <ac:chgData name="Neta Becker" userId="cef0aa30-4247-4db8-9bc0-d63efc0d3a53" providerId="ADAL" clId="{8E39725F-6EEF-4D4D-92C3-0465B79E9629}" dt="2024-05-09T15:58:07.762" v="23" actId="1076"/>
+          <ac:spMkLst>
+            <pc:docMk/>
+            <pc:sldMk cId="461867753" sldId="261"/>
+            <ac:spMk id="10" creationId="{CA9F315B-54D4-E999-844C-5423FDC7670E}"/>
+          </ac:spMkLst>
+        </pc:spChg>
+      </pc:sldChg>
+      <pc:sldChg chg="del">
+        <pc:chgData name="Neta Becker" userId="cef0aa30-4247-4db8-9bc0-d63efc0d3a53" providerId="ADAL" clId="{8E39725F-6EEF-4D4D-92C3-0465B79E9629}" dt="2024-05-09T15:55:46.114" v="2" actId="47"/>
+        <pc:sldMkLst>
+          <pc:docMk/>
+          <pc:sldMk cId="3063377580" sldId="262"/>
+        </pc:sldMkLst>
+      </pc:sldChg>
+      <pc:sldChg chg="modSp add del mod">
+        <pc:chgData name="Neta Becker" userId="cef0aa30-4247-4db8-9bc0-d63efc0d3a53" providerId="ADAL" clId="{8E39725F-6EEF-4D4D-92C3-0465B79E9629}" dt="2024-05-09T15:57:42.896" v="17" actId="2696"/>
+        <pc:sldMkLst>
+          <pc:docMk/>
+          <pc:sldMk cId="1521044007" sldId="264"/>
+        </pc:sldMkLst>
+        <pc:spChg chg="mod">
+          <ac:chgData name="Neta Becker" userId="cef0aa30-4247-4db8-9bc0-d63efc0d3a53" providerId="ADAL" clId="{8E39725F-6EEF-4D4D-92C3-0465B79E9629}" dt="2024-05-09T15:56:09.475" v="10" actId="5793"/>
+          <ac:spMkLst>
+            <pc:docMk/>
+            <pc:sldMk cId="1521044007" sldId="264"/>
+            <ac:spMk id="3" creationId="{2D2E6A14-D956-DE39-DFB5-8D352E675082}"/>
+          </ac:spMkLst>
+        </pc:spChg>
+      </pc:sldChg>
+      <pc:sldChg chg="add">
+        <pc:chgData name="Neta Becker" userId="cef0aa30-4247-4db8-9bc0-d63efc0d3a53" providerId="ADAL" clId="{8E39725F-6EEF-4D4D-92C3-0465B79E9629}" dt="2024-05-09T15:57:45.107" v="18"/>
+        <pc:sldMkLst>
+          <pc:docMk/>
+          <pc:sldMk cId="3634263486" sldId="264"/>
+        </pc:sldMkLst>
+      </pc:sldChg>
+      <pc:sldChg chg="modSp mod">
+        <pc:chgData name="Neta Becker" userId="cef0aa30-4247-4db8-9bc0-d63efc0d3a53" providerId="ADAL" clId="{8E39725F-6EEF-4D4D-92C3-0465B79E9629}" dt="2024-05-09T15:57:22.424" v="16" actId="20577"/>
+        <pc:sldMkLst>
+          <pc:docMk/>
+          <pc:sldMk cId="660352062" sldId="312"/>
+        </pc:sldMkLst>
+        <pc:spChg chg="mod">
+          <ac:chgData name="Neta Becker" userId="cef0aa30-4247-4db8-9bc0-d63efc0d3a53" providerId="ADAL" clId="{8E39725F-6EEF-4D4D-92C3-0465B79E9629}" dt="2024-05-09T15:57:16.641" v="11" actId="20577"/>
+          <ac:spMkLst>
+            <pc:docMk/>
+            <pc:sldMk cId="660352062" sldId="312"/>
+            <ac:spMk id="310" creationId="{00000000-0000-0000-0000-000000000000}"/>
+          </ac:spMkLst>
+        </pc:spChg>
+        <pc:spChg chg="mod">
+          <ac:chgData name="Neta Becker" userId="cef0aa30-4247-4db8-9bc0-d63efc0d3a53" providerId="ADAL" clId="{8E39725F-6EEF-4D4D-92C3-0465B79E9629}" dt="2024-05-09T15:57:18.738" v="13" actId="20577"/>
+          <ac:spMkLst>
+            <pc:docMk/>
+            <pc:sldMk cId="660352062" sldId="312"/>
+            <ac:spMk id="313" creationId="{00000000-0000-0000-0000-000000000000}"/>
+          </ac:spMkLst>
+        </pc:spChg>
+        <pc:spChg chg="mod">
+          <ac:chgData name="Neta Becker" userId="cef0aa30-4247-4db8-9bc0-d63efc0d3a53" providerId="ADAL" clId="{8E39725F-6EEF-4D4D-92C3-0465B79E9629}" dt="2024-05-09T15:57:20.810" v="15" actId="20577"/>
+          <ac:spMkLst>
+            <pc:docMk/>
+            <pc:sldMk cId="660352062" sldId="312"/>
+            <ac:spMk id="316" creationId="{00000000-0000-0000-0000-000000000000}"/>
+          </ac:spMkLst>
+        </pc:spChg>
+        <pc:spChg chg="mod">
+          <ac:chgData name="Neta Becker" userId="cef0aa30-4247-4db8-9bc0-d63efc0d3a53" providerId="ADAL" clId="{8E39725F-6EEF-4D4D-92C3-0465B79E9629}" dt="2024-05-09T15:57:22.424" v="16" actId="20577"/>
+          <ac:spMkLst>
+            <pc:docMk/>
+            <pc:sldMk cId="660352062" sldId="312"/>
+            <ac:spMk id="319" creationId="{00000000-0000-0000-0000-000000000000}"/>
+          </ac:spMkLst>
+        </pc:spChg>
+      </pc:sldChg>
+      <pc:sldChg chg="addSp modSp add mod setBg">
+        <pc:chgData name="Neta Becker" userId="cef0aa30-4247-4db8-9bc0-d63efc0d3a53" providerId="ADAL" clId="{8E39725F-6EEF-4D4D-92C3-0465B79E9629}" dt="2024-05-09T15:57:55.008" v="21" actId="20577"/>
+        <pc:sldMkLst>
+          <pc:docMk/>
+          <pc:sldMk cId="473798661" sldId="313"/>
+        </pc:sldMkLst>
+        <pc:spChg chg="mod">
+          <ac:chgData name="Neta Becker" userId="cef0aa30-4247-4db8-9bc0-d63efc0d3a53" providerId="ADAL" clId="{8E39725F-6EEF-4D4D-92C3-0465B79E9629}" dt="2024-05-09T15:57:55.008" v="21" actId="20577"/>
+          <ac:spMkLst>
+            <pc:docMk/>
+            <pc:sldMk cId="473798661" sldId="313"/>
+            <ac:spMk id="3" creationId="{79639998-542D-EA12-DA1F-335575519817}"/>
+          </ac:spMkLst>
+        </pc:spChg>
+        <pc:spChg chg="add mod">
+          <ac:chgData name="Neta Becker" userId="cef0aa30-4247-4db8-9bc0-d63efc0d3a53" providerId="ADAL" clId="{8E39725F-6EEF-4D4D-92C3-0465B79E9629}" dt="2024-05-09T15:55:44.367" v="1"/>
+          <ac:spMkLst>
+            <pc:docMk/>
+            <pc:sldMk cId="473798661" sldId="313"/>
+            <ac:spMk id="4" creationId="{85F07728-A4E2-D9D2-91C4-70250A23B88A}"/>
+          </ac:spMkLst>
+        </pc:spChg>
+        <pc:spChg chg="mod">
+          <ac:chgData name="Neta Becker" userId="cef0aa30-4247-4db8-9bc0-d63efc0d3a53" providerId="ADAL" clId="{8E39725F-6EEF-4D4D-92C3-0465B79E9629}" dt="2024-05-09T15:55:44.367" v="1"/>
+          <ac:spMkLst>
+            <pc:docMk/>
+            <pc:sldMk cId="473798661" sldId="313"/>
+            <ac:spMk id="6" creationId="{01C795E8-3F02-1807-50F5-AAA8595D7AE4}"/>
+          </ac:spMkLst>
+        </pc:spChg>
+        <pc:spChg chg="mod">
+          <ac:chgData name="Neta Becker" userId="cef0aa30-4247-4db8-9bc0-d63efc0d3a53" providerId="ADAL" clId="{8E39725F-6EEF-4D4D-92C3-0465B79E9629}" dt="2024-05-09T15:55:44.367" v="1"/>
+          <ac:spMkLst>
+            <pc:docMk/>
+            <pc:sldMk cId="473798661" sldId="313"/>
+            <ac:spMk id="7" creationId="{2EEE2E42-1535-F3D4-88A6-600540A1C48F}"/>
+          </ac:spMkLst>
+        </pc:spChg>
+        <pc:spChg chg="mod">
+          <ac:chgData name="Neta Becker" userId="cef0aa30-4247-4db8-9bc0-d63efc0d3a53" providerId="ADAL" clId="{8E39725F-6EEF-4D4D-92C3-0465B79E9629}" dt="2024-05-09T15:55:44.367" v="1"/>
+          <ac:spMkLst>
+            <pc:docMk/>
+            <pc:sldMk cId="473798661" sldId="313"/>
+            <ac:spMk id="8" creationId="{85994452-E285-51CF-641A-CAA40F791930}"/>
+          </ac:spMkLst>
+        </pc:spChg>
+        <pc:grpChg chg="add mod">
+          <ac:chgData name="Neta Becker" userId="cef0aa30-4247-4db8-9bc0-d63efc0d3a53" providerId="ADAL" clId="{8E39725F-6EEF-4D4D-92C3-0465B79E9629}" dt="2024-05-09T15:55:44.367" v="1"/>
+          <ac:grpSpMkLst>
+            <pc:docMk/>
+            <pc:sldMk cId="473798661" sldId="313"/>
+            <ac:grpSpMk id="5" creationId="{0ED5CF67-36AF-6C59-114F-67E958E1AA67}"/>
+          </ac:grpSpMkLst>
+        </pc:grpChg>
+      </pc:sldChg>
+    </pc:docChg>
+  </pc:docChgLst>
+  <pc:docChgLst>
+    <pc:chgData name="Neta Becker" userId="cef0aa30-4247-4db8-9bc0-d63efc0d3a53" providerId="ADAL" clId="{F41227B9-745C-4395-9C71-3772E855083B}"/>
+    <pc:docChg chg="undo redo custSel addSld delSld modSld sldOrd">
+      <pc:chgData name="Neta Becker" userId="cef0aa30-4247-4db8-9bc0-d63efc0d3a53" providerId="ADAL" clId="{F41227B9-745C-4395-9C71-3772E855083B}" dt="2024-04-20T09:22:38.819" v="403" actId="20577"/>
+      <pc:docMkLst>
+        <pc:docMk/>
+      </pc:docMkLst>
+      <pc:sldChg chg="modSp mod">
+        <pc:chgData name="Neta Becker" userId="cef0aa30-4247-4db8-9bc0-d63efc0d3a53" providerId="ADAL" clId="{F41227B9-745C-4395-9C71-3772E855083B}" dt="2024-04-20T09:05:12.200" v="33" actId="404"/>
+        <pc:sldMkLst>
+          <pc:docMk/>
+          <pc:sldMk cId="2179648205" sldId="256"/>
+        </pc:sldMkLst>
+        <pc:spChg chg="mod">
+          <ac:chgData name="Neta Becker" userId="cef0aa30-4247-4db8-9bc0-d63efc0d3a53" providerId="ADAL" clId="{F41227B9-745C-4395-9C71-3772E855083B}" dt="2024-04-20T09:05:12.200" v="33" actId="404"/>
+          <ac:spMkLst>
+            <pc:docMk/>
+            <pc:sldMk cId="2179648205" sldId="256"/>
+            <ac:spMk id="2" creationId="{672AD88C-22F7-6099-31A3-259788130B42}"/>
+          </ac:spMkLst>
+        </pc:spChg>
+        <pc:spChg chg="mod">
+          <ac:chgData name="Neta Becker" userId="cef0aa30-4247-4db8-9bc0-d63efc0d3a53" providerId="ADAL" clId="{F41227B9-745C-4395-9C71-3772E855083B}" dt="2024-04-20T09:04:59.482" v="22" actId="20577"/>
+          <ac:spMkLst>
+            <pc:docMk/>
+            <pc:sldMk cId="2179648205" sldId="256"/>
+            <ac:spMk id="3" creationId="{0D89FC02-A4AB-8F19-7B48-608FCF3D55D3}"/>
+          </ac:spMkLst>
+        </pc:spChg>
+        <pc:spChg chg="mod">
+          <ac:chgData name="Neta Becker" userId="cef0aa30-4247-4db8-9bc0-d63efc0d3a53" providerId="ADAL" clId="{F41227B9-745C-4395-9C71-3772E855083B}" dt="2024-04-20T09:04:53.365" v="17" actId="21"/>
+          <ac:spMkLst>
+            <pc:docMk/>
+            <pc:sldMk cId="2179648205" sldId="256"/>
+            <ac:spMk id="4" creationId="{CE588B98-B49F-CE19-44E8-F1BAB7128CA6}"/>
+          </ac:spMkLst>
+        </pc:spChg>
+      </pc:sldChg>
+      <pc:sldChg chg="addSp delSp modSp new mod setBg">
+        <pc:chgData name="Neta Becker" userId="cef0aa30-4247-4db8-9bc0-d63efc0d3a53" providerId="ADAL" clId="{F41227B9-745C-4395-9C71-3772E855083B}" dt="2024-04-20T09:16:24.400" v="303" actId="20577"/>
+        <pc:sldMkLst>
+          <pc:docMk/>
+          <pc:sldMk cId="1769220115" sldId="257"/>
+        </pc:sldMkLst>
+        <pc:spChg chg="mod">
+          <ac:chgData name="Neta Becker" userId="cef0aa30-4247-4db8-9bc0-d63efc0d3a53" providerId="ADAL" clId="{F41227B9-745C-4395-9C71-3772E855083B}" dt="2024-04-20T09:14:00.551" v="259" actId="26606"/>
+          <ac:spMkLst>
+            <pc:docMk/>
+            <pc:sldMk cId="1769220115" sldId="257"/>
+            <ac:spMk id="2" creationId="{BBABCC05-9708-FD2A-9DD0-01CF0D3836F2}"/>
+          </ac:spMkLst>
+        </pc:spChg>
+        <pc:spChg chg="mod">
+          <ac:chgData name="Neta Becker" userId="cef0aa30-4247-4db8-9bc0-d63efc0d3a53" providerId="ADAL" clId="{F41227B9-745C-4395-9C71-3772E855083B}" dt="2024-04-20T09:16:24.400" v="303" actId="20577"/>
+          <ac:spMkLst>
+            <pc:docMk/>
+            <pc:sldMk cId="1769220115" sldId="257"/>
+            <ac:spMk id="3" creationId="{138B8362-48C3-13F0-617A-B8A3256120CA}"/>
+          </ac:spMkLst>
+        </pc:spChg>
+        <pc:spChg chg="add del mod">
+          <ac:chgData name="Neta Becker" userId="cef0aa30-4247-4db8-9bc0-d63efc0d3a53" providerId="ADAL" clId="{F41227B9-745C-4395-9C71-3772E855083B}" dt="2024-04-20T09:15:34.913" v="291" actId="478"/>
+          <ac:spMkLst>
+            <pc:docMk/>
+            <pc:sldMk cId="1769220115" sldId="257"/>
+            <ac:spMk id="4" creationId="{492A418C-EDA6-5C14-CA1B-8B1153793768}"/>
+          </ac:spMkLst>
+        </pc:spChg>
+        <pc:spChg chg="add del mod">
+          <ac:chgData name="Neta Becker" userId="cef0aa30-4247-4db8-9bc0-d63efc0d3a53" providerId="ADAL" clId="{F41227B9-745C-4395-9C71-3772E855083B}" dt="2024-04-20T09:15:35.867" v="292" actId="478"/>
+          <ac:spMkLst>
+            <pc:docMk/>
+            <pc:sldMk cId="1769220115" sldId="257"/>
+            <ac:spMk id="5" creationId="{F52AD1AC-C919-DD06-5AB8-EFA7921D4E7A}"/>
+          </ac:spMkLst>
+        </pc:spChg>
+        <pc:picChg chg="add mod modCrop">
+          <ac:chgData name="Neta Becker" userId="cef0aa30-4247-4db8-9bc0-d63efc0d3a53" providerId="ADAL" clId="{F41227B9-745C-4395-9C71-3772E855083B}" dt="2024-04-20T09:16:08.710" v="302" actId="1076"/>
+          <ac:picMkLst>
+            <pc:docMk/>
+            <pc:sldMk cId="1769220115" sldId="257"/>
+            <ac:picMk id="7" creationId="{5D2567AD-A929-17F9-A858-A92AA2CDC031}"/>
+          </ac:picMkLst>
+        </pc:picChg>
+        <pc:picChg chg="add mod">
+          <ac:chgData name="Neta Becker" userId="cef0aa30-4247-4db8-9bc0-d63efc0d3a53" providerId="ADAL" clId="{F41227B9-745C-4395-9C71-3772E855083B}" dt="2024-04-20T09:13:19.810" v="247" actId="14100"/>
+          <ac:picMkLst>
+            <pc:docMk/>
+            <pc:sldMk cId="1769220115" sldId="257"/>
+            <ac:picMk id="1026" creationId="{4AC9365A-FC03-7DAC-AC59-C7F37271B2CA}"/>
+          </ac:picMkLst>
+        </pc:picChg>
+        <pc:picChg chg="add del mod">
+          <ac:chgData name="Neta Becker" userId="cef0aa30-4247-4db8-9bc0-d63efc0d3a53" providerId="ADAL" clId="{F41227B9-745C-4395-9C71-3772E855083B}" dt="2024-04-20T09:15:32.552" v="290" actId="478"/>
+          <ac:picMkLst>
+            <pc:docMk/>
+            <pc:sldMk cId="1769220115" sldId="257"/>
+            <ac:picMk id="1028" creationId="{73822209-7A05-7768-AD1F-91B7C0E469B0}"/>
+          </ac:picMkLst>
+        </pc:picChg>
+      </pc:sldChg>
+      <pc:sldChg chg="modSp new mod ord">
+        <pc:chgData name="Neta Becker" userId="cef0aa30-4247-4db8-9bc0-d63efc0d3a53" providerId="ADAL" clId="{F41227B9-745C-4395-9C71-3772E855083B}" dt="2024-04-20T09:22:38.819" v="403" actId="20577"/>
+        <pc:sldMkLst>
+          <pc:docMk/>
+          <pc:sldMk cId="4065677750" sldId="258"/>
+        </pc:sldMkLst>
+        <pc:spChg chg="mod">
+          <ac:chgData name="Neta Becker" userId="cef0aa30-4247-4db8-9bc0-d63efc0d3a53" providerId="ADAL" clId="{F41227B9-745C-4395-9C71-3772E855083B}" dt="2024-04-20T09:07:01.867" v="68" actId="20577"/>
+          <ac:spMkLst>
+            <pc:docMk/>
+            <pc:sldMk cId="4065677750" sldId="258"/>
+            <ac:spMk id="2" creationId="{7698AAED-D1FD-B89F-2DA0-BBC929912FFA}"/>
+          </ac:spMkLst>
+        </pc:spChg>
+        <pc:spChg chg="mod">
+          <ac:chgData name="Neta Becker" userId="cef0aa30-4247-4db8-9bc0-d63efc0d3a53" providerId="ADAL" clId="{F41227B9-745C-4395-9C71-3772E855083B}" dt="2024-04-20T09:22:38.819" v="403" actId="20577"/>
+          <ac:spMkLst>
+            <pc:docMk/>
+            <pc:sldMk cId="4065677750" sldId="258"/>
+            <ac:spMk id="3" creationId="{12642EC7-8503-E8AB-52BC-06C912BABE9F}"/>
+          </ac:spMkLst>
+        </pc:spChg>
+      </pc:sldChg>
+      <pc:sldChg chg="new del">
+        <pc:chgData name="Neta Becker" userId="cef0aa30-4247-4db8-9bc0-d63efc0d3a53" providerId="ADAL" clId="{F41227B9-745C-4395-9C71-3772E855083B}" dt="2024-04-20T09:05:25.744" v="35" actId="47"/>
+        <pc:sldMkLst>
+          <pc:docMk/>
+          <pc:sldMk cId="4140540780" sldId="258"/>
+        </pc:sldMkLst>
       </pc:sldChg>
     </pc:docChg>
   </pc:docChgLst>
@@ -2545,161 +2702,6 @@
       </pc:sldMasterChg>
     </pc:docChg>
   </pc:docChgLst>
-  <pc:docChgLst>
-    <pc:chgData name="Neta Becker" userId="cef0aa30-4247-4db8-9bc0-d63efc0d3a53" providerId="ADAL" clId="{8E39725F-6EEF-4D4D-92C3-0465B79E9629}"/>
-    <pc:docChg chg="undo custSel addSld delSld modSld">
-      <pc:chgData name="Neta Becker" userId="cef0aa30-4247-4db8-9bc0-d63efc0d3a53" providerId="ADAL" clId="{8E39725F-6EEF-4D4D-92C3-0465B79E9629}" dt="2024-05-09T15:58:07.762" v="23" actId="1076"/>
-      <pc:docMkLst>
-        <pc:docMk/>
-      </pc:docMkLst>
-      <pc:sldChg chg="modSp mod">
-        <pc:chgData name="Neta Becker" userId="cef0aa30-4247-4db8-9bc0-d63efc0d3a53" providerId="ADAL" clId="{8E39725F-6EEF-4D4D-92C3-0465B79E9629}" dt="2024-05-09T15:58:07.762" v="23" actId="1076"/>
-        <pc:sldMkLst>
-          <pc:docMk/>
-          <pc:sldMk cId="461867753" sldId="261"/>
-        </pc:sldMkLst>
-        <pc:spChg chg="mod">
-          <ac:chgData name="Neta Becker" userId="cef0aa30-4247-4db8-9bc0-d63efc0d3a53" providerId="ADAL" clId="{8E39725F-6EEF-4D4D-92C3-0465B79E9629}" dt="2024-05-09T15:58:02.847" v="22" actId="14100"/>
-          <ac:spMkLst>
-            <pc:docMk/>
-            <pc:sldMk cId="461867753" sldId="261"/>
-            <ac:spMk id="2" creationId="{27F2BC14-3B96-5B86-2DD7-96DF3F92CEED}"/>
-          </ac:spMkLst>
-        </pc:spChg>
-        <pc:spChg chg="mod">
-          <ac:chgData name="Neta Becker" userId="cef0aa30-4247-4db8-9bc0-d63efc0d3a53" providerId="ADAL" clId="{8E39725F-6EEF-4D4D-92C3-0465B79E9629}" dt="2024-05-09T15:58:07.762" v="23" actId="1076"/>
-          <ac:spMkLst>
-            <pc:docMk/>
-            <pc:sldMk cId="461867753" sldId="261"/>
-            <ac:spMk id="10" creationId="{CA9F315B-54D4-E999-844C-5423FDC7670E}"/>
-          </ac:spMkLst>
-        </pc:spChg>
-      </pc:sldChg>
-      <pc:sldChg chg="del">
-        <pc:chgData name="Neta Becker" userId="cef0aa30-4247-4db8-9bc0-d63efc0d3a53" providerId="ADAL" clId="{8E39725F-6EEF-4D4D-92C3-0465B79E9629}" dt="2024-05-09T15:55:46.114" v="2" actId="47"/>
-        <pc:sldMkLst>
-          <pc:docMk/>
-          <pc:sldMk cId="3063377580" sldId="262"/>
-        </pc:sldMkLst>
-      </pc:sldChg>
-      <pc:sldChg chg="modSp add del mod">
-        <pc:chgData name="Neta Becker" userId="cef0aa30-4247-4db8-9bc0-d63efc0d3a53" providerId="ADAL" clId="{8E39725F-6EEF-4D4D-92C3-0465B79E9629}" dt="2024-05-09T15:57:42.896" v="17" actId="2696"/>
-        <pc:sldMkLst>
-          <pc:docMk/>
-          <pc:sldMk cId="1521044007" sldId="264"/>
-        </pc:sldMkLst>
-        <pc:spChg chg="mod">
-          <ac:chgData name="Neta Becker" userId="cef0aa30-4247-4db8-9bc0-d63efc0d3a53" providerId="ADAL" clId="{8E39725F-6EEF-4D4D-92C3-0465B79E9629}" dt="2024-05-09T15:56:09.475" v="10" actId="5793"/>
-          <ac:spMkLst>
-            <pc:docMk/>
-            <pc:sldMk cId="1521044007" sldId="264"/>
-            <ac:spMk id="3" creationId="{2D2E6A14-D956-DE39-DFB5-8D352E675082}"/>
-          </ac:spMkLst>
-        </pc:spChg>
-      </pc:sldChg>
-      <pc:sldChg chg="add">
-        <pc:chgData name="Neta Becker" userId="cef0aa30-4247-4db8-9bc0-d63efc0d3a53" providerId="ADAL" clId="{8E39725F-6EEF-4D4D-92C3-0465B79E9629}" dt="2024-05-09T15:57:45.107" v="18"/>
-        <pc:sldMkLst>
-          <pc:docMk/>
-          <pc:sldMk cId="3634263486" sldId="264"/>
-        </pc:sldMkLst>
-      </pc:sldChg>
-      <pc:sldChg chg="modSp mod">
-        <pc:chgData name="Neta Becker" userId="cef0aa30-4247-4db8-9bc0-d63efc0d3a53" providerId="ADAL" clId="{8E39725F-6EEF-4D4D-92C3-0465B79E9629}" dt="2024-05-09T15:57:22.424" v="16" actId="20577"/>
-        <pc:sldMkLst>
-          <pc:docMk/>
-          <pc:sldMk cId="660352062" sldId="312"/>
-        </pc:sldMkLst>
-        <pc:spChg chg="mod">
-          <ac:chgData name="Neta Becker" userId="cef0aa30-4247-4db8-9bc0-d63efc0d3a53" providerId="ADAL" clId="{8E39725F-6EEF-4D4D-92C3-0465B79E9629}" dt="2024-05-09T15:57:16.641" v="11" actId="20577"/>
-          <ac:spMkLst>
-            <pc:docMk/>
-            <pc:sldMk cId="660352062" sldId="312"/>
-            <ac:spMk id="310" creationId="{00000000-0000-0000-0000-000000000000}"/>
-          </ac:spMkLst>
-        </pc:spChg>
-        <pc:spChg chg="mod">
-          <ac:chgData name="Neta Becker" userId="cef0aa30-4247-4db8-9bc0-d63efc0d3a53" providerId="ADAL" clId="{8E39725F-6EEF-4D4D-92C3-0465B79E9629}" dt="2024-05-09T15:57:18.738" v="13" actId="20577"/>
-          <ac:spMkLst>
-            <pc:docMk/>
-            <pc:sldMk cId="660352062" sldId="312"/>
-            <ac:spMk id="313" creationId="{00000000-0000-0000-0000-000000000000}"/>
-          </ac:spMkLst>
-        </pc:spChg>
-        <pc:spChg chg="mod">
-          <ac:chgData name="Neta Becker" userId="cef0aa30-4247-4db8-9bc0-d63efc0d3a53" providerId="ADAL" clId="{8E39725F-6EEF-4D4D-92C3-0465B79E9629}" dt="2024-05-09T15:57:20.810" v="15" actId="20577"/>
-          <ac:spMkLst>
-            <pc:docMk/>
-            <pc:sldMk cId="660352062" sldId="312"/>
-            <ac:spMk id="316" creationId="{00000000-0000-0000-0000-000000000000}"/>
-          </ac:spMkLst>
-        </pc:spChg>
-        <pc:spChg chg="mod">
-          <ac:chgData name="Neta Becker" userId="cef0aa30-4247-4db8-9bc0-d63efc0d3a53" providerId="ADAL" clId="{8E39725F-6EEF-4D4D-92C3-0465B79E9629}" dt="2024-05-09T15:57:22.424" v="16" actId="20577"/>
-          <ac:spMkLst>
-            <pc:docMk/>
-            <pc:sldMk cId="660352062" sldId="312"/>
-            <ac:spMk id="319" creationId="{00000000-0000-0000-0000-000000000000}"/>
-          </ac:spMkLst>
-        </pc:spChg>
-      </pc:sldChg>
-      <pc:sldChg chg="addSp modSp add mod setBg">
-        <pc:chgData name="Neta Becker" userId="cef0aa30-4247-4db8-9bc0-d63efc0d3a53" providerId="ADAL" clId="{8E39725F-6EEF-4D4D-92C3-0465B79E9629}" dt="2024-05-09T15:57:55.008" v="21" actId="20577"/>
-        <pc:sldMkLst>
-          <pc:docMk/>
-          <pc:sldMk cId="473798661" sldId="313"/>
-        </pc:sldMkLst>
-        <pc:spChg chg="mod">
-          <ac:chgData name="Neta Becker" userId="cef0aa30-4247-4db8-9bc0-d63efc0d3a53" providerId="ADAL" clId="{8E39725F-6EEF-4D4D-92C3-0465B79E9629}" dt="2024-05-09T15:57:55.008" v="21" actId="20577"/>
-          <ac:spMkLst>
-            <pc:docMk/>
-            <pc:sldMk cId="473798661" sldId="313"/>
-            <ac:spMk id="3" creationId="{79639998-542D-EA12-DA1F-335575519817}"/>
-          </ac:spMkLst>
-        </pc:spChg>
-        <pc:spChg chg="add mod">
-          <ac:chgData name="Neta Becker" userId="cef0aa30-4247-4db8-9bc0-d63efc0d3a53" providerId="ADAL" clId="{8E39725F-6EEF-4D4D-92C3-0465B79E9629}" dt="2024-05-09T15:55:44.367" v="1"/>
-          <ac:spMkLst>
-            <pc:docMk/>
-            <pc:sldMk cId="473798661" sldId="313"/>
-            <ac:spMk id="4" creationId="{85F07728-A4E2-D9D2-91C4-70250A23B88A}"/>
-          </ac:spMkLst>
-        </pc:spChg>
-        <pc:spChg chg="mod">
-          <ac:chgData name="Neta Becker" userId="cef0aa30-4247-4db8-9bc0-d63efc0d3a53" providerId="ADAL" clId="{8E39725F-6EEF-4D4D-92C3-0465B79E9629}" dt="2024-05-09T15:55:44.367" v="1"/>
-          <ac:spMkLst>
-            <pc:docMk/>
-            <pc:sldMk cId="473798661" sldId="313"/>
-            <ac:spMk id="6" creationId="{01C795E8-3F02-1807-50F5-AAA8595D7AE4}"/>
-          </ac:spMkLst>
-        </pc:spChg>
-        <pc:spChg chg="mod">
-          <ac:chgData name="Neta Becker" userId="cef0aa30-4247-4db8-9bc0-d63efc0d3a53" providerId="ADAL" clId="{8E39725F-6EEF-4D4D-92C3-0465B79E9629}" dt="2024-05-09T15:55:44.367" v="1"/>
-          <ac:spMkLst>
-            <pc:docMk/>
-            <pc:sldMk cId="473798661" sldId="313"/>
-            <ac:spMk id="7" creationId="{2EEE2E42-1535-F3D4-88A6-600540A1C48F}"/>
-          </ac:spMkLst>
-        </pc:spChg>
-        <pc:spChg chg="mod">
-          <ac:chgData name="Neta Becker" userId="cef0aa30-4247-4db8-9bc0-d63efc0d3a53" providerId="ADAL" clId="{8E39725F-6EEF-4D4D-92C3-0465B79E9629}" dt="2024-05-09T15:55:44.367" v="1"/>
-          <ac:spMkLst>
-            <pc:docMk/>
-            <pc:sldMk cId="473798661" sldId="313"/>
-            <ac:spMk id="8" creationId="{85994452-E285-51CF-641A-CAA40F791930}"/>
-          </ac:spMkLst>
-        </pc:spChg>
-        <pc:grpChg chg="add mod">
-          <ac:chgData name="Neta Becker" userId="cef0aa30-4247-4db8-9bc0-d63efc0d3a53" providerId="ADAL" clId="{8E39725F-6EEF-4D4D-92C3-0465B79E9629}" dt="2024-05-09T15:55:44.367" v="1"/>
-          <ac:grpSpMkLst>
-            <pc:docMk/>
-            <pc:sldMk cId="473798661" sldId="313"/>
-            <ac:grpSpMk id="5" creationId="{0ED5CF67-36AF-6C59-114F-67E958E1AA67}"/>
-          </ac:grpSpMkLst>
-        </pc:grpChg>
-      </pc:sldChg>
-    </pc:docChg>
-  </pc:docChgLst>
 </pc:chgInfo>
 </file>
 
@@ -2785,7 +2787,7 @@
           <a:p>
             <a:fld id="{00F3AC2B-0516-4C3C-9B21-3C09651EECE3}" type="datetimeFigureOut">
               <a:rPr lang="en-IL" smtClean="0"/>
-              <a:t>09/05/2024</a:t>
+              <a:t>12/05/2024</a:t>
             </a:fld>
             <a:endParaRPr lang="en-IL"/>
           </a:p>
@@ -3836,7 +3838,7 @@
           <a:p>
             <a:fld id="{C9885491-9AC8-4B1E-A640-A20BDB93DAD1}" type="slidenum">
               <a:rPr lang="en-IL" smtClean="0"/>
-              <a:t>11</a:t>
+              <a:t>13</a:t>
             </a:fld>
             <a:endParaRPr lang="en-IL"/>
           </a:p>
@@ -4328,7 +4330,7 @@
           <a:p>
             <a:fld id="{7E48F360-3E34-44F2-B2D1-F60E60B25061}" type="datetimeFigureOut">
               <a:rPr lang="en-US" smtClean="0"/>
-              <a:t>5/9/2024</a:t>
+              <a:t>5/12/24</a:t>
             </a:fld>
             <a:endParaRPr lang="en-US"/>
           </a:p>
@@ -4530,7 +4532,7 @@
           <a:p>
             <a:fld id="{7E48F360-3E34-44F2-B2D1-F60E60B25061}" type="datetimeFigureOut">
               <a:rPr lang="en-US" smtClean="0"/>
-              <a:t>5/9/2024</a:t>
+              <a:t>5/12/24</a:t>
             </a:fld>
             <a:endParaRPr lang="en-US"/>
           </a:p>
@@ -4710,7 +4712,7 @@
           <a:p>
             <a:fld id="{7E48F360-3E34-44F2-B2D1-F60E60B25061}" type="datetimeFigureOut">
               <a:rPr lang="en-US" smtClean="0"/>
-              <a:t>5/9/2024</a:t>
+              <a:t>5/12/24</a:t>
             </a:fld>
             <a:endParaRPr lang="en-US"/>
           </a:p>
@@ -7031,7 +7033,7 @@
           <a:p>
             <a:fld id="{7E48F360-3E34-44F2-B2D1-F60E60B25061}" type="datetimeFigureOut">
               <a:rPr lang="en-US" smtClean="0"/>
-              <a:t>5/9/2024</a:t>
+              <a:t>5/12/24</a:t>
             </a:fld>
             <a:endParaRPr lang="en-US"/>
           </a:p>
@@ -7611,7 +7613,7 @@
           <a:p>
             <a:fld id="{7E48F360-3E34-44F2-B2D1-F60E60B25061}" type="datetimeFigureOut">
               <a:rPr lang="en-US" smtClean="0"/>
-              <a:t>5/9/2024</a:t>
+              <a:t>5/12/24</a:t>
             </a:fld>
             <a:endParaRPr lang="en-US"/>
           </a:p>
@@ -7913,7 +7915,7 @@
           <a:p>
             <a:fld id="{7E48F360-3E34-44F2-B2D1-F60E60B25061}" type="datetimeFigureOut">
               <a:rPr lang="en-US" smtClean="0"/>
-              <a:t>5/9/2024</a:t>
+              <a:t>5/12/24</a:t>
             </a:fld>
             <a:endParaRPr lang="en-US"/>
           </a:p>
@@ -8350,7 +8352,7 @@
           <a:p>
             <a:fld id="{7E48F360-3E34-44F2-B2D1-F60E60B25061}" type="datetimeFigureOut">
               <a:rPr lang="en-US" smtClean="0"/>
-              <a:t>5/9/2024</a:t>
+              <a:t>5/12/24</a:t>
             </a:fld>
             <a:endParaRPr lang="en-US"/>
           </a:p>
@@ -8468,7 +8470,7 @@
           <a:p>
             <a:fld id="{7E48F360-3E34-44F2-B2D1-F60E60B25061}" type="datetimeFigureOut">
               <a:rPr lang="en-US" smtClean="0"/>
-              <a:t>5/9/2024</a:t>
+              <a:t>5/12/24</a:t>
             </a:fld>
             <a:endParaRPr lang="en-US"/>
           </a:p>
@@ -8563,7 +8565,7 @@
           <a:p>
             <a:fld id="{7E48F360-3E34-44F2-B2D1-F60E60B25061}" type="datetimeFigureOut">
               <a:rPr lang="en-US" smtClean="0"/>
-              <a:t>5/9/2024</a:t>
+              <a:t>5/12/24</a:t>
             </a:fld>
             <a:endParaRPr lang="en-US"/>
           </a:p>
@@ -8907,7 +8909,7 @@
           <a:p>
             <a:fld id="{7E48F360-3E34-44F2-B2D1-F60E60B25061}" type="datetimeFigureOut">
               <a:rPr lang="en-US" smtClean="0"/>
-              <a:t>5/9/2024</a:t>
+              <a:t>5/12/24</a:t>
             </a:fld>
             <a:endParaRPr lang="en-US"/>
           </a:p>
@@ -9296,7 +9298,7 @@
           <a:p>
             <a:fld id="{7E48F360-3E34-44F2-B2D1-F60E60B25061}" type="datetimeFigureOut">
               <a:rPr lang="en-US" smtClean="0"/>
-              <a:t>5/9/2024</a:t>
+              <a:t>5/12/24</a:t>
             </a:fld>
             <a:endParaRPr lang="en-US"/>
           </a:p>
@@ -9604,7 +9606,7 @@
           <a:p>
             <a:fld id="{7E48F360-3E34-44F2-B2D1-F60E60B25061}" type="datetimeFigureOut">
               <a:rPr lang="en-US" smtClean="0"/>
-              <a:t>5/9/2024</a:t>
+              <a:t>5/12/24</a:t>
             </a:fld>
             <a:endParaRPr lang="en-US"/>
           </a:p>
@@ -11132,6 +11134,3390 @@
           <a:p>
             <a:r>
               <a:rPr lang="en-US" dirty="0"/>
+              <a:t>Results</a:t>
+            </a:r>
+            <a:endParaRPr lang="en-IL" dirty="0"/>
+          </a:p>
+        </p:txBody>
+      </p:sp>
+      <p:sp>
+        <p:nvSpPr>
+          <p:cNvPr id="4" name="Google Shape;348;p47">
+            <a:extLst>
+              <a:ext uri="{FF2B5EF4-FFF2-40B4-BE49-F238E27FC236}">
+                <a16:creationId xmlns:a16="http://schemas.microsoft.com/office/drawing/2014/main" id="{DB4B58AA-CB6F-C0F0-4724-E92868B9FD0E}"/>
+              </a:ext>
+            </a:extLst>
+          </p:cNvPr>
+          <p:cNvSpPr txBox="1">
+            <a:spLocks/>
+          </p:cNvSpPr>
+          <p:nvPr/>
+        </p:nvSpPr>
+        <p:spPr>
+          <a:xfrm>
+            <a:off x="-1" y="0"/>
+            <a:ext cx="2363639" cy="488437"/>
+          </a:xfrm>
+          <a:prstGeom prst="rect">
+            <a:avLst/>
+          </a:prstGeom>
+          <a:noFill/>
+          <a:ln>
+            <a:noFill/>
+          </a:ln>
+        </p:spPr>
+        <p:txBody>
+          <a:bodyPr spcFirstLastPara="1" wrap="square" lIns="91425" tIns="91425" rIns="91425" bIns="91425" anchor="t" anchorCtr="0">
+            <a:noAutofit/>
+          </a:bodyPr>
+          <a:lstStyle>
+            <a:defPPr marR="0" lvl="0" algn="l" rtl="0">
+              <a:lnSpc>
+                <a:spcPct val="100000"/>
+              </a:lnSpc>
+              <a:spcBef>
+                <a:spcPts val="0"/>
+              </a:spcBef>
+              <a:spcAft>
+                <a:spcPts val="0"/>
+              </a:spcAft>
+            </a:defPPr>
+            <a:lvl1pPr marR="0" lvl="0" algn="ctr" rtl="0">
+              <a:lnSpc>
+                <a:spcPct val="100000"/>
+              </a:lnSpc>
+              <a:spcBef>
+                <a:spcPts val="0"/>
+              </a:spcBef>
+              <a:spcAft>
+                <a:spcPts val="0"/>
+              </a:spcAft>
+              <a:buClr>
+                <a:schemeClr val="dk1"/>
+              </a:buClr>
+              <a:buSzPts val="3100"/>
+              <a:buFont typeface="Golos Text"/>
+              <a:buNone/>
+              <a:defRPr sz="3100" b="0" i="0" u="none" strike="noStrike" cap="none">
+                <a:solidFill>
+                  <a:schemeClr val="dk1"/>
+                </a:solidFill>
+                <a:latin typeface="Golos Text"/>
+                <a:ea typeface="Golos Text"/>
+                <a:cs typeface="Golos Text"/>
+                <a:sym typeface="Golos Text"/>
+              </a:defRPr>
+            </a:lvl1pPr>
+            <a:lvl2pPr marR="0" lvl="1" algn="ctr" rtl="0">
+              <a:lnSpc>
+                <a:spcPct val="100000"/>
+              </a:lnSpc>
+              <a:spcBef>
+                <a:spcPts val="0"/>
+              </a:spcBef>
+              <a:spcAft>
+                <a:spcPts val="0"/>
+              </a:spcAft>
+              <a:buClr>
+                <a:schemeClr val="dk1"/>
+              </a:buClr>
+              <a:buSzPts val="3100"/>
+              <a:buFont typeface="Golos Text"/>
+              <a:buNone/>
+              <a:defRPr sz="3100" b="0" i="0" u="none" strike="noStrike" cap="none">
+                <a:solidFill>
+                  <a:schemeClr val="dk1"/>
+                </a:solidFill>
+                <a:latin typeface="Golos Text"/>
+                <a:ea typeface="Golos Text"/>
+                <a:cs typeface="Golos Text"/>
+                <a:sym typeface="Golos Text"/>
+              </a:defRPr>
+            </a:lvl2pPr>
+            <a:lvl3pPr marR="0" lvl="2" algn="ctr" rtl="0">
+              <a:lnSpc>
+                <a:spcPct val="100000"/>
+              </a:lnSpc>
+              <a:spcBef>
+                <a:spcPts val="0"/>
+              </a:spcBef>
+              <a:spcAft>
+                <a:spcPts val="0"/>
+              </a:spcAft>
+              <a:buClr>
+                <a:schemeClr val="dk1"/>
+              </a:buClr>
+              <a:buSzPts val="3100"/>
+              <a:buFont typeface="Golos Text"/>
+              <a:buNone/>
+              <a:defRPr sz="3100" b="0" i="0" u="none" strike="noStrike" cap="none">
+                <a:solidFill>
+                  <a:schemeClr val="dk1"/>
+                </a:solidFill>
+                <a:latin typeface="Golos Text"/>
+                <a:ea typeface="Golos Text"/>
+                <a:cs typeface="Golos Text"/>
+                <a:sym typeface="Golos Text"/>
+              </a:defRPr>
+            </a:lvl3pPr>
+            <a:lvl4pPr marR="0" lvl="3" algn="ctr" rtl="0">
+              <a:lnSpc>
+                <a:spcPct val="100000"/>
+              </a:lnSpc>
+              <a:spcBef>
+                <a:spcPts val="0"/>
+              </a:spcBef>
+              <a:spcAft>
+                <a:spcPts val="0"/>
+              </a:spcAft>
+              <a:buClr>
+                <a:schemeClr val="dk1"/>
+              </a:buClr>
+              <a:buSzPts val="3100"/>
+              <a:buFont typeface="Golos Text"/>
+              <a:buNone/>
+              <a:defRPr sz="3100" b="0" i="0" u="none" strike="noStrike" cap="none">
+                <a:solidFill>
+                  <a:schemeClr val="dk1"/>
+                </a:solidFill>
+                <a:latin typeface="Golos Text"/>
+                <a:ea typeface="Golos Text"/>
+                <a:cs typeface="Golos Text"/>
+                <a:sym typeface="Golos Text"/>
+              </a:defRPr>
+            </a:lvl4pPr>
+            <a:lvl5pPr marR="0" lvl="4" algn="ctr" rtl="0">
+              <a:lnSpc>
+                <a:spcPct val="100000"/>
+              </a:lnSpc>
+              <a:spcBef>
+                <a:spcPts val="0"/>
+              </a:spcBef>
+              <a:spcAft>
+                <a:spcPts val="0"/>
+              </a:spcAft>
+              <a:buClr>
+                <a:schemeClr val="dk1"/>
+              </a:buClr>
+              <a:buSzPts val="3100"/>
+              <a:buFont typeface="Golos Text"/>
+              <a:buNone/>
+              <a:defRPr sz="3100" b="0" i="0" u="none" strike="noStrike" cap="none">
+                <a:solidFill>
+                  <a:schemeClr val="dk1"/>
+                </a:solidFill>
+                <a:latin typeface="Golos Text"/>
+                <a:ea typeface="Golos Text"/>
+                <a:cs typeface="Golos Text"/>
+                <a:sym typeface="Golos Text"/>
+              </a:defRPr>
+            </a:lvl5pPr>
+            <a:lvl6pPr marR="0" lvl="5" algn="ctr" rtl="0">
+              <a:lnSpc>
+                <a:spcPct val="100000"/>
+              </a:lnSpc>
+              <a:spcBef>
+                <a:spcPts val="0"/>
+              </a:spcBef>
+              <a:spcAft>
+                <a:spcPts val="0"/>
+              </a:spcAft>
+              <a:buClr>
+                <a:schemeClr val="dk1"/>
+              </a:buClr>
+              <a:buSzPts val="3100"/>
+              <a:buFont typeface="Golos Text"/>
+              <a:buNone/>
+              <a:defRPr sz="3100" b="0" i="0" u="none" strike="noStrike" cap="none">
+                <a:solidFill>
+                  <a:schemeClr val="dk1"/>
+                </a:solidFill>
+                <a:latin typeface="Golos Text"/>
+                <a:ea typeface="Golos Text"/>
+                <a:cs typeface="Golos Text"/>
+                <a:sym typeface="Golos Text"/>
+              </a:defRPr>
+            </a:lvl6pPr>
+            <a:lvl7pPr marR="0" lvl="6" algn="ctr" rtl="0">
+              <a:lnSpc>
+                <a:spcPct val="100000"/>
+              </a:lnSpc>
+              <a:spcBef>
+                <a:spcPts val="0"/>
+              </a:spcBef>
+              <a:spcAft>
+                <a:spcPts val="0"/>
+              </a:spcAft>
+              <a:buClr>
+                <a:schemeClr val="dk1"/>
+              </a:buClr>
+              <a:buSzPts val="3100"/>
+              <a:buFont typeface="Golos Text"/>
+              <a:buNone/>
+              <a:defRPr sz="3100" b="0" i="0" u="none" strike="noStrike" cap="none">
+                <a:solidFill>
+                  <a:schemeClr val="dk1"/>
+                </a:solidFill>
+                <a:latin typeface="Golos Text"/>
+                <a:ea typeface="Golos Text"/>
+                <a:cs typeface="Golos Text"/>
+                <a:sym typeface="Golos Text"/>
+              </a:defRPr>
+            </a:lvl7pPr>
+            <a:lvl8pPr marR="0" lvl="7" algn="ctr" rtl="0">
+              <a:lnSpc>
+                <a:spcPct val="100000"/>
+              </a:lnSpc>
+              <a:spcBef>
+                <a:spcPts val="0"/>
+              </a:spcBef>
+              <a:spcAft>
+                <a:spcPts val="0"/>
+              </a:spcAft>
+              <a:buClr>
+                <a:schemeClr val="dk1"/>
+              </a:buClr>
+              <a:buSzPts val="3100"/>
+              <a:buFont typeface="Golos Text"/>
+              <a:buNone/>
+              <a:defRPr sz="3100" b="0" i="0" u="none" strike="noStrike" cap="none">
+                <a:solidFill>
+                  <a:schemeClr val="dk1"/>
+                </a:solidFill>
+                <a:latin typeface="Golos Text"/>
+                <a:ea typeface="Golos Text"/>
+                <a:cs typeface="Golos Text"/>
+                <a:sym typeface="Golos Text"/>
+              </a:defRPr>
+            </a:lvl8pPr>
+            <a:lvl9pPr marR="0" lvl="8" algn="ctr" rtl="0">
+              <a:lnSpc>
+                <a:spcPct val="100000"/>
+              </a:lnSpc>
+              <a:spcBef>
+                <a:spcPts val="0"/>
+              </a:spcBef>
+              <a:spcAft>
+                <a:spcPts val="0"/>
+              </a:spcAft>
+              <a:buClr>
+                <a:schemeClr val="dk1"/>
+              </a:buClr>
+              <a:buSzPts val="3100"/>
+              <a:buFont typeface="Golos Text"/>
+              <a:buNone/>
+              <a:defRPr sz="3100" b="0" i="0" u="none" strike="noStrike" cap="none">
+                <a:solidFill>
+                  <a:schemeClr val="dk1"/>
+                </a:solidFill>
+                <a:latin typeface="Golos Text"/>
+                <a:ea typeface="Golos Text"/>
+                <a:cs typeface="Golos Text"/>
+                <a:sym typeface="Golos Text"/>
+              </a:defRPr>
+            </a:lvl9pPr>
+          </a:lstStyle>
+          <a:p>
+            <a:r>
+              <a:rPr lang="en-US" sz="2400" dirty="0">
+                <a:solidFill>
+                  <a:schemeClr val="tx1"/>
+                </a:solidFill>
+              </a:rPr>
+              <a:t>Our Work So far</a:t>
+            </a:r>
+          </a:p>
+          <a:p>
+            <a:endParaRPr lang="en-US" sz="2400" dirty="0">
+              <a:solidFill>
+                <a:schemeClr val="accent2"/>
+              </a:solidFill>
+            </a:endParaRPr>
+          </a:p>
+        </p:txBody>
+      </p:sp>
+      <p:grpSp>
+        <p:nvGrpSpPr>
+          <p:cNvPr id="5" name="Google Shape;16527;p95">
+            <a:extLst>
+              <a:ext uri="{FF2B5EF4-FFF2-40B4-BE49-F238E27FC236}">
+                <a16:creationId xmlns:a16="http://schemas.microsoft.com/office/drawing/2014/main" id="{4752F03D-3D59-EDD4-1EDF-103EBF40E5C6}"/>
+              </a:ext>
+            </a:extLst>
+          </p:cNvPr>
+          <p:cNvGrpSpPr/>
+          <p:nvPr/>
+        </p:nvGrpSpPr>
+        <p:grpSpPr>
+          <a:xfrm>
+            <a:off x="2303253" y="87486"/>
+            <a:ext cx="664234" cy="418204"/>
+            <a:chOff x="1341727" y="2483349"/>
+            <a:chExt cx="419913" cy="308109"/>
+          </a:xfrm>
+        </p:grpSpPr>
+        <p:sp>
+          <p:nvSpPr>
+            <p:cNvPr id="6" name="Google Shape;16528;p95">
+              <a:extLst>
+                <a:ext uri="{FF2B5EF4-FFF2-40B4-BE49-F238E27FC236}">
+                  <a16:creationId xmlns:a16="http://schemas.microsoft.com/office/drawing/2014/main" id="{2608EC1E-CF34-1B32-5C9F-E9F6FCBF6CB4}"/>
+                </a:ext>
+              </a:extLst>
+            </p:cNvPr>
+            <p:cNvSpPr/>
+            <p:nvPr/>
+          </p:nvSpPr>
+          <p:spPr>
+            <a:xfrm>
+              <a:off x="1623896" y="2522310"/>
+              <a:ext cx="53488" cy="18605"/>
+            </a:xfrm>
+            <a:custGeom>
+              <a:avLst/>
+              <a:gdLst/>
+              <a:ahLst/>
+              <a:cxnLst/>
+              <a:rect l="l" t="t" r="r" b="b"/>
+              <a:pathLst>
+                <a:path w="1406" h="489" extrusionOk="0">
+                  <a:moveTo>
+                    <a:pt x="167" y="1"/>
+                  </a:moveTo>
+                  <a:cubicBezTo>
+                    <a:pt x="84" y="1"/>
+                    <a:pt x="1" y="72"/>
+                    <a:pt x="1" y="167"/>
+                  </a:cubicBezTo>
+                  <a:cubicBezTo>
+                    <a:pt x="1" y="251"/>
+                    <a:pt x="84" y="322"/>
+                    <a:pt x="167" y="322"/>
+                  </a:cubicBezTo>
+                  <a:cubicBezTo>
+                    <a:pt x="346" y="322"/>
+                    <a:pt x="882" y="358"/>
+                    <a:pt x="1144" y="477"/>
+                  </a:cubicBezTo>
+                  <a:cubicBezTo>
+                    <a:pt x="1167" y="489"/>
+                    <a:pt x="1179" y="489"/>
+                    <a:pt x="1215" y="489"/>
+                  </a:cubicBezTo>
+                  <a:cubicBezTo>
+                    <a:pt x="1275" y="489"/>
+                    <a:pt x="1334" y="465"/>
+                    <a:pt x="1358" y="406"/>
+                  </a:cubicBezTo>
+                  <a:cubicBezTo>
+                    <a:pt x="1406" y="346"/>
+                    <a:pt x="1358" y="239"/>
+                    <a:pt x="1286" y="191"/>
+                  </a:cubicBezTo>
+                  <a:cubicBezTo>
+                    <a:pt x="917" y="1"/>
+                    <a:pt x="203" y="1"/>
+                    <a:pt x="167" y="1"/>
+                  </a:cubicBezTo>
+                  <a:close/>
+                </a:path>
+              </a:pathLst>
+            </a:custGeom>
+            <a:solidFill>
+              <a:srgbClr val="657E93"/>
+            </a:solidFill>
+            <a:ln>
+              <a:noFill/>
+            </a:ln>
+          </p:spPr>
+          <p:txBody>
+            <a:bodyPr spcFirstLastPara="1" wrap="square" lIns="91425" tIns="91425" rIns="91425" bIns="91425" anchor="ctr" anchorCtr="0">
+              <a:noAutofit/>
+            </a:bodyPr>
+            <a:lstStyle/>
+            <a:p>
+              <a:pPr marL="0" lvl="0" indent="0" algn="l" rtl="0">
+                <a:spcBef>
+                  <a:spcPts val="0"/>
+                </a:spcBef>
+                <a:spcAft>
+                  <a:spcPts val="0"/>
+                </a:spcAft>
+                <a:buNone/>
+              </a:pPr>
+              <a:endParaRPr>
+                <a:solidFill>
+                  <a:schemeClr val="accent2"/>
+                </a:solidFill>
+              </a:endParaRPr>
+            </a:p>
+          </p:txBody>
+        </p:sp>
+        <p:sp>
+          <p:nvSpPr>
+            <p:cNvPr id="7" name="Google Shape;16529;p95">
+              <a:extLst>
+                <a:ext uri="{FF2B5EF4-FFF2-40B4-BE49-F238E27FC236}">
+                  <a16:creationId xmlns:a16="http://schemas.microsoft.com/office/drawing/2014/main" id="{A24D5EAA-27CE-050F-F478-1E90FDFE9227}"/>
+                </a:ext>
+              </a:extLst>
+            </p:cNvPr>
+            <p:cNvSpPr/>
+            <p:nvPr/>
+          </p:nvSpPr>
+          <p:spPr>
+            <a:xfrm>
+              <a:off x="1341727" y="2483349"/>
+              <a:ext cx="419913" cy="308109"/>
+            </a:xfrm>
+            <a:custGeom>
+              <a:avLst/>
+              <a:gdLst/>
+              <a:ahLst/>
+              <a:cxnLst/>
+              <a:rect l="l" t="t" r="r" b="b"/>
+              <a:pathLst>
+                <a:path w="11038" h="8098" extrusionOk="0">
+                  <a:moveTo>
+                    <a:pt x="9156" y="501"/>
+                  </a:moveTo>
+                  <a:lnTo>
+                    <a:pt x="9156" y="1168"/>
+                  </a:lnTo>
+                  <a:cubicBezTo>
+                    <a:pt x="9156" y="1275"/>
+                    <a:pt x="9120" y="1394"/>
+                    <a:pt x="9073" y="1489"/>
+                  </a:cubicBezTo>
+                  <a:lnTo>
+                    <a:pt x="9001" y="1644"/>
+                  </a:lnTo>
+                  <a:cubicBezTo>
+                    <a:pt x="8989" y="1680"/>
+                    <a:pt x="8989" y="1692"/>
+                    <a:pt x="8989" y="1727"/>
+                  </a:cubicBezTo>
+                  <a:lnTo>
+                    <a:pt x="8989" y="2061"/>
+                  </a:lnTo>
+                  <a:cubicBezTo>
+                    <a:pt x="8989" y="2299"/>
+                    <a:pt x="8894" y="2525"/>
+                    <a:pt x="8715" y="2692"/>
+                  </a:cubicBezTo>
+                  <a:cubicBezTo>
+                    <a:pt x="8537" y="2858"/>
+                    <a:pt x="8311" y="2942"/>
+                    <a:pt x="8072" y="2942"/>
+                  </a:cubicBezTo>
+                  <a:cubicBezTo>
+                    <a:pt x="7620" y="2918"/>
+                    <a:pt x="7227" y="2513"/>
+                    <a:pt x="7227" y="2025"/>
+                  </a:cubicBezTo>
+                  <a:lnTo>
+                    <a:pt x="7227" y="1727"/>
+                  </a:lnTo>
+                  <a:cubicBezTo>
+                    <a:pt x="7227" y="1692"/>
+                    <a:pt x="7227" y="1680"/>
+                    <a:pt x="7215" y="1644"/>
+                  </a:cubicBezTo>
+                  <a:lnTo>
+                    <a:pt x="7108" y="1453"/>
+                  </a:lnTo>
+                  <a:cubicBezTo>
+                    <a:pt x="7084" y="1382"/>
+                    <a:pt x="7049" y="1311"/>
+                    <a:pt x="7049" y="1215"/>
+                  </a:cubicBezTo>
+                  <a:lnTo>
+                    <a:pt x="7049" y="1203"/>
+                  </a:lnTo>
+                  <a:cubicBezTo>
+                    <a:pt x="7049" y="810"/>
+                    <a:pt x="7370" y="501"/>
+                    <a:pt x="7751" y="501"/>
+                  </a:cubicBezTo>
+                  <a:close/>
+                  <a:moveTo>
+                    <a:pt x="3274" y="322"/>
+                  </a:moveTo>
+                  <a:cubicBezTo>
+                    <a:pt x="3548" y="322"/>
+                    <a:pt x="3786" y="429"/>
+                    <a:pt x="3989" y="632"/>
+                  </a:cubicBezTo>
+                  <a:cubicBezTo>
+                    <a:pt x="4179" y="834"/>
+                    <a:pt x="4298" y="1108"/>
+                    <a:pt x="4310" y="1394"/>
+                  </a:cubicBezTo>
+                  <a:cubicBezTo>
+                    <a:pt x="4346" y="1739"/>
+                    <a:pt x="4441" y="2442"/>
+                    <a:pt x="4608" y="2858"/>
+                  </a:cubicBezTo>
+                  <a:cubicBezTo>
+                    <a:pt x="4358" y="2942"/>
+                    <a:pt x="3870" y="3096"/>
+                    <a:pt x="3274" y="3096"/>
+                  </a:cubicBezTo>
+                  <a:cubicBezTo>
+                    <a:pt x="3253" y="3097"/>
+                    <a:pt x="3232" y="3097"/>
+                    <a:pt x="3210" y="3097"/>
+                  </a:cubicBezTo>
+                  <a:cubicBezTo>
+                    <a:pt x="2654" y="3097"/>
+                    <a:pt x="2182" y="2951"/>
+                    <a:pt x="1953" y="2870"/>
+                  </a:cubicBezTo>
+                  <a:cubicBezTo>
+                    <a:pt x="2096" y="2442"/>
+                    <a:pt x="2215" y="1739"/>
+                    <a:pt x="2226" y="1394"/>
+                  </a:cubicBezTo>
+                  <a:cubicBezTo>
+                    <a:pt x="2250" y="1096"/>
+                    <a:pt x="2357" y="834"/>
+                    <a:pt x="2560" y="632"/>
+                  </a:cubicBezTo>
+                  <a:cubicBezTo>
+                    <a:pt x="2750" y="429"/>
+                    <a:pt x="3000" y="322"/>
+                    <a:pt x="3274" y="322"/>
+                  </a:cubicBezTo>
+                  <a:close/>
+                  <a:moveTo>
+                    <a:pt x="7751" y="3192"/>
+                  </a:moveTo>
+                  <a:cubicBezTo>
+                    <a:pt x="7858" y="3227"/>
+                    <a:pt x="7965" y="3251"/>
+                    <a:pt x="8084" y="3251"/>
+                  </a:cubicBezTo>
+                  <a:lnTo>
+                    <a:pt x="8120" y="3251"/>
+                  </a:lnTo>
+                  <a:cubicBezTo>
+                    <a:pt x="8239" y="3251"/>
+                    <a:pt x="8358" y="3239"/>
+                    <a:pt x="8477" y="3192"/>
+                  </a:cubicBezTo>
+                  <a:lnTo>
+                    <a:pt x="8477" y="3192"/>
+                  </a:lnTo>
+                  <a:cubicBezTo>
+                    <a:pt x="8465" y="3251"/>
+                    <a:pt x="8477" y="3299"/>
+                    <a:pt x="8501" y="3346"/>
+                  </a:cubicBezTo>
+                  <a:lnTo>
+                    <a:pt x="8358" y="3477"/>
+                  </a:lnTo>
+                  <a:cubicBezTo>
+                    <a:pt x="8287" y="3549"/>
+                    <a:pt x="8203" y="3585"/>
+                    <a:pt x="8108" y="3585"/>
+                  </a:cubicBezTo>
+                  <a:cubicBezTo>
+                    <a:pt x="8025" y="3585"/>
+                    <a:pt x="7930" y="3549"/>
+                    <a:pt x="7858" y="3477"/>
+                  </a:cubicBezTo>
+                  <a:lnTo>
+                    <a:pt x="7727" y="3346"/>
+                  </a:lnTo>
+                  <a:cubicBezTo>
+                    <a:pt x="7739" y="3299"/>
+                    <a:pt x="7751" y="3251"/>
+                    <a:pt x="7751" y="3192"/>
+                  </a:cubicBezTo>
+                  <a:close/>
+                  <a:moveTo>
+                    <a:pt x="3691" y="3418"/>
+                  </a:moveTo>
+                  <a:cubicBezTo>
+                    <a:pt x="3750" y="3537"/>
+                    <a:pt x="3870" y="3644"/>
+                    <a:pt x="4001" y="3668"/>
+                  </a:cubicBezTo>
+                  <a:lnTo>
+                    <a:pt x="4584" y="3835"/>
+                  </a:lnTo>
+                  <a:cubicBezTo>
+                    <a:pt x="4727" y="3882"/>
+                    <a:pt x="4834" y="4013"/>
+                    <a:pt x="4834" y="4180"/>
+                  </a:cubicBezTo>
+                  <a:lnTo>
+                    <a:pt x="4834" y="5680"/>
+                  </a:lnTo>
+                  <a:cubicBezTo>
+                    <a:pt x="4834" y="5871"/>
+                    <a:pt x="4667" y="6037"/>
+                    <a:pt x="4477" y="6037"/>
+                  </a:cubicBezTo>
+                  <a:lnTo>
+                    <a:pt x="4477" y="4811"/>
+                  </a:lnTo>
+                  <a:cubicBezTo>
+                    <a:pt x="4477" y="4549"/>
+                    <a:pt x="4239" y="4311"/>
+                    <a:pt x="3977" y="4311"/>
+                  </a:cubicBezTo>
+                  <a:lnTo>
+                    <a:pt x="2584" y="4311"/>
+                  </a:lnTo>
+                  <a:cubicBezTo>
+                    <a:pt x="2310" y="4311"/>
+                    <a:pt x="2084" y="4537"/>
+                    <a:pt x="2084" y="4811"/>
+                  </a:cubicBezTo>
+                  <a:lnTo>
+                    <a:pt x="2084" y="6037"/>
+                  </a:lnTo>
+                  <a:lnTo>
+                    <a:pt x="2072" y="6037"/>
+                  </a:lnTo>
+                  <a:cubicBezTo>
+                    <a:pt x="1869" y="6037"/>
+                    <a:pt x="1715" y="5871"/>
+                    <a:pt x="1715" y="5680"/>
+                  </a:cubicBezTo>
+                  <a:lnTo>
+                    <a:pt x="1715" y="4180"/>
+                  </a:lnTo>
+                  <a:cubicBezTo>
+                    <a:pt x="1715" y="4013"/>
+                    <a:pt x="1810" y="3882"/>
+                    <a:pt x="1965" y="3835"/>
+                  </a:cubicBezTo>
+                  <a:lnTo>
+                    <a:pt x="2548" y="3668"/>
+                  </a:lnTo>
+                  <a:cubicBezTo>
+                    <a:pt x="2679" y="3620"/>
+                    <a:pt x="2798" y="3537"/>
+                    <a:pt x="2858" y="3418"/>
+                  </a:cubicBezTo>
+                  <a:cubicBezTo>
+                    <a:pt x="2988" y="3430"/>
+                    <a:pt x="3119" y="3430"/>
+                    <a:pt x="3274" y="3430"/>
+                  </a:cubicBezTo>
+                  <a:cubicBezTo>
+                    <a:pt x="3417" y="3430"/>
+                    <a:pt x="3560" y="3418"/>
+                    <a:pt x="3691" y="3418"/>
+                  </a:cubicBezTo>
+                  <a:close/>
+                  <a:moveTo>
+                    <a:pt x="8668" y="3608"/>
+                  </a:moveTo>
+                  <a:cubicBezTo>
+                    <a:pt x="8715" y="3644"/>
+                    <a:pt x="8763" y="3656"/>
+                    <a:pt x="8811" y="3668"/>
+                  </a:cubicBezTo>
+                  <a:lnTo>
+                    <a:pt x="9382" y="3835"/>
+                  </a:lnTo>
+                  <a:cubicBezTo>
+                    <a:pt x="9537" y="3882"/>
+                    <a:pt x="9644" y="4013"/>
+                    <a:pt x="9644" y="4180"/>
+                  </a:cubicBezTo>
+                  <a:lnTo>
+                    <a:pt x="9644" y="5680"/>
+                  </a:lnTo>
+                  <a:cubicBezTo>
+                    <a:pt x="9644" y="5871"/>
+                    <a:pt x="9477" y="6037"/>
+                    <a:pt x="9287" y="6037"/>
+                  </a:cubicBezTo>
+                  <a:lnTo>
+                    <a:pt x="8584" y="6037"/>
+                  </a:lnTo>
+                  <a:lnTo>
+                    <a:pt x="8584" y="6025"/>
+                  </a:lnTo>
+                  <a:lnTo>
+                    <a:pt x="8584" y="5668"/>
+                  </a:lnTo>
+                  <a:lnTo>
+                    <a:pt x="9120" y="5668"/>
+                  </a:lnTo>
+                  <a:cubicBezTo>
+                    <a:pt x="9204" y="5668"/>
+                    <a:pt x="9287" y="5597"/>
+                    <a:pt x="9287" y="5502"/>
+                  </a:cubicBezTo>
+                  <a:lnTo>
+                    <a:pt x="9287" y="4466"/>
+                  </a:lnTo>
+                  <a:cubicBezTo>
+                    <a:pt x="9287" y="4370"/>
+                    <a:pt x="9204" y="4299"/>
+                    <a:pt x="9120" y="4299"/>
+                  </a:cubicBezTo>
+                  <a:cubicBezTo>
+                    <a:pt x="9025" y="4299"/>
+                    <a:pt x="8954" y="4370"/>
+                    <a:pt x="8954" y="4466"/>
+                  </a:cubicBezTo>
+                  <a:lnTo>
+                    <a:pt x="8954" y="5335"/>
+                  </a:lnTo>
+                  <a:lnTo>
+                    <a:pt x="8584" y="5335"/>
+                  </a:lnTo>
+                  <a:lnTo>
+                    <a:pt x="8584" y="4644"/>
+                  </a:lnTo>
+                  <a:cubicBezTo>
+                    <a:pt x="8584" y="4466"/>
+                    <a:pt x="8430" y="4311"/>
+                    <a:pt x="8251" y="4311"/>
+                  </a:cubicBezTo>
+                  <a:lnTo>
+                    <a:pt x="6513" y="4311"/>
+                  </a:lnTo>
+                  <a:lnTo>
+                    <a:pt x="6513" y="4180"/>
+                  </a:lnTo>
+                  <a:lnTo>
+                    <a:pt x="6548" y="4180"/>
+                  </a:lnTo>
+                  <a:cubicBezTo>
+                    <a:pt x="6548" y="4013"/>
+                    <a:pt x="6644" y="3882"/>
+                    <a:pt x="6798" y="3835"/>
+                  </a:cubicBezTo>
+                  <a:lnTo>
+                    <a:pt x="7382" y="3668"/>
+                  </a:lnTo>
+                  <a:cubicBezTo>
+                    <a:pt x="7418" y="3656"/>
+                    <a:pt x="7477" y="3644"/>
+                    <a:pt x="7513" y="3608"/>
+                  </a:cubicBezTo>
+                  <a:lnTo>
+                    <a:pt x="7620" y="3716"/>
+                  </a:lnTo>
+                  <a:cubicBezTo>
+                    <a:pt x="7751" y="3847"/>
+                    <a:pt x="7918" y="3906"/>
+                    <a:pt x="8096" y="3906"/>
+                  </a:cubicBezTo>
+                  <a:cubicBezTo>
+                    <a:pt x="8275" y="3906"/>
+                    <a:pt x="8453" y="3835"/>
+                    <a:pt x="8573" y="3716"/>
+                  </a:cubicBezTo>
+                  <a:lnTo>
+                    <a:pt x="8668" y="3608"/>
+                  </a:lnTo>
+                  <a:close/>
+                  <a:moveTo>
+                    <a:pt x="8287" y="4644"/>
+                  </a:moveTo>
+                  <a:cubicBezTo>
+                    <a:pt x="8287" y="4644"/>
+                    <a:pt x="8299" y="4644"/>
+                    <a:pt x="8299" y="4656"/>
+                  </a:cubicBezTo>
+                  <a:lnTo>
+                    <a:pt x="8299" y="6037"/>
+                  </a:lnTo>
+                  <a:cubicBezTo>
+                    <a:pt x="8299" y="6037"/>
+                    <a:pt x="8299" y="6049"/>
+                    <a:pt x="8287" y="6049"/>
+                  </a:cubicBezTo>
+                  <a:lnTo>
+                    <a:pt x="6215" y="6049"/>
+                  </a:lnTo>
+                  <a:cubicBezTo>
+                    <a:pt x="6215" y="6049"/>
+                    <a:pt x="6203" y="6049"/>
+                    <a:pt x="6203" y="6037"/>
+                  </a:cubicBezTo>
+                  <a:lnTo>
+                    <a:pt x="6203" y="4656"/>
+                  </a:lnTo>
+                  <a:lnTo>
+                    <a:pt x="8287" y="4644"/>
+                  </a:lnTo>
+                  <a:close/>
+                  <a:moveTo>
+                    <a:pt x="2084" y="6371"/>
+                  </a:moveTo>
+                  <a:lnTo>
+                    <a:pt x="2084" y="6740"/>
+                  </a:lnTo>
+                  <a:lnTo>
+                    <a:pt x="679" y="6740"/>
+                  </a:lnTo>
+                  <a:lnTo>
+                    <a:pt x="679" y="6371"/>
+                  </a:lnTo>
+                  <a:close/>
+                  <a:moveTo>
+                    <a:pt x="10382" y="6371"/>
+                  </a:moveTo>
+                  <a:lnTo>
+                    <a:pt x="10382" y="6740"/>
+                  </a:lnTo>
+                  <a:lnTo>
+                    <a:pt x="4477" y="6740"/>
+                  </a:lnTo>
+                  <a:lnTo>
+                    <a:pt x="4477" y="6371"/>
+                  </a:lnTo>
+                  <a:close/>
+                  <a:moveTo>
+                    <a:pt x="3953" y="4644"/>
+                  </a:moveTo>
+                  <a:cubicBezTo>
+                    <a:pt x="4060" y="4644"/>
+                    <a:pt x="4131" y="4728"/>
+                    <a:pt x="4131" y="4823"/>
+                  </a:cubicBezTo>
+                  <a:lnTo>
+                    <a:pt x="4131" y="7085"/>
+                  </a:lnTo>
+                  <a:lnTo>
+                    <a:pt x="2393" y="7085"/>
+                  </a:lnTo>
+                  <a:lnTo>
+                    <a:pt x="2393" y="4823"/>
+                  </a:lnTo>
+                  <a:cubicBezTo>
+                    <a:pt x="2393" y="4716"/>
+                    <a:pt x="2488" y="4644"/>
+                    <a:pt x="2572" y="4644"/>
+                  </a:cubicBezTo>
+                  <a:close/>
+                  <a:moveTo>
+                    <a:pt x="3274" y="1"/>
+                  </a:moveTo>
+                  <a:cubicBezTo>
+                    <a:pt x="2548" y="1"/>
+                    <a:pt x="1965" y="596"/>
+                    <a:pt x="1905" y="1370"/>
+                  </a:cubicBezTo>
+                  <a:cubicBezTo>
+                    <a:pt x="1869" y="1692"/>
+                    <a:pt x="1774" y="2346"/>
+                    <a:pt x="1631" y="2751"/>
+                  </a:cubicBezTo>
+                  <a:cubicBezTo>
+                    <a:pt x="1607" y="2835"/>
+                    <a:pt x="1607" y="2930"/>
+                    <a:pt x="1655" y="3001"/>
+                  </a:cubicBezTo>
+                  <a:cubicBezTo>
+                    <a:pt x="1691" y="3073"/>
+                    <a:pt x="1750" y="3156"/>
+                    <a:pt x="1845" y="3180"/>
+                  </a:cubicBezTo>
+                  <a:cubicBezTo>
+                    <a:pt x="1988" y="3227"/>
+                    <a:pt x="2215" y="3299"/>
+                    <a:pt x="2488" y="3358"/>
+                  </a:cubicBezTo>
+                  <a:lnTo>
+                    <a:pt x="2465" y="3358"/>
+                  </a:lnTo>
+                  <a:lnTo>
+                    <a:pt x="1893" y="3525"/>
+                  </a:lnTo>
+                  <a:cubicBezTo>
+                    <a:pt x="1595" y="3608"/>
+                    <a:pt x="1393" y="3882"/>
+                    <a:pt x="1393" y="4180"/>
+                  </a:cubicBezTo>
+                  <a:lnTo>
+                    <a:pt x="1393" y="5680"/>
+                  </a:lnTo>
+                  <a:cubicBezTo>
+                    <a:pt x="1393" y="5811"/>
+                    <a:pt x="1429" y="5930"/>
+                    <a:pt x="1500" y="6037"/>
+                  </a:cubicBezTo>
+                  <a:lnTo>
+                    <a:pt x="167" y="6037"/>
+                  </a:lnTo>
+                  <a:cubicBezTo>
+                    <a:pt x="71" y="6037"/>
+                    <a:pt x="0" y="6109"/>
+                    <a:pt x="0" y="6204"/>
+                  </a:cubicBezTo>
+                  <a:cubicBezTo>
+                    <a:pt x="0" y="6287"/>
+                    <a:pt x="71" y="6371"/>
+                    <a:pt x="167" y="6371"/>
+                  </a:cubicBezTo>
+                  <a:lnTo>
+                    <a:pt x="345" y="6371"/>
+                  </a:lnTo>
+                  <a:lnTo>
+                    <a:pt x="345" y="7930"/>
+                  </a:lnTo>
+                  <a:cubicBezTo>
+                    <a:pt x="345" y="8014"/>
+                    <a:pt x="417" y="8097"/>
+                    <a:pt x="500" y="8097"/>
+                  </a:cubicBezTo>
+                  <a:cubicBezTo>
+                    <a:pt x="595" y="8097"/>
+                    <a:pt x="667" y="8014"/>
+                    <a:pt x="667" y="7930"/>
+                  </a:cubicBezTo>
+                  <a:lnTo>
+                    <a:pt x="667" y="7049"/>
+                  </a:lnTo>
+                  <a:lnTo>
+                    <a:pt x="2072" y="7049"/>
+                  </a:lnTo>
+                  <a:lnTo>
+                    <a:pt x="2072" y="7930"/>
+                  </a:lnTo>
+                  <a:cubicBezTo>
+                    <a:pt x="2072" y="8014"/>
+                    <a:pt x="2143" y="8097"/>
+                    <a:pt x="2226" y="8097"/>
+                  </a:cubicBezTo>
+                  <a:cubicBezTo>
+                    <a:pt x="2322" y="8097"/>
+                    <a:pt x="2393" y="8014"/>
+                    <a:pt x="2393" y="7930"/>
+                  </a:cubicBezTo>
+                  <a:lnTo>
+                    <a:pt x="2393" y="7395"/>
+                  </a:lnTo>
+                  <a:lnTo>
+                    <a:pt x="4155" y="7395"/>
+                  </a:lnTo>
+                  <a:lnTo>
+                    <a:pt x="4155" y="7930"/>
+                  </a:lnTo>
+                  <a:cubicBezTo>
+                    <a:pt x="4155" y="8014"/>
+                    <a:pt x="4227" y="8097"/>
+                    <a:pt x="4310" y="8097"/>
+                  </a:cubicBezTo>
+                  <a:cubicBezTo>
+                    <a:pt x="4405" y="8097"/>
+                    <a:pt x="4477" y="8014"/>
+                    <a:pt x="4477" y="7930"/>
+                  </a:cubicBezTo>
+                  <a:lnTo>
+                    <a:pt x="4477" y="7049"/>
+                  </a:lnTo>
+                  <a:lnTo>
+                    <a:pt x="10370" y="7049"/>
+                  </a:lnTo>
+                  <a:lnTo>
+                    <a:pt x="10370" y="7930"/>
+                  </a:lnTo>
+                  <a:cubicBezTo>
+                    <a:pt x="10370" y="8014"/>
+                    <a:pt x="10442" y="8097"/>
+                    <a:pt x="10537" y="8097"/>
+                  </a:cubicBezTo>
+                  <a:cubicBezTo>
+                    <a:pt x="10620" y="8097"/>
+                    <a:pt x="10704" y="8014"/>
+                    <a:pt x="10704" y="7930"/>
+                  </a:cubicBezTo>
+                  <a:lnTo>
+                    <a:pt x="10704" y="6371"/>
+                  </a:lnTo>
+                  <a:lnTo>
+                    <a:pt x="10882" y="6371"/>
+                  </a:lnTo>
+                  <a:cubicBezTo>
+                    <a:pt x="10966" y="6371"/>
+                    <a:pt x="11037" y="6287"/>
+                    <a:pt x="11037" y="6204"/>
+                  </a:cubicBezTo>
+                  <a:cubicBezTo>
+                    <a:pt x="11037" y="6109"/>
+                    <a:pt x="10966" y="6037"/>
+                    <a:pt x="10882" y="6037"/>
+                  </a:cubicBezTo>
+                  <a:lnTo>
+                    <a:pt x="9894" y="6037"/>
+                  </a:lnTo>
+                  <a:cubicBezTo>
+                    <a:pt x="9954" y="5930"/>
+                    <a:pt x="10001" y="5811"/>
+                    <a:pt x="10001" y="5680"/>
+                  </a:cubicBezTo>
+                  <a:lnTo>
+                    <a:pt x="10001" y="4180"/>
+                  </a:lnTo>
+                  <a:cubicBezTo>
+                    <a:pt x="10001" y="3882"/>
+                    <a:pt x="9787" y="3608"/>
+                    <a:pt x="9501" y="3525"/>
+                  </a:cubicBezTo>
+                  <a:lnTo>
+                    <a:pt x="8930" y="3358"/>
+                  </a:lnTo>
+                  <a:cubicBezTo>
+                    <a:pt x="8858" y="3335"/>
+                    <a:pt x="8799" y="3275"/>
+                    <a:pt x="8799" y="3180"/>
+                  </a:cubicBezTo>
+                  <a:lnTo>
+                    <a:pt x="8799" y="3049"/>
+                  </a:lnTo>
+                  <a:cubicBezTo>
+                    <a:pt x="8858" y="3001"/>
+                    <a:pt x="8894" y="2977"/>
+                    <a:pt x="8942" y="2918"/>
+                  </a:cubicBezTo>
+                  <a:cubicBezTo>
+                    <a:pt x="9180" y="2692"/>
+                    <a:pt x="9299" y="2382"/>
+                    <a:pt x="9299" y="2049"/>
+                  </a:cubicBezTo>
+                  <a:lnTo>
+                    <a:pt x="9299" y="1739"/>
+                  </a:lnTo>
+                  <a:lnTo>
+                    <a:pt x="9358" y="1608"/>
+                  </a:lnTo>
+                  <a:cubicBezTo>
+                    <a:pt x="9430" y="1453"/>
+                    <a:pt x="9465" y="1311"/>
+                    <a:pt x="9465" y="1144"/>
+                  </a:cubicBezTo>
+                  <a:lnTo>
+                    <a:pt x="9465" y="310"/>
+                  </a:lnTo>
+                  <a:cubicBezTo>
+                    <a:pt x="9465" y="215"/>
+                    <a:pt x="9382" y="144"/>
+                    <a:pt x="9299" y="144"/>
+                  </a:cubicBezTo>
+                  <a:lnTo>
+                    <a:pt x="7739" y="144"/>
+                  </a:lnTo>
+                  <a:cubicBezTo>
+                    <a:pt x="7168" y="144"/>
+                    <a:pt x="6703" y="608"/>
+                    <a:pt x="6703" y="1168"/>
+                  </a:cubicBezTo>
+                  <a:lnTo>
+                    <a:pt x="6703" y="1191"/>
+                  </a:lnTo>
+                  <a:cubicBezTo>
+                    <a:pt x="6703" y="1322"/>
+                    <a:pt x="6739" y="1453"/>
+                    <a:pt x="6798" y="1572"/>
+                  </a:cubicBezTo>
+                  <a:lnTo>
+                    <a:pt x="6894" y="1739"/>
+                  </a:lnTo>
+                  <a:lnTo>
+                    <a:pt x="6894" y="2001"/>
+                  </a:lnTo>
+                  <a:cubicBezTo>
+                    <a:pt x="6894" y="2418"/>
+                    <a:pt x="7096" y="2799"/>
+                    <a:pt x="7406" y="3037"/>
+                  </a:cubicBezTo>
+                  <a:lnTo>
+                    <a:pt x="7406" y="3180"/>
+                  </a:lnTo>
+                  <a:cubicBezTo>
+                    <a:pt x="7406" y="3251"/>
+                    <a:pt x="7346" y="3335"/>
+                    <a:pt x="7275" y="3358"/>
+                  </a:cubicBezTo>
+                  <a:lnTo>
+                    <a:pt x="6691" y="3525"/>
+                  </a:lnTo>
+                  <a:cubicBezTo>
+                    <a:pt x="6394" y="3608"/>
+                    <a:pt x="6203" y="3882"/>
+                    <a:pt x="6203" y="4180"/>
+                  </a:cubicBezTo>
+                  <a:lnTo>
+                    <a:pt x="6203" y="4311"/>
+                  </a:lnTo>
+                  <a:lnTo>
+                    <a:pt x="6191" y="4311"/>
+                  </a:lnTo>
+                  <a:cubicBezTo>
+                    <a:pt x="6013" y="4311"/>
+                    <a:pt x="5858" y="4466"/>
+                    <a:pt x="5858" y="4644"/>
+                  </a:cubicBezTo>
+                  <a:lnTo>
+                    <a:pt x="5858" y="6025"/>
+                  </a:lnTo>
+                  <a:lnTo>
+                    <a:pt x="5858" y="6037"/>
+                  </a:lnTo>
+                  <a:lnTo>
+                    <a:pt x="5048" y="6037"/>
+                  </a:lnTo>
+                  <a:cubicBezTo>
+                    <a:pt x="5108" y="5930"/>
+                    <a:pt x="5144" y="5811"/>
+                    <a:pt x="5144" y="5680"/>
+                  </a:cubicBezTo>
+                  <a:lnTo>
+                    <a:pt x="5144" y="4180"/>
+                  </a:lnTo>
+                  <a:cubicBezTo>
+                    <a:pt x="5144" y="3882"/>
+                    <a:pt x="4941" y="3608"/>
+                    <a:pt x="4655" y="3525"/>
+                  </a:cubicBezTo>
+                  <a:lnTo>
+                    <a:pt x="4072" y="3358"/>
+                  </a:lnTo>
+                  <a:lnTo>
+                    <a:pt x="4060" y="3358"/>
+                  </a:lnTo>
+                  <a:cubicBezTo>
+                    <a:pt x="4346" y="3299"/>
+                    <a:pt x="4560" y="3239"/>
+                    <a:pt x="4703" y="3180"/>
+                  </a:cubicBezTo>
+                  <a:cubicBezTo>
+                    <a:pt x="4786" y="3156"/>
+                    <a:pt x="4846" y="3096"/>
+                    <a:pt x="4893" y="3001"/>
+                  </a:cubicBezTo>
+                  <a:cubicBezTo>
+                    <a:pt x="4941" y="2930"/>
+                    <a:pt x="4941" y="2835"/>
+                    <a:pt x="4905" y="2751"/>
+                  </a:cubicBezTo>
+                  <a:cubicBezTo>
+                    <a:pt x="4763" y="2358"/>
+                    <a:pt x="4655" y="1692"/>
+                    <a:pt x="4643" y="1370"/>
+                  </a:cubicBezTo>
+                  <a:cubicBezTo>
+                    <a:pt x="4584" y="572"/>
+                    <a:pt x="4001" y="1"/>
+                    <a:pt x="3274" y="1"/>
+                  </a:cubicBezTo>
+                  <a:close/>
+                </a:path>
+              </a:pathLst>
+            </a:custGeom>
+            <a:solidFill>
+              <a:srgbClr val="657E93"/>
+            </a:solidFill>
+            <a:ln>
+              <a:noFill/>
+            </a:ln>
+          </p:spPr>
+          <p:txBody>
+            <a:bodyPr spcFirstLastPara="1" wrap="square" lIns="91425" tIns="91425" rIns="91425" bIns="91425" anchor="ctr" anchorCtr="0">
+              <a:noAutofit/>
+            </a:bodyPr>
+            <a:lstStyle/>
+            <a:p>
+              <a:pPr marL="0" lvl="0" indent="0" algn="l" rtl="0">
+                <a:spcBef>
+                  <a:spcPts val="0"/>
+                </a:spcBef>
+                <a:spcAft>
+                  <a:spcPts val="0"/>
+                </a:spcAft>
+                <a:buNone/>
+              </a:pPr>
+              <a:endParaRPr>
+                <a:solidFill>
+                  <a:schemeClr val="accent2"/>
+                </a:solidFill>
+              </a:endParaRPr>
+            </a:p>
+          </p:txBody>
+        </p:sp>
+        <p:sp>
+          <p:nvSpPr>
+            <p:cNvPr id="8" name="Google Shape;16530;p95">
+              <a:extLst>
+                <a:ext uri="{FF2B5EF4-FFF2-40B4-BE49-F238E27FC236}">
+                  <a16:creationId xmlns:a16="http://schemas.microsoft.com/office/drawing/2014/main" id="{BD773F22-CE2F-7E1B-8AA9-82D35518965D}"/>
+                </a:ext>
+              </a:extLst>
+            </p:cNvPr>
+            <p:cNvSpPr/>
+            <p:nvPr/>
+          </p:nvSpPr>
+          <p:spPr>
+            <a:xfrm>
+              <a:off x="1611228" y="2679979"/>
+              <a:ext cx="12250" cy="12708"/>
+            </a:xfrm>
+            <a:custGeom>
+              <a:avLst/>
+              <a:gdLst/>
+              <a:ahLst/>
+              <a:cxnLst/>
+              <a:rect l="l" t="t" r="r" b="b"/>
+              <a:pathLst>
+                <a:path w="322" h="334" extrusionOk="0">
+                  <a:moveTo>
+                    <a:pt x="167" y="0"/>
+                  </a:moveTo>
+                  <a:cubicBezTo>
+                    <a:pt x="72" y="0"/>
+                    <a:pt x="0" y="83"/>
+                    <a:pt x="0" y="167"/>
+                  </a:cubicBezTo>
+                  <a:cubicBezTo>
+                    <a:pt x="0" y="262"/>
+                    <a:pt x="72" y="334"/>
+                    <a:pt x="167" y="334"/>
+                  </a:cubicBezTo>
+                  <a:cubicBezTo>
+                    <a:pt x="250" y="334"/>
+                    <a:pt x="322" y="262"/>
+                    <a:pt x="322" y="167"/>
+                  </a:cubicBezTo>
+                  <a:cubicBezTo>
+                    <a:pt x="322" y="83"/>
+                    <a:pt x="250" y="0"/>
+                    <a:pt x="167" y="0"/>
+                  </a:cubicBezTo>
+                  <a:close/>
+                </a:path>
+              </a:pathLst>
+            </a:custGeom>
+            <a:solidFill>
+              <a:srgbClr val="657E93"/>
+            </a:solidFill>
+            <a:ln>
+              <a:noFill/>
+            </a:ln>
+          </p:spPr>
+          <p:txBody>
+            <a:bodyPr spcFirstLastPara="1" wrap="square" lIns="91425" tIns="91425" rIns="91425" bIns="91425" anchor="ctr" anchorCtr="0">
+              <a:noAutofit/>
+            </a:bodyPr>
+            <a:lstStyle/>
+            <a:p>
+              <a:pPr marL="0" lvl="0" indent="0" algn="l" rtl="0">
+                <a:spcBef>
+                  <a:spcPts val="0"/>
+                </a:spcBef>
+                <a:spcAft>
+                  <a:spcPts val="0"/>
+                </a:spcAft>
+                <a:buNone/>
+              </a:pPr>
+              <a:endParaRPr>
+                <a:solidFill>
+                  <a:schemeClr val="accent2"/>
+                </a:solidFill>
+              </a:endParaRPr>
+            </a:p>
+          </p:txBody>
+        </p:sp>
+      </p:grpSp>
+      <p:pic>
+        <p:nvPicPr>
+          <p:cNvPr id="24" name="Content Placeholder 23" descr="A black squares with white circles&#10;&#10;Description automatically generated with medium confidence">
+            <a:extLst>
+              <a:ext uri="{FF2B5EF4-FFF2-40B4-BE49-F238E27FC236}">
+                <a16:creationId xmlns:a16="http://schemas.microsoft.com/office/drawing/2014/main" id="{01267404-B35F-39F5-884D-2B1893105A14}"/>
+              </a:ext>
+            </a:extLst>
+          </p:cNvPr>
+          <p:cNvPicPr>
+            <a:picLocks noGrp="1" noChangeAspect="1"/>
+          </p:cNvPicPr>
+          <p:nvPr>
+            <p:ph idx="1"/>
+          </p:nvPr>
+        </p:nvPicPr>
+        <p:blipFill>
+          <a:blip r:embed="rId2">
+            <a:extLst>
+              <a:ext uri="{28A0092B-C50C-407E-A947-70E740481C1C}">
+                <a14:useLocalDpi xmlns:a14="http://schemas.microsoft.com/office/drawing/2010/main" val="0"/>
+              </a:ext>
+            </a:extLst>
+          </a:blip>
+          <a:stretch>
+            <a:fillRect/>
+          </a:stretch>
+        </p:blipFill>
+        <p:spPr>
+          <a:xfrm>
+            <a:off x="1743075" y="1804511"/>
+            <a:ext cx="8705850" cy="4491113"/>
+          </a:xfrm>
+          <a:prstGeom prst="rect">
+            <a:avLst/>
+          </a:prstGeom>
+          <a:ln w="38100" cap="sq">
+            <a:solidFill>
+              <a:srgbClr val="000000"/>
+            </a:solidFill>
+            <a:prstDash val="solid"/>
+            <a:miter lim="800000"/>
+          </a:ln>
+          <a:effectLst>
+            <a:outerShdw blurRad="50800" dist="38100" dir="2700000" algn="tl" rotWithShape="0">
+              <a:srgbClr val="000000">
+                <a:alpha val="43000"/>
+              </a:srgbClr>
+            </a:outerShdw>
+          </a:effectLst>
+        </p:spPr>
+      </p:pic>
+    </p:spTree>
+    <p:extLst>
+      <p:ext uri="{BB962C8B-B14F-4D97-AF65-F5344CB8AC3E}">
+        <p14:creationId xmlns:p14="http://schemas.microsoft.com/office/powerpoint/2010/main" val="3884930515"/>
+      </p:ext>
+    </p:extLst>
+  </p:cSld>
+  <p:clrMapOvr>
+    <a:masterClrMapping/>
+  </p:clrMapOvr>
+</p:sld>
+</file>
+
+<file path=ppt/slides/slide11.xml><?xml version="1.0" encoding="utf-8"?>
+<p:sld xmlns:a="http://schemas.openxmlformats.org/drawingml/2006/main" xmlns:r="http://schemas.openxmlformats.org/officeDocument/2006/relationships" xmlns:p="http://schemas.openxmlformats.org/presentationml/2006/main">
+  <p:cSld>
+    <p:spTree>
+      <p:nvGrpSpPr>
+        <p:cNvPr id="1" name=""/>
+        <p:cNvGrpSpPr/>
+        <p:nvPr/>
+      </p:nvGrpSpPr>
+      <p:grpSpPr>
+        <a:xfrm>
+          <a:off x="0" y="0"/>
+          <a:ext cx="0" cy="0"/>
+          <a:chOff x="0" y="0"/>
+          <a:chExt cx="0" cy="0"/>
+        </a:xfrm>
+      </p:grpSpPr>
+      <p:sp>
+        <p:nvSpPr>
+          <p:cNvPr id="2" name="Title 1">
+            <a:extLst>
+              <a:ext uri="{FF2B5EF4-FFF2-40B4-BE49-F238E27FC236}">
+                <a16:creationId xmlns:a16="http://schemas.microsoft.com/office/drawing/2014/main" id="{FBB17739-EDA8-0BBF-2BBE-DD328C51C51D}"/>
+              </a:ext>
+            </a:extLst>
+          </p:cNvPr>
+          <p:cNvSpPr>
+            <a:spLocks noGrp="1"/>
+          </p:cNvSpPr>
+          <p:nvPr>
+            <p:ph type="title"/>
+          </p:nvPr>
+        </p:nvSpPr>
+        <p:spPr/>
+        <p:txBody>
+          <a:bodyPr/>
+          <a:lstStyle/>
+          <a:p>
+            <a:r>
+              <a:rPr lang="en-US" dirty="0"/>
+              <a:t>Results</a:t>
+            </a:r>
+            <a:endParaRPr lang="en-IL" dirty="0"/>
+          </a:p>
+        </p:txBody>
+      </p:sp>
+      <p:pic>
+        <p:nvPicPr>
+          <p:cNvPr id="9" name="GT.mp4">
+            <a:hlinkClick r:id="" action="ppaction://media"/>
+            <a:extLst>
+              <a:ext uri="{FF2B5EF4-FFF2-40B4-BE49-F238E27FC236}">
+                <a16:creationId xmlns:a16="http://schemas.microsoft.com/office/drawing/2014/main" id="{07590EA9-D1FD-3F79-303E-3BE0CB53087D}"/>
+              </a:ext>
+            </a:extLst>
+          </p:cNvPr>
+          <p:cNvPicPr>
+            <a:picLocks noGrp="1" noChangeAspect="1"/>
+          </p:cNvPicPr>
+          <p:nvPr>
+            <p:ph idx="1"/>
+            <a:videoFile r:link="rId2"/>
+            <p:extLst>
+              <p:ext uri="{DAA4B4D4-6D71-4841-9C94-3DE7FCFB9230}">
+                <p14:media xmlns:p14="http://schemas.microsoft.com/office/powerpoint/2010/main" r:embed="rId1"/>
+              </p:ext>
+            </p:extLst>
+          </p:nvPr>
+        </p:nvPicPr>
+        <p:blipFill>
+          <a:blip r:embed="rId8"/>
+          <a:stretch>
+            <a:fillRect/>
+          </a:stretch>
+        </p:blipFill>
+        <p:spPr>
+          <a:xfrm>
+            <a:off x="4376889" y="2927692"/>
+            <a:ext cx="3438221" cy="2750799"/>
+          </a:xfrm>
+          <a:prstGeom prst="rect">
+            <a:avLst/>
+          </a:prstGeom>
+          <a:solidFill>
+            <a:srgbClr val="FFFFFF">
+              <a:shade val="85000"/>
+            </a:srgbClr>
+          </a:solidFill>
+          <a:ln w="88900" cap="sq">
+            <a:solidFill>
+              <a:srgbClr val="FFFFFF"/>
+            </a:solidFill>
+            <a:prstDash val="solid"/>
+            <a:miter lim="800000"/>
+          </a:ln>
+          <a:effectLst>
+            <a:outerShdw blurRad="55000" dist="18000" dir="5400000" algn="tl" rotWithShape="0">
+              <a:srgbClr val="000000">
+                <a:alpha val="40000"/>
+              </a:srgbClr>
+            </a:outerShdw>
+          </a:effectLst>
+          <a:scene3d>
+            <a:camera prst="orthographicFront"/>
+            <a:lightRig rig="twoPt" dir="t">
+              <a:rot lat="0" lon="0" rev="7200000"/>
+            </a:lightRig>
+          </a:scene3d>
+          <a:sp3d>
+            <a:bevelT w="25400" h="19050"/>
+            <a:contourClr>
+              <a:srgbClr val="FFFFFF"/>
+            </a:contourClr>
+          </a:sp3d>
+        </p:spPr>
+      </p:pic>
+      <p:sp>
+        <p:nvSpPr>
+          <p:cNvPr id="4" name="Google Shape;348;p47">
+            <a:extLst>
+              <a:ext uri="{FF2B5EF4-FFF2-40B4-BE49-F238E27FC236}">
+                <a16:creationId xmlns:a16="http://schemas.microsoft.com/office/drawing/2014/main" id="{DB4B58AA-CB6F-C0F0-4724-E92868B9FD0E}"/>
+              </a:ext>
+            </a:extLst>
+          </p:cNvPr>
+          <p:cNvSpPr txBox="1">
+            <a:spLocks/>
+          </p:cNvSpPr>
+          <p:nvPr/>
+        </p:nvSpPr>
+        <p:spPr>
+          <a:xfrm>
+            <a:off x="-1" y="0"/>
+            <a:ext cx="2363639" cy="488437"/>
+          </a:xfrm>
+          <a:prstGeom prst="rect">
+            <a:avLst/>
+          </a:prstGeom>
+          <a:noFill/>
+          <a:ln>
+            <a:noFill/>
+          </a:ln>
+        </p:spPr>
+        <p:txBody>
+          <a:bodyPr spcFirstLastPara="1" wrap="square" lIns="91425" tIns="91425" rIns="91425" bIns="91425" anchor="t" anchorCtr="0">
+            <a:noAutofit/>
+          </a:bodyPr>
+          <a:lstStyle>
+            <a:defPPr marR="0" lvl="0" algn="l" rtl="0">
+              <a:lnSpc>
+                <a:spcPct val="100000"/>
+              </a:lnSpc>
+              <a:spcBef>
+                <a:spcPts val="0"/>
+              </a:spcBef>
+              <a:spcAft>
+                <a:spcPts val="0"/>
+              </a:spcAft>
+            </a:defPPr>
+            <a:lvl1pPr marR="0" lvl="0" algn="ctr" rtl="0">
+              <a:lnSpc>
+                <a:spcPct val="100000"/>
+              </a:lnSpc>
+              <a:spcBef>
+                <a:spcPts val="0"/>
+              </a:spcBef>
+              <a:spcAft>
+                <a:spcPts val="0"/>
+              </a:spcAft>
+              <a:buClr>
+                <a:schemeClr val="dk1"/>
+              </a:buClr>
+              <a:buSzPts val="3100"/>
+              <a:buFont typeface="Golos Text"/>
+              <a:buNone/>
+              <a:defRPr sz="3100" b="0" i="0" u="none" strike="noStrike" cap="none">
+                <a:solidFill>
+                  <a:schemeClr val="dk1"/>
+                </a:solidFill>
+                <a:latin typeface="Golos Text"/>
+                <a:ea typeface="Golos Text"/>
+                <a:cs typeface="Golos Text"/>
+                <a:sym typeface="Golos Text"/>
+              </a:defRPr>
+            </a:lvl1pPr>
+            <a:lvl2pPr marR="0" lvl="1" algn="ctr" rtl="0">
+              <a:lnSpc>
+                <a:spcPct val="100000"/>
+              </a:lnSpc>
+              <a:spcBef>
+                <a:spcPts val="0"/>
+              </a:spcBef>
+              <a:spcAft>
+                <a:spcPts val="0"/>
+              </a:spcAft>
+              <a:buClr>
+                <a:schemeClr val="dk1"/>
+              </a:buClr>
+              <a:buSzPts val="3100"/>
+              <a:buFont typeface="Golos Text"/>
+              <a:buNone/>
+              <a:defRPr sz="3100" b="0" i="0" u="none" strike="noStrike" cap="none">
+                <a:solidFill>
+                  <a:schemeClr val="dk1"/>
+                </a:solidFill>
+                <a:latin typeface="Golos Text"/>
+                <a:ea typeface="Golos Text"/>
+                <a:cs typeface="Golos Text"/>
+                <a:sym typeface="Golos Text"/>
+              </a:defRPr>
+            </a:lvl2pPr>
+            <a:lvl3pPr marR="0" lvl="2" algn="ctr" rtl="0">
+              <a:lnSpc>
+                <a:spcPct val="100000"/>
+              </a:lnSpc>
+              <a:spcBef>
+                <a:spcPts val="0"/>
+              </a:spcBef>
+              <a:spcAft>
+                <a:spcPts val="0"/>
+              </a:spcAft>
+              <a:buClr>
+                <a:schemeClr val="dk1"/>
+              </a:buClr>
+              <a:buSzPts val="3100"/>
+              <a:buFont typeface="Golos Text"/>
+              <a:buNone/>
+              <a:defRPr sz="3100" b="0" i="0" u="none" strike="noStrike" cap="none">
+                <a:solidFill>
+                  <a:schemeClr val="dk1"/>
+                </a:solidFill>
+                <a:latin typeface="Golos Text"/>
+                <a:ea typeface="Golos Text"/>
+                <a:cs typeface="Golos Text"/>
+                <a:sym typeface="Golos Text"/>
+              </a:defRPr>
+            </a:lvl3pPr>
+            <a:lvl4pPr marR="0" lvl="3" algn="ctr" rtl="0">
+              <a:lnSpc>
+                <a:spcPct val="100000"/>
+              </a:lnSpc>
+              <a:spcBef>
+                <a:spcPts val="0"/>
+              </a:spcBef>
+              <a:spcAft>
+                <a:spcPts val="0"/>
+              </a:spcAft>
+              <a:buClr>
+                <a:schemeClr val="dk1"/>
+              </a:buClr>
+              <a:buSzPts val="3100"/>
+              <a:buFont typeface="Golos Text"/>
+              <a:buNone/>
+              <a:defRPr sz="3100" b="0" i="0" u="none" strike="noStrike" cap="none">
+                <a:solidFill>
+                  <a:schemeClr val="dk1"/>
+                </a:solidFill>
+                <a:latin typeface="Golos Text"/>
+                <a:ea typeface="Golos Text"/>
+                <a:cs typeface="Golos Text"/>
+                <a:sym typeface="Golos Text"/>
+              </a:defRPr>
+            </a:lvl4pPr>
+            <a:lvl5pPr marR="0" lvl="4" algn="ctr" rtl="0">
+              <a:lnSpc>
+                <a:spcPct val="100000"/>
+              </a:lnSpc>
+              <a:spcBef>
+                <a:spcPts val="0"/>
+              </a:spcBef>
+              <a:spcAft>
+                <a:spcPts val="0"/>
+              </a:spcAft>
+              <a:buClr>
+                <a:schemeClr val="dk1"/>
+              </a:buClr>
+              <a:buSzPts val="3100"/>
+              <a:buFont typeface="Golos Text"/>
+              <a:buNone/>
+              <a:defRPr sz="3100" b="0" i="0" u="none" strike="noStrike" cap="none">
+                <a:solidFill>
+                  <a:schemeClr val="dk1"/>
+                </a:solidFill>
+                <a:latin typeface="Golos Text"/>
+                <a:ea typeface="Golos Text"/>
+                <a:cs typeface="Golos Text"/>
+                <a:sym typeface="Golos Text"/>
+              </a:defRPr>
+            </a:lvl5pPr>
+            <a:lvl6pPr marR="0" lvl="5" algn="ctr" rtl="0">
+              <a:lnSpc>
+                <a:spcPct val="100000"/>
+              </a:lnSpc>
+              <a:spcBef>
+                <a:spcPts val="0"/>
+              </a:spcBef>
+              <a:spcAft>
+                <a:spcPts val="0"/>
+              </a:spcAft>
+              <a:buClr>
+                <a:schemeClr val="dk1"/>
+              </a:buClr>
+              <a:buSzPts val="3100"/>
+              <a:buFont typeface="Golos Text"/>
+              <a:buNone/>
+              <a:defRPr sz="3100" b="0" i="0" u="none" strike="noStrike" cap="none">
+                <a:solidFill>
+                  <a:schemeClr val="dk1"/>
+                </a:solidFill>
+                <a:latin typeface="Golos Text"/>
+                <a:ea typeface="Golos Text"/>
+                <a:cs typeface="Golos Text"/>
+                <a:sym typeface="Golos Text"/>
+              </a:defRPr>
+            </a:lvl6pPr>
+            <a:lvl7pPr marR="0" lvl="6" algn="ctr" rtl="0">
+              <a:lnSpc>
+                <a:spcPct val="100000"/>
+              </a:lnSpc>
+              <a:spcBef>
+                <a:spcPts val="0"/>
+              </a:spcBef>
+              <a:spcAft>
+                <a:spcPts val="0"/>
+              </a:spcAft>
+              <a:buClr>
+                <a:schemeClr val="dk1"/>
+              </a:buClr>
+              <a:buSzPts val="3100"/>
+              <a:buFont typeface="Golos Text"/>
+              <a:buNone/>
+              <a:defRPr sz="3100" b="0" i="0" u="none" strike="noStrike" cap="none">
+                <a:solidFill>
+                  <a:schemeClr val="dk1"/>
+                </a:solidFill>
+                <a:latin typeface="Golos Text"/>
+                <a:ea typeface="Golos Text"/>
+                <a:cs typeface="Golos Text"/>
+                <a:sym typeface="Golos Text"/>
+              </a:defRPr>
+            </a:lvl7pPr>
+            <a:lvl8pPr marR="0" lvl="7" algn="ctr" rtl="0">
+              <a:lnSpc>
+                <a:spcPct val="100000"/>
+              </a:lnSpc>
+              <a:spcBef>
+                <a:spcPts val="0"/>
+              </a:spcBef>
+              <a:spcAft>
+                <a:spcPts val="0"/>
+              </a:spcAft>
+              <a:buClr>
+                <a:schemeClr val="dk1"/>
+              </a:buClr>
+              <a:buSzPts val="3100"/>
+              <a:buFont typeface="Golos Text"/>
+              <a:buNone/>
+              <a:defRPr sz="3100" b="0" i="0" u="none" strike="noStrike" cap="none">
+                <a:solidFill>
+                  <a:schemeClr val="dk1"/>
+                </a:solidFill>
+                <a:latin typeface="Golos Text"/>
+                <a:ea typeface="Golos Text"/>
+                <a:cs typeface="Golos Text"/>
+                <a:sym typeface="Golos Text"/>
+              </a:defRPr>
+            </a:lvl8pPr>
+            <a:lvl9pPr marR="0" lvl="8" algn="ctr" rtl="0">
+              <a:lnSpc>
+                <a:spcPct val="100000"/>
+              </a:lnSpc>
+              <a:spcBef>
+                <a:spcPts val="0"/>
+              </a:spcBef>
+              <a:spcAft>
+                <a:spcPts val="0"/>
+              </a:spcAft>
+              <a:buClr>
+                <a:schemeClr val="dk1"/>
+              </a:buClr>
+              <a:buSzPts val="3100"/>
+              <a:buFont typeface="Golos Text"/>
+              <a:buNone/>
+              <a:defRPr sz="3100" b="0" i="0" u="none" strike="noStrike" cap="none">
+                <a:solidFill>
+                  <a:schemeClr val="dk1"/>
+                </a:solidFill>
+                <a:latin typeface="Golos Text"/>
+                <a:ea typeface="Golos Text"/>
+                <a:cs typeface="Golos Text"/>
+                <a:sym typeface="Golos Text"/>
+              </a:defRPr>
+            </a:lvl9pPr>
+          </a:lstStyle>
+          <a:p>
+            <a:r>
+              <a:rPr lang="en-US" sz="2400" dirty="0">
+                <a:solidFill>
+                  <a:schemeClr val="tx1"/>
+                </a:solidFill>
+              </a:rPr>
+              <a:t>Our Work So far</a:t>
+            </a:r>
+          </a:p>
+          <a:p>
+            <a:endParaRPr lang="en-US" sz="2400" dirty="0">
+              <a:solidFill>
+                <a:schemeClr val="accent2"/>
+              </a:solidFill>
+            </a:endParaRPr>
+          </a:p>
+        </p:txBody>
+      </p:sp>
+      <p:grpSp>
+        <p:nvGrpSpPr>
+          <p:cNvPr id="5" name="Google Shape;16527;p95">
+            <a:extLst>
+              <a:ext uri="{FF2B5EF4-FFF2-40B4-BE49-F238E27FC236}">
+                <a16:creationId xmlns:a16="http://schemas.microsoft.com/office/drawing/2014/main" id="{4752F03D-3D59-EDD4-1EDF-103EBF40E5C6}"/>
+              </a:ext>
+            </a:extLst>
+          </p:cNvPr>
+          <p:cNvGrpSpPr/>
+          <p:nvPr/>
+        </p:nvGrpSpPr>
+        <p:grpSpPr>
+          <a:xfrm>
+            <a:off x="2303253" y="87486"/>
+            <a:ext cx="664234" cy="418204"/>
+            <a:chOff x="1341727" y="2483349"/>
+            <a:chExt cx="419913" cy="308109"/>
+          </a:xfrm>
+        </p:grpSpPr>
+        <p:sp>
+          <p:nvSpPr>
+            <p:cNvPr id="6" name="Google Shape;16528;p95">
+              <a:extLst>
+                <a:ext uri="{FF2B5EF4-FFF2-40B4-BE49-F238E27FC236}">
+                  <a16:creationId xmlns:a16="http://schemas.microsoft.com/office/drawing/2014/main" id="{2608EC1E-CF34-1B32-5C9F-E9F6FCBF6CB4}"/>
+                </a:ext>
+              </a:extLst>
+            </p:cNvPr>
+            <p:cNvSpPr/>
+            <p:nvPr/>
+          </p:nvSpPr>
+          <p:spPr>
+            <a:xfrm>
+              <a:off x="1623896" y="2522310"/>
+              <a:ext cx="53488" cy="18605"/>
+            </a:xfrm>
+            <a:custGeom>
+              <a:avLst/>
+              <a:gdLst/>
+              <a:ahLst/>
+              <a:cxnLst/>
+              <a:rect l="l" t="t" r="r" b="b"/>
+              <a:pathLst>
+                <a:path w="1406" h="489" extrusionOk="0">
+                  <a:moveTo>
+                    <a:pt x="167" y="1"/>
+                  </a:moveTo>
+                  <a:cubicBezTo>
+                    <a:pt x="84" y="1"/>
+                    <a:pt x="1" y="72"/>
+                    <a:pt x="1" y="167"/>
+                  </a:cubicBezTo>
+                  <a:cubicBezTo>
+                    <a:pt x="1" y="251"/>
+                    <a:pt x="84" y="322"/>
+                    <a:pt x="167" y="322"/>
+                  </a:cubicBezTo>
+                  <a:cubicBezTo>
+                    <a:pt x="346" y="322"/>
+                    <a:pt x="882" y="358"/>
+                    <a:pt x="1144" y="477"/>
+                  </a:cubicBezTo>
+                  <a:cubicBezTo>
+                    <a:pt x="1167" y="489"/>
+                    <a:pt x="1179" y="489"/>
+                    <a:pt x="1215" y="489"/>
+                  </a:cubicBezTo>
+                  <a:cubicBezTo>
+                    <a:pt x="1275" y="489"/>
+                    <a:pt x="1334" y="465"/>
+                    <a:pt x="1358" y="406"/>
+                  </a:cubicBezTo>
+                  <a:cubicBezTo>
+                    <a:pt x="1406" y="346"/>
+                    <a:pt x="1358" y="239"/>
+                    <a:pt x="1286" y="191"/>
+                  </a:cubicBezTo>
+                  <a:cubicBezTo>
+                    <a:pt x="917" y="1"/>
+                    <a:pt x="203" y="1"/>
+                    <a:pt x="167" y="1"/>
+                  </a:cubicBezTo>
+                  <a:close/>
+                </a:path>
+              </a:pathLst>
+            </a:custGeom>
+            <a:solidFill>
+              <a:srgbClr val="657E93"/>
+            </a:solidFill>
+            <a:ln>
+              <a:noFill/>
+            </a:ln>
+          </p:spPr>
+          <p:txBody>
+            <a:bodyPr spcFirstLastPara="1" wrap="square" lIns="91425" tIns="91425" rIns="91425" bIns="91425" anchor="ctr" anchorCtr="0">
+              <a:noAutofit/>
+            </a:bodyPr>
+            <a:lstStyle/>
+            <a:p>
+              <a:pPr marL="0" lvl="0" indent="0" algn="l" rtl="0">
+                <a:spcBef>
+                  <a:spcPts val="0"/>
+                </a:spcBef>
+                <a:spcAft>
+                  <a:spcPts val="0"/>
+                </a:spcAft>
+                <a:buNone/>
+              </a:pPr>
+              <a:endParaRPr>
+                <a:solidFill>
+                  <a:schemeClr val="accent2"/>
+                </a:solidFill>
+              </a:endParaRPr>
+            </a:p>
+          </p:txBody>
+        </p:sp>
+        <p:sp>
+          <p:nvSpPr>
+            <p:cNvPr id="7" name="Google Shape;16529;p95">
+              <a:extLst>
+                <a:ext uri="{FF2B5EF4-FFF2-40B4-BE49-F238E27FC236}">
+                  <a16:creationId xmlns:a16="http://schemas.microsoft.com/office/drawing/2014/main" id="{A24D5EAA-27CE-050F-F478-1E90FDFE9227}"/>
+                </a:ext>
+              </a:extLst>
+            </p:cNvPr>
+            <p:cNvSpPr/>
+            <p:nvPr/>
+          </p:nvSpPr>
+          <p:spPr>
+            <a:xfrm>
+              <a:off x="1341727" y="2483349"/>
+              <a:ext cx="419913" cy="308109"/>
+            </a:xfrm>
+            <a:custGeom>
+              <a:avLst/>
+              <a:gdLst/>
+              <a:ahLst/>
+              <a:cxnLst/>
+              <a:rect l="l" t="t" r="r" b="b"/>
+              <a:pathLst>
+                <a:path w="11038" h="8098" extrusionOk="0">
+                  <a:moveTo>
+                    <a:pt x="9156" y="501"/>
+                  </a:moveTo>
+                  <a:lnTo>
+                    <a:pt x="9156" y="1168"/>
+                  </a:lnTo>
+                  <a:cubicBezTo>
+                    <a:pt x="9156" y="1275"/>
+                    <a:pt x="9120" y="1394"/>
+                    <a:pt x="9073" y="1489"/>
+                  </a:cubicBezTo>
+                  <a:lnTo>
+                    <a:pt x="9001" y="1644"/>
+                  </a:lnTo>
+                  <a:cubicBezTo>
+                    <a:pt x="8989" y="1680"/>
+                    <a:pt x="8989" y="1692"/>
+                    <a:pt x="8989" y="1727"/>
+                  </a:cubicBezTo>
+                  <a:lnTo>
+                    <a:pt x="8989" y="2061"/>
+                  </a:lnTo>
+                  <a:cubicBezTo>
+                    <a:pt x="8989" y="2299"/>
+                    <a:pt x="8894" y="2525"/>
+                    <a:pt x="8715" y="2692"/>
+                  </a:cubicBezTo>
+                  <a:cubicBezTo>
+                    <a:pt x="8537" y="2858"/>
+                    <a:pt x="8311" y="2942"/>
+                    <a:pt x="8072" y="2942"/>
+                  </a:cubicBezTo>
+                  <a:cubicBezTo>
+                    <a:pt x="7620" y="2918"/>
+                    <a:pt x="7227" y="2513"/>
+                    <a:pt x="7227" y="2025"/>
+                  </a:cubicBezTo>
+                  <a:lnTo>
+                    <a:pt x="7227" y="1727"/>
+                  </a:lnTo>
+                  <a:cubicBezTo>
+                    <a:pt x="7227" y="1692"/>
+                    <a:pt x="7227" y="1680"/>
+                    <a:pt x="7215" y="1644"/>
+                  </a:cubicBezTo>
+                  <a:lnTo>
+                    <a:pt x="7108" y="1453"/>
+                  </a:lnTo>
+                  <a:cubicBezTo>
+                    <a:pt x="7084" y="1382"/>
+                    <a:pt x="7049" y="1311"/>
+                    <a:pt x="7049" y="1215"/>
+                  </a:cubicBezTo>
+                  <a:lnTo>
+                    <a:pt x="7049" y="1203"/>
+                  </a:lnTo>
+                  <a:cubicBezTo>
+                    <a:pt x="7049" y="810"/>
+                    <a:pt x="7370" y="501"/>
+                    <a:pt x="7751" y="501"/>
+                  </a:cubicBezTo>
+                  <a:close/>
+                  <a:moveTo>
+                    <a:pt x="3274" y="322"/>
+                  </a:moveTo>
+                  <a:cubicBezTo>
+                    <a:pt x="3548" y="322"/>
+                    <a:pt x="3786" y="429"/>
+                    <a:pt x="3989" y="632"/>
+                  </a:cubicBezTo>
+                  <a:cubicBezTo>
+                    <a:pt x="4179" y="834"/>
+                    <a:pt x="4298" y="1108"/>
+                    <a:pt x="4310" y="1394"/>
+                  </a:cubicBezTo>
+                  <a:cubicBezTo>
+                    <a:pt x="4346" y="1739"/>
+                    <a:pt x="4441" y="2442"/>
+                    <a:pt x="4608" y="2858"/>
+                  </a:cubicBezTo>
+                  <a:cubicBezTo>
+                    <a:pt x="4358" y="2942"/>
+                    <a:pt x="3870" y="3096"/>
+                    <a:pt x="3274" y="3096"/>
+                  </a:cubicBezTo>
+                  <a:cubicBezTo>
+                    <a:pt x="3253" y="3097"/>
+                    <a:pt x="3232" y="3097"/>
+                    <a:pt x="3210" y="3097"/>
+                  </a:cubicBezTo>
+                  <a:cubicBezTo>
+                    <a:pt x="2654" y="3097"/>
+                    <a:pt x="2182" y="2951"/>
+                    <a:pt x="1953" y="2870"/>
+                  </a:cubicBezTo>
+                  <a:cubicBezTo>
+                    <a:pt x="2096" y="2442"/>
+                    <a:pt x="2215" y="1739"/>
+                    <a:pt x="2226" y="1394"/>
+                  </a:cubicBezTo>
+                  <a:cubicBezTo>
+                    <a:pt x="2250" y="1096"/>
+                    <a:pt x="2357" y="834"/>
+                    <a:pt x="2560" y="632"/>
+                  </a:cubicBezTo>
+                  <a:cubicBezTo>
+                    <a:pt x="2750" y="429"/>
+                    <a:pt x="3000" y="322"/>
+                    <a:pt x="3274" y="322"/>
+                  </a:cubicBezTo>
+                  <a:close/>
+                  <a:moveTo>
+                    <a:pt x="7751" y="3192"/>
+                  </a:moveTo>
+                  <a:cubicBezTo>
+                    <a:pt x="7858" y="3227"/>
+                    <a:pt x="7965" y="3251"/>
+                    <a:pt x="8084" y="3251"/>
+                  </a:cubicBezTo>
+                  <a:lnTo>
+                    <a:pt x="8120" y="3251"/>
+                  </a:lnTo>
+                  <a:cubicBezTo>
+                    <a:pt x="8239" y="3251"/>
+                    <a:pt x="8358" y="3239"/>
+                    <a:pt x="8477" y="3192"/>
+                  </a:cubicBezTo>
+                  <a:lnTo>
+                    <a:pt x="8477" y="3192"/>
+                  </a:lnTo>
+                  <a:cubicBezTo>
+                    <a:pt x="8465" y="3251"/>
+                    <a:pt x="8477" y="3299"/>
+                    <a:pt x="8501" y="3346"/>
+                  </a:cubicBezTo>
+                  <a:lnTo>
+                    <a:pt x="8358" y="3477"/>
+                  </a:lnTo>
+                  <a:cubicBezTo>
+                    <a:pt x="8287" y="3549"/>
+                    <a:pt x="8203" y="3585"/>
+                    <a:pt x="8108" y="3585"/>
+                  </a:cubicBezTo>
+                  <a:cubicBezTo>
+                    <a:pt x="8025" y="3585"/>
+                    <a:pt x="7930" y="3549"/>
+                    <a:pt x="7858" y="3477"/>
+                  </a:cubicBezTo>
+                  <a:lnTo>
+                    <a:pt x="7727" y="3346"/>
+                  </a:lnTo>
+                  <a:cubicBezTo>
+                    <a:pt x="7739" y="3299"/>
+                    <a:pt x="7751" y="3251"/>
+                    <a:pt x="7751" y="3192"/>
+                  </a:cubicBezTo>
+                  <a:close/>
+                  <a:moveTo>
+                    <a:pt x="3691" y="3418"/>
+                  </a:moveTo>
+                  <a:cubicBezTo>
+                    <a:pt x="3750" y="3537"/>
+                    <a:pt x="3870" y="3644"/>
+                    <a:pt x="4001" y="3668"/>
+                  </a:cubicBezTo>
+                  <a:lnTo>
+                    <a:pt x="4584" y="3835"/>
+                  </a:lnTo>
+                  <a:cubicBezTo>
+                    <a:pt x="4727" y="3882"/>
+                    <a:pt x="4834" y="4013"/>
+                    <a:pt x="4834" y="4180"/>
+                  </a:cubicBezTo>
+                  <a:lnTo>
+                    <a:pt x="4834" y="5680"/>
+                  </a:lnTo>
+                  <a:cubicBezTo>
+                    <a:pt x="4834" y="5871"/>
+                    <a:pt x="4667" y="6037"/>
+                    <a:pt x="4477" y="6037"/>
+                  </a:cubicBezTo>
+                  <a:lnTo>
+                    <a:pt x="4477" y="4811"/>
+                  </a:lnTo>
+                  <a:cubicBezTo>
+                    <a:pt x="4477" y="4549"/>
+                    <a:pt x="4239" y="4311"/>
+                    <a:pt x="3977" y="4311"/>
+                  </a:cubicBezTo>
+                  <a:lnTo>
+                    <a:pt x="2584" y="4311"/>
+                  </a:lnTo>
+                  <a:cubicBezTo>
+                    <a:pt x="2310" y="4311"/>
+                    <a:pt x="2084" y="4537"/>
+                    <a:pt x="2084" y="4811"/>
+                  </a:cubicBezTo>
+                  <a:lnTo>
+                    <a:pt x="2084" y="6037"/>
+                  </a:lnTo>
+                  <a:lnTo>
+                    <a:pt x="2072" y="6037"/>
+                  </a:lnTo>
+                  <a:cubicBezTo>
+                    <a:pt x="1869" y="6037"/>
+                    <a:pt x="1715" y="5871"/>
+                    <a:pt x="1715" y="5680"/>
+                  </a:cubicBezTo>
+                  <a:lnTo>
+                    <a:pt x="1715" y="4180"/>
+                  </a:lnTo>
+                  <a:cubicBezTo>
+                    <a:pt x="1715" y="4013"/>
+                    <a:pt x="1810" y="3882"/>
+                    <a:pt x="1965" y="3835"/>
+                  </a:cubicBezTo>
+                  <a:lnTo>
+                    <a:pt x="2548" y="3668"/>
+                  </a:lnTo>
+                  <a:cubicBezTo>
+                    <a:pt x="2679" y="3620"/>
+                    <a:pt x="2798" y="3537"/>
+                    <a:pt x="2858" y="3418"/>
+                  </a:cubicBezTo>
+                  <a:cubicBezTo>
+                    <a:pt x="2988" y="3430"/>
+                    <a:pt x="3119" y="3430"/>
+                    <a:pt x="3274" y="3430"/>
+                  </a:cubicBezTo>
+                  <a:cubicBezTo>
+                    <a:pt x="3417" y="3430"/>
+                    <a:pt x="3560" y="3418"/>
+                    <a:pt x="3691" y="3418"/>
+                  </a:cubicBezTo>
+                  <a:close/>
+                  <a:moveTo>
+                    <a:pt x="8668" y="3608"/>
+                  </a:moveTo>
+                  <a:cubicBezTo>
+                    <a:pt x="8715" y="3644"/>
+                    <a:pt x="8763" y="3656"/>
+                    <a:pt x="8811" y="3668"/>
+                  </a:cubicBezTo>
+                  <a:lnTo>
+                    <a:pt x="9382" y="3835"/>
+                  </a:lnTo>
+                  <a:cubicBezTo>
+                    <a:pt x="9537" y="3882"/>
+                    <a:pt x="9644" y="4013"/>
+                    <a:pt x="9644" y="4180"/>
+                  </a:cubicBezTo>
+                  <a:lnTo>
+                    <a:pt x="9644" y="5680"/>
+                  </a:lnTo>
+                  <a:cubicBezTo>
+                    <a:pt x="9644" y="5871"/>
+                    <a:pt x="9477" y="6037"/>
+                    <a:pt x="9287" y="6037"/>
+                  </a:cubicBezTo>
+                  <a:lnTo>
+                    <a:pt x="8584" y="6037"/>
+                  </a:lnTo>
+                  <a:lnTo>
+                    <a:pt x="8584" y="6025"/>
+                  </a:lnTo>
+                  <a:lnTo>
+                    <a:pt x="8584" y="5668"/>
+                  </a:lnTo>
+                  <a:lnTo>
+                    <a:pt x="9120" y="5668"/>
+                  </a:lnTo>
+                  <a:cubicBezTo>
+                    <a:pt x="9204" y="5668"/>
+                    <a:pt x="9287" y="5597"/>
+                    <a:pt x="9287" y="5502"/>
+                  </a:cubicBezTo>
+                  <a:lnTo>
+                    <a:pt x="9287" y="4466"/>
+                  </a:lnTo>
+                  <a:cubicBezTo>
+                    <a:pt x="9287" y="4370"/>
+                    <a:pt x="9204" y="4299"/>
+                    <a:pt x="9120" y="4299"/>
+                  </a:cubicBezTo>
+                  <a:cubicBezTo>
+                    <a:pt x="9025" y="4299"/>
+                    <a:pt x="8954" y="4370"/>
+                    <a:pt x="8954" y="4466"/>
+                  </a:cubicBezTo>
+                  <a:lnTo>
+                    <a:pt x="8954" y="5335"/>
+                  </a:lnTo>
+                  <a:lnTo>
+                    <a:pt x="8584" y="5335"/>
+                  </a:lnTo>
+                  <a:lnTo>
+                    <a:pt x="8584" y="4644"/>
+                  </a:lnTo>
+                  <a:cubicBezTo>
+                    <a:pt x="8584" y="4466"/>
+                    <a:pt x="8430" y="4311"/>
+                    <a:pt x="8251" y="4311"/>
+                  </a:cubicBezTo>
+                  <a:lnTo>
+                    <a:pt x="6513" y="4311"/>
+                  </a:lnTo>
+                  <a:lnTo>
+                    <a:pt x="6513" y="4180"/>
+                  </a:lnTo>
+                  <a:lnTo>
+                    <a:pt x="6548" y="4180"/>
+                  </a:lnTo>
+                  <a:cubicBezTo>
+                    <a:pt x="6548" y="4013"/>
+                    <a:pt x="6644" y="3882"/>
+                    <a:pt x="6798" y="3835"/>
+                  </a:cubicBezTo>
+                  <a:lnTo>
+                    <a:pt x="7382" y="3668"/>
+                  </a:lnTo>
+                  <a:cubicBezTo>
+                    <a:pt x="7418" y="3656"/>
+                    <a:pt x="7477" y="3644"/>
+                    <a:pt x="7513" y="3608"/>
+                  </a:cubicBezTo>
+                  <a:lnTo>
+                    <a:pt x="7620" y="3716"/>
+                  </a:lnTo>
+                  <a:cubicBezTo>
+                    <a:pt x="7751" y="3847"/>
+                    <a:pt x="7918" y="3906"/>
+                    <a:pt x="8096" y="3906"/>
+                  </a:cubicBezTo>
+                  <a:cubicBezTo>
+                    <a:pt x="8275" y="3906"/>
+                    <a:pt x="8453" y="3835"/>
+                    <a:pt x="8573" y="3716"/>
+                  </a:cubicBezTo>
+                  <a:lnTo>
+                    <a:pt x="8668" y="3608"/>
+                  </a:lnTo>
+                  <a:close/>
+                  <a:moveTo>
+                    <a:pt x="8287" y="4644"/>
+                  </a:moveTo>
+                  <a:cubicBezTo>
+                    <a:pt x="8287" y="4644"/>
+                    <a:pt x="8299" y="4644"/>
+                    <a:pt x="8299" y="4656"/>
+                  </a:cubicBezTo>
+                  <a:lnTo>
+                    <a:pt x="8299" y="6037"/>
+                  </a:lnTo>
+                  <a:cubicBezTo>
+                    <a:pt x="8299" y="6037"/>
+                    <a:pt x="8299" y="6049"/>
+                    <a:pt x="8287" y="6049"/>
+                  </a:cubicBezTo>
+                  <a:lnTo>
+                    <a:pt x="6215" y="6049"/>
+                  </a:lnTo>
+                  <a:cubicBezTo>
+                    <a:pt x="6215" y="6049"/>
+                    <a:pt x="6203" y="6049"/>
+                    <a:pt x="6203" y="6037"/>
+                  </a:cubicBezTo>
+                  <a:lnTo>
+                    <a:pt x="6203" y="4656"/>
+                  </a:lnTo>
+                  <a:lnTo>
+                    <a:pt x="8287" y="4644"/>
+                  </a:lnTo>
+                  <a:close/>
+                  <a:moveTo>
+                    <a:pt x="2084" y="6371"/>
+                  </a:moveTo>
+                  <a:lnTo>
+                    <a:pt x="2084" y="6740"/>
+                  </a:lnTo>
+                  <a:lnTo>
+                    <a:pt x="679" y="6740"/>
+                  </a:lnTo>
+                  <a:lnTo>
+                    <a:pt x="679" y="6371"/>
+                  </a:lnTo>
+                  <a:close/>
+                  <a:moveTo>
+                    <a:pt x="10382" y="6371"/>
+                  </a:moveTo>
+                  <a:lnTo>
+                    <a:pt x="10382" y="6740"/>
+                  </a:lnTo>
+                  <a:lnTo>
+                    <a:pt x="4477" y="6740"/>
+                  </a:lnTo>
+                  <a:lnTo>
+                    <a:pt x="4477" y="6371"/>
+                  </a:lnTo>
+                  <a:close/>
+                  <a:moveTo>
+                    <a:pt x="3953" y="4644"/>
+                  </a:moveTo>
+                  <a:cubicBezTo>
+                    <a:pt x="4060" y="4644"/>
+                    <a:pt x="4131" y="4728"/>
+                    <a:pt x="4131" y="4823"/>
+                  </a:cubicBezTo>
+                  <a:lnTo>
+                    <a:pt x="4131" y="7085"/>
+                  </a:lnTo>
+                  <a:lnTo>
+                    <a:pt x="2393" y="7085"/>
+                  </a:lnTo>
+                  <a:lnTo>
+                    <a:pt x="2393" y="4823"/>
+                  </a:lnTo>
+                  <a:cubicBezTo>
+                    <a:pt x="2393" y="4716"/>
+                    <a:pt x="2488" y="4644"/>
+                    <a:pt x="2572" y="4644"/>
+                  </a:cubicBezTo>
+                  <a:close/>
+                  <a:moveTo>
+                    <a:pt x="3274" y="1"/>
+                  </a:moveTo>
+                  <a:cubicBezTo>
+                    <a:pt x="2548" y="1"/>
+                    <a:pt x="1965" y="596"/>
+                    <a:pt x="1905" y="1370"/>
+                  </a:cubicBezTo>
+                  <a:cubicBezTo>
+                    <a:pt x="1869" y="1692"/>
+                    <a:pt x="1774" y="2346"/>
+                    <a:pt x="1631" y="2751"/>
+                  </a:cubicBezTo>
+                  <a:cubicBezTo>
+                    <a:pt x="1607" y="2835"/>
+                    <a:pt x="1607" y="2930"/>
+                    <a:pt x="1655" y="3001"/>
+                  </a:cubicBezTo>
+                  <a:cubicBezTo>
+                    <a:pt x="1691" y="3073"/>
+                    <a:pt x="1750" y="3156"/>
+                    <a:pt x="1845" y="3180"/>
+                  </a:cubicBezTo>
+                  <a:cubicBezTo>
+                    <a:pt x="1988" y="3227"/>
+                    <a:pt x="2215" y="3299"/>
+                    <a:pt x="2488" y="3358"/>
+                  </a:cubicBezTo>
+                  <a:lnTo>
+                    <a:pt x="2465" y="3358"/>
+                  </a:lnTo>
+                  <a:lnTo>
+                    <a:pt x="1893" y="3525"/>
+                  </a:lnTo>
+                  <a:cubicBezTo>
+                    <a:pt x="1595" y="3608"/>
+                    <a:pt x="1393" y="3882"/>
+                    <a:pt x="1393" y="4180"/>
+                  </a:cubicBezTo>
+                  <a:lnTo>
+                    <a:pt x="1393" y="5680"/>
+                  </a:lnTo>
+                  <a:cubicBezTo>
+                    <a:pt x="1393" y="5811"/>
+                    <a:pt x="1429" y="5930"/>
+                    <a:pt x="1500" y="6037"/>
+                  </a:cubicBezTo>
+                  <a:lnTo>
+                    <a:pt x="167" y="6037"/>
+                  </a:lnTo>
+                  <a:cubicBezTo>
+                    <a:pt x="71" y="6037"/>
+                    <a:pt x="0" y="6109"/>
+                    <a:pt x="0" y="6204"/>
+                  </a:cubicBezTo>
+                  <a:cubicBezTo>
+                    <a:pt x="0" y="6287"/>
+                    <a:pt x="71" y="6371"/>
+                    <a:pt x="167" y="6371"/>
+                  </a:cubicBezTo>
+                  <a:lnTo>
+                    <a:pt x="345" y="6371"/>
+                  </a:lnTo>
+                  <a:lnTo>
+                    <a:pt x="345" y="7930"/>
+                  </a:lnTo>
+                  <a:cubicBezTo>
+                    <a:pt x="345" y="8014"/>
+                    <a:pt x="417" y="8097"/>
+                    <a:pt x="500" y="8097"/>
+                  </a:cubicBezTo>
+                  <a:cubicBezTo>
+                    <a:pt x="595" y="8097"/>
+                    <a:pt x="667" y="8014"/>
+                    <a:pt x="667" y="7930"/>
+                  </a:cubicBezTo>
+                  <a:lnTo>
+                    <a:pt x="667" y="7049"/>
+                  </a:lnTo>
+                  <a:lnTo>
+                    <a:pt x="2072" y="7049"/>
+                  </a:lnTo>
+                  <a:lnTo>
+                    <a:pt x="2072" y="7930"/>
+                  </a:lnTo>
+                  <a:cubicBezTo>
+                    <a:pt x="2072" y="8014"/>
+                    <a:pt x="2143" y="8097"/>
+                    <a:pt x="2226" y="8097"/>
+                  </a:cubicBezTo>
+                  <a:cubicBezTo>
+                    <a:pt x="2322" y="8097"/>
+                    <a:pt x="2393" y="8014"/>
+                    <a:pt x="2393" y="7930"/>
+                  </a:cubicBezTo>
+                  <a:lnTo>
+                    <a:pt x="2393" y="7395"/>
+                  </a:lnTo>
+                  <a:lnTo>
+                    <a:pt x="4155" y="7395"/>
+                  </a:lnTo>
+                  <a:lnTo>
+                    <a:pt x="4155" y="7930"/>
+                  </a:lnTo>
+                  <a:cubicBezTo>
+                    <a:pt x="4155" y="8014"/>
+                    <a:pt x="4227" y="8097"/>
+                    <a:pt x="4310" y="8097"/>
+                  </a:cubicBezTo>
+                  <a:cubicBezTo>
+                    <a:pt x="4405" y="8097"/>
+                    <a:pt x="4477" y="8014"/>
+                    <a:pt x="4477" y="7930"/>
+                  </a:cubicBezTo>
+                  <a:lnTo>
+                    <a:pt x="4477" y="7049"/>
+                  </a:lnTo>
+                  <a:lnTo>
+                    <a:pt x="10370" y="7049"/>
+                  </a:lnTo>
+                  <a:lnTo>
+                    <a:pt x="10370" y="7930"/>
+                  </a:lnTo>
+                  <a:cubicBezTo>
+                    <a:pt x="10370" y="8014"/>
+                    <a:pt x="10442" y="8097"/>
+                    <a:pt x="10537" y="8097"/>
+                  </a:cubicBezTo>
+                  <a:cubicBezTo>
+                    <a:pt x="10620" y="8097"/>
+                    <a:pt x="10704" y="8014"/>
+                    <a:pt x="10704" y="7930"/>
+                  </a:cubicBezTo>
+                  <a:lnTo>
+                    <a:pt x="10704" y="6371"/>
+                  </a:lnTo>
+                  <a:lnTo>
+                    <a:pt x="10882" y="6371"/>
+                  </a:lnTo>
+                  <a:cubicBezTo>
+                    <a:pt x="10966" y="6371"/>
+                    <a:pt x="11037" y="6287"/>
+                    <a:pt x="11037" y="6204"/>
+                  </a:cubicBezTo>
+                  <a:cubicBezTo>
+                    <a:pt x="11037" y="6109"/>
+                    <a:pt x="10966" y="6037"/>
+                    <a:pt x="10882" y="6037"/>
+                  </a:cubicBezTo>
+                  <a:lnTo>
+                    <a:pt x="9894" y="6037"/>
+                  </a:lnTo>
+                  <a:cubicBezTo>
+                    <a:pt x="9954" y="5930"/>
+                    <a:pt x="10001" y="5811"/>
+                    <a:pt x="10001" y="5680"/>
+                  </a:cubicBezTo>
+                  <a:lnTo>
+                    <a:pt x="10001" y="4180"/>
+                  </a:lnTo>
+                  <a:cubicBezTo>
+                    <a:pt x="10001" y="3882"/>
+                    <a:pt x="9787" y="3608"/>
+                    <a:pt x="9501" y="3525"/>
+                  </a:cubicBezTo>
+                  <a:lnTo>
+                    <a:pt x="8930" y="3358"/>
+                  </a:lnTo>
+                  <a:cubicBezTo>
+                    <a:pt x="8858" y="3335"/>
+                    <a:pt x="8799" y="3275"/>
+                    <a:pt x="8799" y="3180"/>
+                  </a:cubicBezTo>
+                  <a:lnTo>
+                    <a:pt x="8799" y="3049"/>
+                  </a:lnTo>
+                  <a:cubicBezTo>
+                    <a:pt x="8858" y="3001"/>
+                    <a:pt x="8894" y="2977"/>
+                    <a:pt x="8942" y="2918"/>
+                  </a:cubicBezTo>
+                  <a:cubicBezTo>
+                    <a:pt x="9180" y="2692"/>
+                    <a:pt x="9299" y="2382"/>
+                    <a:pt x="9299" y="2049"/>
+                  </a:cubicBezTo>
+                  <a:lnTo>
+                    <a:pt x="9299" y="1739"/>
+                  </a:lnTo>
+                  <a:lnTo>
+                    <a:pt x="9358" y="1608"/>
+                  </a:lnTo>
+                  <a:cubicBezTo>
+                    <a:pt x="9430" y="1453"/>
+                    <a:pt x="9465" y="1311"/>
+                    <a:pt x="9465" y="1144"/>
+                  </a:cubicBezTo>
+                  <a:lnTo>
+                    <a:pt x="9465" y="310"/>
+                  </a:lnTo>
+                  <a:cubicBezTo>
+                    <a:pt x="9465" y="215"/>
+                    <a:pt x="9382" y="144"/>
+                    <a:pt x="9299" y="144"/>
+                  </a:cubicBezTo>
+                  <a:lnTo>
+                    <a:pt x="7739" y="144"/>
+                  </a:lnTo>
+                  <a:cubicBezTo>
+                    <a:pt x="7168" y="144"/>
+                    <a:pt x="6703" y="608"/>
+                    <a:pt x="6703" y="1168"/>
+                  </a:cubicBezTo>
+                  <a:lnTo>
+                    <a:pt x="6703" y="1191"/>
+                  </a:lnTo>
+                  <a:cubicBezTo>
+                    <a:pt x="6703" y="1322"/>
+                    <a:pt x="6739" y="1453"/>
+                    <a:pt x="6798" y="1572"/>
+                  </a:cubicBezTo>
+                  <a:lnTo>
+                    <a:pt x="6894" y="1739"/>
+                  </a:lnTo>
+                  <a:lnTo>
+                    <a:pt x="6894" y="2001"/>
+                  </a:lnTo>
+                  <a:cubicBezTo>
+                    <a:pt x="6894" y="2418"/>
+                    <a:pt x="7096" y="2799"/>
+                    <a:pt x="7406" y="3037"/>
+                  </a:cubicBezTo>
+                  <a:lnTo>
+                    <a:pt x="7406" y="3180"/>
+                  </a:lnTo>
+                  <a:cubicBezTo>
+                    <a:pt x="7406" y="3251"/>
+                    <a:pt x="7346" y="3335"/>
+                    <a:pt x="7275" y="3358"/>
+                  </a:cubicBezTo>
+                  <a:lnTo>
+                    <a:pt x="6691" y="3525"/>
+                  </a:lnTo>
+                  <a:cubicBezTo>
+                    <a:pt x="6394" y="3608"/>
+                    <a:pt x="6203" y="3882"/>
+                    <a:pt x="6203" y="4180"/>
+                  </a:cubicBezTo>
+                  <a:lnTo>
+                    <a:pt x="6203" y="4311"/>
+                  </a:lnTo>
+                  <a:lnTo>
+                    <a:pt x="6191" y="4311"/>
+                  </a:lnTo>
+                  <a:cubicBezTo>
+                    <a:pt x="6013" y="4311"/>
+                    <a:pt x="5858" y="4466"/>
+                    <a:pt x="5858" y="4644"/>
+                  </a:cubicBezTo>
+                  <a:lnTo>
+                    <a:pt x="5858" y="6025"/>
+                  </a:lnTo>
+                  <a:lnTo>
+                    <a:pt x="5858" y="6037"/>
+                  </a:lnTo>
+                  <a:lnTo>
+                    <a:pt x="5048" y="6037"/>
+                  </a:lnTo>
+                  <a:cubicBezTo>
+                    <a:pt x="5108" y="5930"/>
+                    <a:pt x="5144" y="5811"/>
+                    <a:pt x="5144" y="5680"/>
+                  </a:cubicBezTo>
+                  <a:lnTo>
+                    <a:pt x="5144" y="4180"/>
+                  </a:lnTo>
+                  <a:cubicBezTo>
+                    <a:pt x="5144" y="3882"/>
+                    <a:pt x="4941" y="3608"/>
+                    <a:pt x="4655" y="3525"/>
+                  </a:cubicBezTo>
+                  <a:lnTo>
+                    <a:pt x="4072" y="3358"/>
+                  </a:lnTo>
+                  <a:lnTo>
+                    <a:pt x="4060" y="3358"/>
+                  </a:lnTo>
+                  <a:cubicBezTo>
+                    <a:pt x="4346" y="3299"/>
+                    <a:pt x="4560" y="3239"/>
+                    <a:pt x="4703" y="3180"/>
+                  </a:cubicBezTo>
+                  <a:cubicBezTo>
+                    <a:pt x="4786" y="3156"/>
+                    <a:pt x="4846" y="3096"/>
+                    <a:pt x="4893" y="3001"/>
+                  </a:cubicBezTo>
+                  <a:cubicBezTo>
+                    <a:pt x="4941" y="2930"/>
+                    <a:pt x="4941" y="2835"/>
+                    <a:pt x="4905" y="2751"/>
+                  </a:cubicBezTo>
+                  <a:cubicBezTo>
+                    <a:pt x="4763" y="2358"/>
+                    <a:pt x="4655" y="1692"/>
+                    <a:pt x="4643" y="1370"/>
+                  </a:cubicBezTo>
+                  <a:cubicBezTo>
+                    <a:pt x="4584" y="572"/>
+                    <a:pt x="4001" y="1"/>
+                    <a:pt x="3274" y="1"/>
+                  </a:cubicBezTo>
+                  <a:close/>
+                </a:path>
+              </a:pathLst>
+            </a:custGeom>
+            <a:solidFill>
+              <a:srgbClr val="657E93"/>
+            </a:solidFill>
+            <a:ln>
+              <a:noFill/>
+            </a:ln>
+          </p:spPr>
+          <p:txBody>
+            <a:bodyPr spcFirstLastPara="1" wrap="square" lIns="91425" tIns="91425" rIns="91425" bIns="91425" anchor="ctr" anchorCtr="0">
+              <a:noAutofit/>
+            </a:bodyPr>
+            <a:lstStyle/>
+            <a:p>
+              <a:pPr marL="0" lvl="0" indent="0" algn="l" rtl="0">
+                <a:spcBef>
+                  <a:spcPts val="0"/>
+                </a:spcBef>
+                <a:spcAft>
+                  <a:spcPts val="0"/>
+                </a:spcAft>
+                <a:buNone/>
+              </a:pPr>
+              <a:endParaRPr>
+                <a:solidFill>
+                  <a:schemeClr val="accent2"/>
+                </a:solidFill>
+              </a:endParaRPr>
+            </a:p>
+          </p:txBody>
+        </p:sp>
+        <p:sp>
+          <p:nvSpPr>
+            <p:cNvPr id="8" name="Google Shape;16530;p95">
+              <a:extLst>
+                <a:ext uri="{FF2B5EF4-FFF2-40B4-BE49-F238E27FC236}">
+                  <a16:creationId xmlns:a16="http://schemas.microsoft.com/office/drawing/2014/main" id="{BD773F22-CE2F-7E1B-8AA9-82D35518965D}"/>
+                </a:ext>
+              </a:extLst>
+            </p:cNvPr>
+            <p:cNvSpPr/>
+            <p:nvPr/>
+          </p:nvSpPr>
+          <p:spPr>
+            <a:xfrm>
+              <a:off x="1611228" y="2679979"/>
+              <a:ext cx="12250" cy="12708"/>
+            </a:xfrm>
+            <a:custGeom>
+              <a:avLst/>
+              <a:gdLst/>
+              <a:ahLst/>
+              <a:cxnLst/>
+              <a:rect l="l" t="t" r="r" b="b"/>
+              <a:pathLst>
+                <a:path w="322" h="334" extrusionOk="0">
+                  <a:moveTo>
+                    <a:pt x="167" y="0"/>
+                  </a:moveTo>
+                  <a:cubicBezTo>
+                    <a:pt x="72" y="0"/>
+                    <a:pt x="0" y="83"/>
+                    <a:pt x="0" y="167"/>
+                  </a:cubicBezTo>
+                  <a:cubicBezTo>
+                    <a:pt x="0" y="262"/>
+                    <a:pt x="72" y="334"/>
+                    <a:pt x="167" y="334"/>
+                  </a:cubicBezTo>
+                  <a:cubicBezTo>
+                    <a:pt x="250" y="334"/>
+                    <a:pt x="322" y="262"/>
+                    <a:pt x="322" y="167"/>
+                  </a:cubicBezTo>
+                  <a:cubicBezTo>
+                    <a:pt x="322" y="83"/>
+                    <a:pt x="250" y="0"/>
+                    <a:pt x="167" y="0"/>
+                  </a:cubicBezTo>
+                  <a:close/>
+                </a:path>
+              </a:pathLst>
+            </a:custGeom>
+            <a:solidFill>
+              <a:srgbClr val="657E93"/>
+            </a:solidFill>
+            <a:ln>
+              <a:noFill/>
+            </a:ln>
+          </p:spPr>
+          <p:txBody>
+            <a:bodyPr spcFirstLastPara="1" wrap="square" lIns="91425" tIns="91425" rIns="91425" bIns="91425" anchor="ctr" anchorCtr="0">
+              <a:noAutofit/>
+            </a:bodyPr>
+            <a:lstStyle/>
+            <a:p>
+              <a:pPr marL="0" lvl="0" indent="0" algn="l" rtl="0">
+                <a:spcBef>
+                  <a:spcPts val="0"/>
+                </a:spcBef>
+                <a:spcAft>
+                  <a:spcPts val="0"/>
+                </a:spcAft>
+                <a:buNone/>
+              </a:pPr>
+              <a:endParaRPr>
+                <a:solidFill>
+                  <a:schemeClr val="accent2"/>
+                </a:solidFill>
+              </a:endParaRPr>
+            </a:p>
+          </p:txBody>
+        </p:sp>
+      </p:grpSp>
+      <p:pic>
+        <p:nvPicPr>
+          <p:cNvPr id="10" name="Algo.mp4">
+            <a:hlinkClick r:id="" action="ppaction://media"/>
+            <a:extLst>
+              <a:ext uri="{FF2B5EF4-FFF2-40B4-BE49-F238E27FC236}">
+                <a16:creationId xmlns:a16="http://schemas.microsoft.com/office/drawing/2014/main" id="{3549F2B6-4BE1-B931-C894-2FAC9A3BECD5}"/>
+              </a:ext>
+            </a:extLst>
+          </p:cNvPr>
+          <p:cNvPicPr>
+            <a:picLocks noChangeAspect="1"/>
+          </p:cNvPicPr>
+          <p:nvPr>
+            <a:videoFile r:link="rId4"/>
+            <p:extLst>
+              <p:ext uri="{DAA4B4D4-6D71-4841-9C94-3DE7FCFB9230}">
+                <p14:media xmlns:p14="http://schemas.microsoft.com/office/powerpoint/2010/main" r:embed="rId3"/>
+              </p:ext>
+            </p:extLst>
+          </p:nvPr>
+        </p:nvPicPr>
+        <p:blipFill>
+          <a:blip r:embed="rId8"/>
+          <a:stretch>
+            <a:fillRect/>
+          </a:stretch>
+        </p:blipFill>
+        <p:spPr>
+          <a:xfrm>
+            <a:off x="8169636" y="2931491"/>
+            <a:ext cx="3438500" cy="2750800"/>
+          </a:xfrm>
+          <a:prstGeom prst="rect">
+            <a:avLst/>
+          </a:prstGeom>
+          <a:solidFill>
+            <a:srgbClr val="FFFFFF">
+              <a:shade val="85000"/>
+            </a:srgbClr>
+          </a:solidFill>
+          <a:ln w="88900" cap="sq">
+            <a:solidFill>
+              <a:srgbClr val="FFFFFF"/>
+            </a:solidFill>
+            <a:prstDash val="solid"/>
+            <a:miter lim="800000"/>
+          </a:ln>
+          <a:effectLst>
+            <a:outerShdw blurRad="55000" dist="18000" dir="5400000" algn="tl" rotWithShape="0">
+              <a:srgbClr val="000000">
+                <a:alpha val="40000"/>
+              </a:srgbClr>
+            </a:outerShdw>
+          </a:effectLst>
+          <a:scene3d>
+            <a:camera prst="orthographicFront"/>
+            <a:lightRig rig="twoPt" dir="t">
+              <a:rot lat="0" lon="0" rev="7200000"/>
+            </a:lightRig>
+          </a:scene3d>
+          <a:sp3d>
+            <a:bevelT w="25400" h="19050"/>
+            <a:contourClr>
+              <a:srgbClr val="FFFFFF"/>
+            </a:contourClr>
+          </a:sp3d>
+        </p:spPr>
+      </p:pic>
+      <p:pic>
+        <p:nvPicPr>
+          <p:cNvPr id="13" name="Orig.mp4">
+            <a:hlinkClick r:id="" action="ppaction://media"/>
+            <a:extLst>
+              <a:ext uri="{FF2B5EF4-FFF2-40B4-BE49-F238E27FC236}">
+                <a16:creationId xmlns:a16="http://schemas.microsoft.com/office/drawing/2014/main" id="{FAD8DBB3-C8E2-005E-C7AE-7F872A5728DF}"/>
+              </a:ext>
+            </a:extLst>
+          </p:cNvPr>
+          <p:cNvPicPr>
+            <a:picLocks noChangeAspect="1"/>
+          </p:cNvPicPr>
+          <p:nvPr>
+            <a:videoFile r:link="rId6"/>
+            <p:extLst>
+              <p:ext uri="{DAA4B4D4-6D71-4841-9C94-3DE7FCFB9230}">
+                <p14:media xmlns:p14="http://schemas.microsoft.com/office/powerpoint/2010/main" r:embed="rId5"/>
+              </p:ext>
+            </p:extLst>
+          </p:nvPr>
+        </p:nvPicPr>
+        <p:blipFill>
+          <a:blip r:embed="rId9"/>
+          <a:stretch>
+            <a:fillRect/>
+          </a:stretch>
+        </p:blipFill>
+        <p:spPr>
+          <a:xfrm>
+            <a:off x="584142" y="2927914"/>
+            <a:ext cx="3438221" cy="2750577"/>
+          </a:xfrm>
+          <a:prstGeom prst="rect">
+            <a:avLst/>
+          </a:prstGeom>
+          <a:solidFill>
+            <a:srgbClr val="FFFFFF">
+              <a:shade val="85000"/>
+            </a:srgbClr>
+          </a:solidFill>
+          <a:ln w="88900" cap="sq">
+            <a:solidFill>
+              <a:srgbClr val="FFFFFF"/>
+            </a:solidFill>
+            <a:prstDash val="solid"/>
+            <a:miter lim="800000"/>
+          </a:ln>
+          <a:effectLst>
+            <a:outerShdw blurRad="55000" dist="18000" dir="5400000" algn="tl" rotWithShape="0">
+              <a:srgbClr val="000000">
+                <a:alpha val="40000"/>
+              </a:srgbClr>
+            </a:outerShdw>
+          </a:effectLst>
+          <a:scene3d>
+            <a:camera prst="orthographicFront"/>
+            <a:lightRig rig="twoPt" dir="t">
+              <a:rot lat="0" lon="0" rev="7200000"/>
+            </a:lightRig>
+          </a:scene3d>
+          <a:sp3d>
+            <a:bevelT w="25400" h="19050"/>
+            <a:contourClr>
+              <a:srgbClr val="FFFFFF"/>
+            </a:contourClr>
+          </a:sp3d>
+        </p:spPr>
+      </p:pic>
+      <p:sp>
+        <p:nvSpPr>
+          <p:cNvPr id="14" name="TextBox 13">
+            <a:extLst>
+              <a:ext uri="{FF2B5EF4-FFF2-40B4-BE49-F238E27FC236}">
+                <a16:creationId xmlns:a16="http://schemas.microsoft.com/office/drawing/2014/main" id="{4735AB7A-77EE-AC40-99F7-D73A7A391964}"/>
+              </a:ext>
+            </a:extLst>
+          </p:cNvPr>
+          <p:cNvSpPr txBox="1"/>
+          <p:nvPr/>
+        </p:nvSpPr>
+        <p:spPr>
+          <a:xfrm>
+            <a:off x="1066800" y="2404472"/>
+            <a:ext cx="2307042" cy="523220"/>
+          </a:xfrm>
+          <a:prstGeom prst="rect">
+            <a:avLst/>
+          </a:prstGeom>
+          <a:noFill/>
+        </p:spPr>
+        <p:txBody>
+          <a:bodyPr wrap="none" rtlCol="0">
+            <a:spAutoFit/>
+          </a:bodyPr>
+          <a:lstStyle/>
+          <a:p>
+            <a:r>
+              <a:rPr lang="en-IL" sz="2800" b="1" dirty="0">
+                <a:latin typeface="Calibri" panose="020F0502020204030204" pitchFamily="34" charset="0"/>
+                <a:cs typeface="Calibri" panose="020F0502020204030204" pitchFamily="34" charset="0"/>
+              </a:rPr>
+              <a:t>Original Video</a:t>
+            </a:r>
+          </a:p>
+        </p:txBody>
+      </p:sp>
+      <p:sp>
+        <p:nvSpPr>
+          <p:cNvPr id="15" name="TextBox 14">
+            <a:extLst>
+              <a:ext uri="{FF2B5EF4-FFF2-40B4-BE49-F238E27FC236}">
+                <a16:creationId xmlns:a16="http://schemas.microsoft.com/office/drawing/2014/main" id="{DB502150-084D-5EFE-BCF6-2CCDE9022550}"/>
+              </a:ext>
+            </a:extLst>
+          </p:cNvPr>
+          <p:cNvSpPr txBox="1"/>
+          <p:nvPr/>
+        </p:nvSpPr>
+        <p:spPr>
+          <a:xfrm>
+            <a:off x="5002751" y="2404472"/>
+            <a:ext cx="2268250" cy="523220"/>
+          </a:xfrm>
+          <a:prstGeom prst="rect">
+            <a:avLst/>
+          </a:prstGeom>
+          <a:noFill/>
+        </p:spPr>
+        <p:txBody>
+          <a:bodyPr wrap="none" rtlCol="0">
+            <a:spAutoFit/>
+          </a:bodyPr>
+          <a:lstStyle/>
+          <a:p>
+            <a:r>
+              <a:rPr lang="en-IL" sz="2800" b="1" dirty="0">
+                <a:latin typeface="Calibri" panose="020F0502020204030204" pitchFamily="34" charset="0"/>
+                <a:cs typeface="Calibri" panose="020F0502020204030204" pitchFamily="34" charset="0"/>
+              </a:rPr>
+              <a:t>Ground Truth</a:t>
+            </a:r>
+          </a:p>
+        </p:txBody>
+      </p:sp>
+      <p:sp>
+        <p:nvSpPr>
+          <p:cNvPr id="16" name="TextBox 15">
+            <a:extLst>
+              <a:ext uri="{FF2B5EF4-FFF2-40B4-BE49-F238E27FC236}">
+                <a16:creationId xmlns:a16="http://schemas.microsoft.com/office/drawing/2014/main" id="{19985994-4AFB-0DC5-C64B-B27331BB8D3D}"/>
+              </a:ext>
+            </a:extLst>
+          </p:cNvPr>
+          <p:cNvSpPr txBox="1"/>
+          <p:nvPr/>
+        </p:nvSpPr>
+        <p:spPr>
+          <a:xfrm>
+            <a:off x="8381261" y="2404472"/>
+            <a:ext cx="3015249" cy="523220"/>
+          </a:xfrm>
+          <a:prstGeom prst="rect">
+            <a:avLst/>
+          </a:prstGeom>
+          <a:noFill/>
+        </p:spPr>
+        <p:txBody>
+          <a:bodyPr wrap="none" rtlCol="0">
+            <a:spAutoFit/>
+          </a:bodyPr>
+          <a:lstStyle/>
+          <a:p>
+            <a:r>
+              <a:rPr lang="en-IL" sz="2800" b="1" dirty="0">
+                <a:latin typeface="Calibri" panose="020F0502020204030204" pitchFamily="34" charset="0"/>
+                <a:cs typeface="Calibri" panose="020F0502020204030204" pitchFamily="34" charset="0"/>
+              </a:rPr>
+              <a:t>Algorithm Masking</a:t>
+            </a:r>
+          </a:p>
+        </p:txBody>
+      </p:sp>
+    </p:spTree>
+    <p:extLst>
+      <p:ext uri="{BB962C8B-B14F-4D97-AF65-F5344CB8AC3E}">
+        <p14:creationId xmlns:p14="http://schemas.microsoft.com/office/powerpoint/2010/main" val="1314981952"/>
+      </p:ext>
+    </p:extLst>
+  </p:cSld>
+  <p:clrMapOvr>
+    <a:masterClrMapping/>
+  </p:clrMapOvr>
+  <p:timing>
+    <p:tnLst>
+      <p:par>
+        <p:cTn id="1" dur="indefinite" restart="never" nodeType="tmRoot">
+          <p:childTnLst>
+            <p:seq concurrent="1" nextAc="seek">
+              <p:cTn id="2" dur="indefinite" nodeType="mainSeq">
+                <p:childTnLst>
+                  <p:par>
+                    <p:cTn id="3" fill="hold">
+                      <p:stCondLst>
+                        <p:cond delay="indefinite"/>
+                        <p:cond evt="onBegin" delay="0">
+                          <p:tn val="2"/>
+                        </p:cond>
+                      </p:stCondLst>
+                      <p:childTnLst>
+                        <p:par>
+                          <p:cTn id="4" fill="hold">
+                            <p:stCondLst>
+                              <p:cond delay="0"/>
+                            </p:stCondLst>
+                            <p:childTnLst>
+                              <p:par>
+                                <p:cTn id="5" presetID="1" presetClass="mediacall" presetSubtype="0" fill="hold" nodeType="withEffect">
+                                  <p:stCondLst>
+                                    <p:cond delay="0"/>
+                                  </p:stCondLst>
+                                  <p:childTnLst>
+                                    <p:cmd type="call" cmd="playFrom(0.0)">
+                                      <p:cBhvr>
+                                        <p:cTn id="6" dur="2000" fill="hold"/>
+                                        <p:tgtEl>
+                                          <p:spTgt spid="13"/>
+                                        </p:tgtEl>
+                                      </p:cBhvr>
+                                    </p:cmd>
+                                  </p:childTnLst>
+                                </p:cTn>
+                              </p:par>
+                              <p:par>
+                                <p:cTn id="7" presetID="1" presetClass="mediacall" presetSubtype="0" fill="hold" nodeType="withEffect">
+                                  <p:stCondLst>
+                                    <p:cond delay="0"/>
+                                  </p:stCondLst>
+                                  <p:childTnLst>
+                                    <p:cmd type="call" cmd="playFrom(0.0)">
+                                      <p:cBhvr>
+                                        <p:cTn id="8" dur="2000" fill="hold"/>
+                                        <p:tgtEl>
+                                          <p:spTgt spid="9"/>
+                                        </p:tgtEl>
+                                      </p:cBhvr>
+                                    </p:cmd>
+                                  </p:childTnLst>
+                                </p:cTn>
+                              </p:par>
+                              <p:par>
+                                <p:cTn id="9" presetID="1" presetClass="mediacall" presetSubtype="0" fill="hold" nodeType="withEffect">
+                                  <p:stCondLst>
+                                    <p:cond delay="0"/>
+                                  </p:stCondLst>
+                                  <p:childTnLst>
+                                    <p:cmd type="call" cmd="playFrom(0.0)">
+                                      <p:cBhvr>
+                                        <p:cTn id="10" dur="2000" fill="hold"/>
+                                        <p:tgtEl>
+                                          <p:spTgt spid="10"/>
+                                        </p:tgtEl>
+                                      </p:cBhvr>
+                                    </p:cmd>
+                                  </p:childTnLst>
+                                </p:cTn>
+                              </p:par>
+                            </p:childTnLst>
+                          </p:cTn>
+                        </p:par>
+                      </p:childTnLst>
+                    </p:cTn>
+                  </p:par>
+                </p:childTnLst>
+              </p:cTn>
+              <p:prevCondLst>
+                <p:cond evt="onPrev" delay="0">
+                  <p:tgtEl>
+                    <p:sldTgt/>
+                  </p:tgtEl>
+                </p:cond>
+              </p:prevCondLst>
+              <p:nextCondLst>
+                <p:cond evt="onNext" delay="0">
+                  <p:tgtEl>
+                    <p:sldTgt/>
+                  </p:tgtEl>
+                </p:cond>
+              </p:nextCondLst>
+            </p:seq>
+            <p:video>
+              <p:cMediaNode vol="80000">
+                <p:cTn id="11" repeatCount="indefinite" fill="hold" display="0">
+                  <p:stCondLst>
+                    <p:cond delay="indefinite"/>
+                  </p:stCondLst>
+                </p:cTn>
+                <p:tgtEl>
+                  <p:spTgt spid="9"/>
+                </p:tgtEl>
+              </p:cMediaNode>
+            </p:video>
+            <p:seq concurrent="1" nextAc="seek">
+              <p:cTn id="12" restart="whenNotActive" fill="hold" evtFilter="cancelBubble" nodeType="interactiveSeq">
+                <p:stCondLst>
+                  <p:cond evt="onClick" delay="0">
+                    <p:tgtEl>
+                      <p:spTgt spid="9"/>
+                    </p:tgtEl>
+                  </p:cond>
+                </p:stCondLst>
+                <p:endSync evt="end" delay="0">
+                  <p:rtn val="all"/>
+                </p:endSync>
+                <p:childTnLst>
+                  <p:par>
+                    <p:cTn id="13" fill="hold">
+                      <p:stCondLst>
+                        <p:cond delay="0"/>
+                      </p:stCondLst>
+                      <p:childTnLst>
+                        <p:par>
+                          <p:cTn id="14" fill="hold">
+                            <p:stCondLst>
+                              <p:cond delay="0"/>
+                            </p:stCondLst>
+                            <p:childTnLst>
+                              <p:par>
+                                <p:cTn id="15" presetID="2" presetClass="mediacall" presetSubtype="0" fill="hold" nodeType="clickEffect">
+                                  <p:stCondLst>
+                                    <p:cond delay="0"/>
+                                  </p:stCondLst>
+                                  <p:childTnLst>
+                                    <p:cmd type="call" cmd="togglePause">
+                                      <p:cBhvr>
+                                        <p:cTn id="16" dur="1" fill="hold"/>
+                                        <p:tgtEl>
+                                          <p:spTgt spid="9"/>
+                                        </p:tgtEl>
+                                      </p:cBhvr>
+                                    </p:cmd>
+                                  </p:childTnLst>
+                                </p:cTn>
+                              </p:par>
+                            </p:childTnLst>
+                          </p:cTn>
+                        </p:par>
+                      </p:childTnLst>
+                    </p:cTn>
+                  </p:par>
+                </p:childTnLst>
+              </p:cTn>
+              <p:nextCondLst>
+                <p:cond evt="onClick" delay="0">
+                  <p:tgtEl>
+                    <p:spTgt spid="9"/>
+                  </p:tgtEl>
+                </p:cond>
+              </p:nextCondLst>
+            </p:seq>
+            <p:video>
+              <p:cMediaNode vol="80000">
+                <p:cTn id="17" repeatCount="indefinite" fill="hold" display="0">
+                  <p:stCondLst>
+                    <p:cond delay="indefinite"/>
+                  </p:stCondLst>
+                </p:cTn>
+                <p:tgtEl>
+                  <p:spTgt spid="13"/>
+                </p:tgtEl>
+              </p:cMediaNode>
+            </p:video>
+            <p:seq concurrent="1" nextAc="seek">
+              <p:cTn id="18" restart="whenNotActive" fill="hold" evtFilter="cancelBubble" nodeType="interactiveSeq">
+                <p:stCondLst>
+                  <p:cond evt="onClick" delay="0">
+                    <p:tgtEl>
+                      <p:spTgt spid="13"/>
+                    </p:tgtEl>
+                  </p:cond>
+                </p:stCondLst>
+                <p:endSync evt="end" delay="0">
+                  <p:rtn val="all"/>
+                </p:endSync>
+                <p:childTnLst>
+                  <p:par>
+                    <p:cTn id="19" fill="hold">
+                      <p:stCondLst>
+                        <p:cond delay="0"/>
+                      </p:stCondLst>
+                      <p:childTnLst>
+                        <p:par>
+                          <p:cTn id="20" fill="hold">
+                            <p:stCondLst>
+                              <p:cond delay="0"/>
+                            </p:stCondLst>
+                            <p:childTnLst>
+                              <p:par>
+                                <p:cTn id="21" presetID="2" presetClass="mediacall" presetSubtype="0" fill="hold" nodeType="clickEffect">
+                                  <p:stCondLst>
+                                    <p:cond delay="0"/>
+                                  </p:stCondLst>
+                                  <p:childTnLst>
+                                    <p:cmd type="call" cmd="togglePause">
+                                      <p:cBhvr>
+                                        <p:cTn id="22" dur="1" fill="hold"/>
+                                        <p:tgtEl>
+                                          <p:spTgt spid="13"/>
+                                        </p:tgtEl>
+                                      </p:cBhvr>
+                                    </p:cmd>
+                                  </p:childTnLst>
+                                </p:cTn>
+                              </p:par>
+                            </p:childTnLst>
+                          </p:cTn>
+                        </p:par>
+                      </p:childTnLst>
+                    </p:cTn>
+                  </p:par>
+                </p:childTnLst>
+              </p:cTn>
+              <p:nextCondLst>
+                <p:cond evt="onClick" delay="0">
+                  <p:tgtEl>
+                    <p:spTgt spid="13"/>
+                  </p:tgtEl>
+                </p:cond>
+              </p:nextCondLst>
+            </p:seq>
+            <p:video>
+              <p:cMediaNode vol="80000">
+                <p:cTn id="23" repeatCount="indefinite" fill="hold" display="0">
+                  <p:stCondLst>
+                    <p:cond delay="indefinite"/>
+                  </p:stCondLst>
+                </p:cTn>
+                <p:tgtEl>
+                  <p:spTgt spid="10"/>
+                </p:tgtEl>
+              </p:cMediaNode>
+            </p:video>
+            <p:seq concurrent="1" nextAc="seek">
+              <p:cTn id="24" restart="whenNotActive" fill="hold" evtFilter="cancelBubble" nodeType="interactiveSeq">
+                <p:stCondLst>
+                  <p:cond evt="onClick" delay="0">
+                    <p:tgtEl>
+                      <p:spTgt spid="10"/>
+                    </p:tgtEl>
+                  </p:cond>
+                </p:stCondLst>
+                <p:endSync evt="end" delay="0">
+                  <p:rtn val="all"/>
+                </p:endSync>
+                <p:childTnLst>
+                  <p:par>
+                    <p:cTn id="25" fill="hold">
+                      <p:stCondLst>
+                        <p:cond delay="0"/>
+                      </p:stCondLst>
+                      <p:childTnLst>
+                        <p:par>
+                          <p:cTn id="26" fill="hold">
+                            <p:stCondLst>
+                              <p:cond delay="0"/>
+                            </p:stCondLst>
+                            <p:childTnLst>
+                              <p:par>
+                                <p:cTn id="27" presetID="2" presetClass="mediacall" presetSubtype="0" fill="hold" nodeType="clickEffect">
+                                  <p:stCondLst>
+                                    <p:cond delay="0"/>
+                                  </p:stCondLst>
+                                  <p:childTnLst>
+                                    <p:cmd type="call" cmd="togglePause">
+                                      <p:cBhvr>
+                                        <p:cTn id="28" dur="1" fill="hold"/>
+                                        <p:tgtEl>
+                                          <p:spTgt spid="10"/>
+                                        </p:tgtEl>
+                                      </p:cBhvr>
+                                    </p:cmd>
+                                  </p:childTnLst>
+                                </p:cTn>
+                              </p:par>
+                            </p:childTnLst>
+                          </p:cTn>
+                        </p:par>
+                      </p:childTnLst>
+                    </p:cTn>
+                  </p:par>
+                </p:childTnLst>
+              </p:cTn>
+              <p:nextCondLst>
+                <p:cond evt="onClick" delay="0">
+                  <p:tgtEl>
+                    <p:spTgt spid="10"/>
+                  </p:tgtEl>
+                </p:cond>
+              </p:nextCondLst>
+            </p:seq>
+          </p:childTnLst>
+        </p:cTn>
+      </p:par>
+    </p:tnLst>
+  </p:timing>
+</p:sld>
+</file>
+
+<file path=ppt/slides/slide12.xml><?xml version="1.0" encoding="utf-8"?>
+<p:sld xmlns:a="http://schemas.openxmlformats.org/drawingml/2006/main" xmlns:r="http://schemas.openxmlformats.org/officeDocument/2006/relationships" xmlns:p="http://schemas.openxmlformats.org/presentationml/2006/main" show="0">
+  <p:cSld>
+    <p:spTree>
+      <p:nvGrpSpPr>
+        <p:cNvPr id="1" name=""/>
+        <p:cNvGrpSpPr/>
+        <p:nvPr/>
+      </p:nvGrpSpPr>
+      <p:grpSpPr>
+        <a:xfrm>
+          <a:off x="0" y="0"/>
+          <a:ext cx="0" cy="0"/>
+          <a:chOff x="0" y="0"/>
+          <a:chExt cx="0" cy="0"/>
+        </a:xfrm>
+      </p:grpSpPr>
+      <p:sp>
+        <p:nvSpPr>
+          <p:cNvPr id="2" name="Title 1">
+            <a:extLst>
+              <a:ext uri="{FF2B5EF4-FFF2-40B4-BE49-F238E27FC236}">
+                <a16:creationId xmlns:a16="http://schemas.microsoft.com/office/drawing/2014/main" id="{FBB17739-EDA8-0BBF-2BBE-DD328C51C51D}"/>
+              </a:ext>
+            </a:extLst>
+          </p:cNvPr>
+          <p:cNvSpPr>
+            <a:spLocks noGrp="1"/>
+          </p:cNvSpPr>
+          <p:nvPr>
+            <p:ph type="title"/>
+          </p:nvPr>
+        </p:nvSpPr>
+        <p:spPr/>
+        <p:txBody>
+          <a:bodyPr/>
+          <a:lstStyle/>
+          <a:p>
+            <a:r>
+              <a:rPr lang="en-US" dirty="0"/>
               <a:t>Future work</a:t>
             </a:r>
             <a:endParaRPr lang="en-IL" dirty="0"/>
@@ -13138,7 +16524,7 @@
 </p:sld>
 </file>
 
-<file path=ppt/slides/slide11.xml><?xml version="1.0" encoding="utf-8"?>
+<file path=ppt/slides/slide13.xml><?xml version="1.0" encoding="utf-8"?>
 <p:sld xmlns:a="http://schemas.openxmlformats.org/drawingml/2006/main" xmlns:r="http://schemas.openxmlformats.org/officeDocument/2006/relationships" xmlns:p="http://schemas.openxmlformats.org/presentationml/2006/main">
   <p:cSld>
     <p:bg>
@@ -21020,7 +24406,7 @@
 </file>
 
 <file path=ppt/slides/slide8.xml><?xml version="1.0" encoding="utf-8"?>
-<p:sld xmlns:a="http://schemas.openxmlformats.org/drawingml/2006/main" xmlns:r="http://schemas.openxmlformats.org/officeDocument/2006/relationships" xmlns:p="http://schemas.openxmlformats.org/presentationml/2006/main">
+<p:sld xmlns:a="http://schemas.openxmlformats.org/drawingml/2006/main" xmlns:r="http://schemas.openxmlformats.org/officeDocument/2006/relationships" xmlns:p="http://schemas.openxmlformats.org/presentationml/2006/main" show="0">
   <p:cSld>
     <p:spTree>
       <p:nvGrpSpPr>
@@ -22663,7 +26049,7 @@
           <p:cNvPr id="2" name="Title 1">
             <a:extLst>
               <a:ext uri="{FF2B5EF4-FFF2-40B4-BE49-F238E27FC236}">
-                <a16:creationId xmlns:a16="http://schemas.microsoft.com/office/drawing/2014/main" id="{FBB17739-EDA8-0BBF-2BBE-DD328C51C51D}"/>
+                <a16:creationId xmlns:a16="http://schemas.microsoft.com/office/drawing/2014/main" id="{9E1B47C9-23BE-9F8B-A0E0-E74CAB5ED67A}"/>
               </a:ext>
             </a:extLst>
           </p:cNvPr>
@@ -22681,34 +26067,9 @@
           <a:p>
             <a:r>
               <a:rPr lang="en-US" dirty="0"/>
-              <a:t>Results so far</a:t>
+              <a:t>Implementation (algorithm)</a:t>
             </a:r>
             <a:endParaRPr lang="en-IL" dirty="0"/>
-          </a:p>
-        </p:txBody>
-      </p:sp>
-      <p:sp>
-        <p:nvSpPr>
-          <p:cNvPr id="3" name="Content Placeholder 2">
-            <a:extLst>
-              <a:ext uri="{FF2B5EF4-FFF2-40B4-BE49-F238E27FC236}">
-                <a16:creationId xmlns:a16="http://schemas.microsoft.com/office/drawing/2014/main" id="{2CEC7C2B-FE22-13AA-830E-5D224F921C9D}"/>
-              </a:ext>
-            </a:extLst>
-          </p:cNvPr>
-          <p:cNvSpPr>
-            <a:spLocks noGrp="1"/>
-          </p:cNvSpPr>
-          <p:nvPr>
-            <p:ph idx="1"/>
-          </p:nvPr>
-        </p:nvSpPr>
-        <p:spPr/>
-        <p:txBody>
-          <a:bodyPr/>
-          <a:lstStyle/>
-          <a:p>
-            <a:endParaRPr lang="en-IL"/>
           </a:p>
         </p:txBody>
       </p:sp>
@@ -22717,7 +26078,7 @@
           <p:cNvPr id="4" name="Google Shape;348;p47">
             <a:extLst>
               <a:ext uri="{FF2B5EF4-FFF2-40B4-BE49-F238E27FC236}">
-                <a16:creationId xmlns:a16="http://schemas.microsoft.com/office/drawing/2014/main" id="{DB4B58AA-CB6F-C0F0-4724-E92868B9FD0E}"/>
+                <a16:creationId xmlns:a16="http://schemas.microsoft.com/office/drawing/2014/main" id="{B8D434B1-56CC-6E8D-FDD2-84F2A848D19A}"/>
               </a:ext>
             </a:extLst>
           </p:cNvPr>
@@ -23014,7 +26375,7 @@
           <p:cNvPr id="5" name="Google Shape;16527;p95">
             <a:extLst>
               <a:ext uri="{FF2B5EF4-FFF2-40B4-BE49-F238E27FC236}">
-                <a16:creationId xmlns:a16="http://schemas.microsoft.com/office/drawing/2014/main" id="{4752F03D-3D59-EDD4-1EDF-103EBF40E5C6}"/>
+                <a16:creationId xmlns:a16="http://schemas.microsoft.com/office/drawing/2014/main" id="{220E5C26-EB1D-31C2-6A8B-D662D1D97FC8}"/>
               </a:ext>
             </a:extLst>
           </p:cNvPr>
@@ -23034,7 +26395,7 @@
             <p:cNvPr id="6" name="Google Shape;16528;p95">
               <a:extLst>
                 <a:ext uri="{FF2B5EF4-FFF2-40B4-BE49-F238E27FC236}">
-                  <a16:creationId xmlns:a16="http://schemas.microsoft.com/office/drawing/2014/main" id="{2608EC1E-CF34-1B32-5C9F-E9F6FCBF6CB4}"/>
+                  <a16:creationId xmlns:a16="http://schemas.microsoft.com/office/drawing/2014/main" id="{118BEC51-40EB-32C2-B97B-894607665666}"/>
                 </a:ext>
               </a:extLst>
             </p:cNvPr>
@@ -23131,7 +26492,7 @@
             <p:cNvPr id="7" name="Google Shape;16529;p95">
               <a:extLst>
                 <a:ext uri="{FF2B5EF4-FFF2-40B4-BE49-F238E27FC236}">
-                  <a16:creationId xmlns:a16="http://schemas.microsoft.com/office/drawing/2014/main" id="{A24D5EAA-27CE-050F-F478-1E90FDFE9227}"/>
+                  <a16:creationId xmlns:a16="http://schemas.microsoft.com/office/drawing/2014/main" id="{42D04CD0-2AD6-C614-6F95-3DB36DC7FF5A}"/>
                 </a:ext>
               </a:extLst>
             </p:cNvPr>
@@ -23924,7 +27285,7 @@
             <p:cNvPr id="8" name="Google Shape;16530;p95">
               <a:extLst>
                 <a:ext uri="{FF2B5EF4-FFF2-40B4-BE49-F238E27FC236}">
-                  <a16:creationId xmlns:a16="http://schemas.microsoft.com/office/drawing/2014/main" id="{BD773F22-CE2F-7E1B-8AA9-82D35518965D}"/>
+                  <a16:creationId xmlns:a16="http://schemas.microsoft.com/office/drawing/2014/main" id="{41DB6582-97B6-95D9-6058-4A4471F70016}"/>
                 </a:ext>
               </a:extLst>
             </p:cNvPr>
@@ -24002,10 +27363,91 @@
           </p:txBody>
         </p:sp>
       </p:grpSp>
+      <p:sp>
+        <p:nvSpPr>
+          <p:cNvPr id="10" name="Rectangle 9">
+            <a:extLst>
+              <a:ext uri="{FF2B5EF4-FFF2-40B4-BE49-F238E27FC236}">
+                <a16:creationId xmlns:a16="http://schemas.microsoft.com/office/drawing/2014/main" id="{B6078964-1BD5-2C9D-0E9B-F83F080A0A4E}"/>
+              </a:ext>
+            </a:extLst>
+          </p:cNvPr>
+          <p:cNvSpPr/>
+          <p:nvPr/>
+        </p:nvSpPr>
+        <p:spPr>
+          <a:xfrm>
+            <a:off x="783771" y="2002971"/>
+            <a:ext cx="10570029" cy="4306389"/>
+          </a:xfrm>
+          <a:prstGeom prst="rect">
+            <a:avLst/>
+          </a:prstGeom>
+          <a:noFill/>
+        </p:spPr>
+        <p:style>
+          <a:lnRef idx="2">
+            <a:schemeClr val="dk1"/>
+          </a:lnRef>
+          <a:fillRef idx="1">
+            <a:schemeClr val="lt1"/>
+          </a:fillRef>
+          <a:effectRef idx="0">
+            <a:schemeClr val="dk1"/>
+          </a:effectRef>
+          <a:fontRef idx="minor">
+            <a:schemeClr val="dk1"/>
+          </a:fontRef>
+        </p:style>
+        <p:txBody>
+          <a:bodyPr rtlCol="0" anchor="ctr"/>
+          <a:lstStyle/>
+          <a:p>
+            <a:pPr algn="ctr"/>
+            <a:endParaRPr lang="en-IL"/>
+          </a:p>
+        </p:txBody>
+      </p:sp>
+      <p:pic>
+        <p:nvPicPr>
+          <p:cNvPr id="19" name="Picture 18" descr="A diagram of a mask and a mask&#10;&#10;Description automatically generated">
+            <a:extLst>
+              <a:ext uri="{FF2B5EF4-FFF2-40B4-BE49-F238E27FC236}">
+                <a16:creationId xmlns:a16="http://schemas.microsoft.com/office/drawing/2014/main" id="{A6114408-8D15-28C3-6309-4B553FE96CB2}"/>
+              </a:ext>
+            </a:extLst>
+          </p:cNvPr>
+          <p:cNvPicPr>
+            <a:picLocks noChangeAspect="1"/>
+          </p:cNvPicPr>
+          <p:nvPr/>
+        </p:nvPicPr>
+        <p:blipFill>
+          <a:blip r:embed="rId2">
+            <a:extLst>
+              <a:ext uri="{28A0092B-C50C-407E-A947-70E740481C1C}">
+                <a14:useLocalDpi xmlns:a14="http://schemas.microsoft.com/office/drawing/2010/main" val="0"/>
+              </a:ext>
+            </a:extLst>
+          </a:blip>
+          <a:stretch>
+            <a:fillRect/>
+          </a:stretch>
+        </p:blipFill>
+        <p:spPr>
+          <a:xfrm>
+            <a:off x="1116766" y="2168351"/>
+            <a:ext cx="10008434" cy="3961183"/>
+          </a:xfrm>
+          <a:prstGeom prst="rect">
+            <a:avLst/>
+          </a:prstGeom>
+        </p:spPr>
+      </p:pic>
     </p:spTree>
     <p:extLst>
       <p:ext uri="{BB962C8B-B14F-4D97-AF65-F5344CB8AC3E}">
-        <p14:creationId xmlns:p14="http://schemas.microsoft.com/office/powerpoint/2010/main" val="3884930515"/>
+        <p14:creationId xmlns:p14="http://schemas.microsoft.com/office/powerpoint/2010/main" val="2633577502"/>
       </p:ext>
     </p:extLst>
   </p:cSld>

</xml_diff>

<commit_message>
presentation with publish date and journal
</commit_message>
<xml_diff>
--- a/updated_presentation.pptx
+++ b/updated_presentation.pptx
@@ -2550,16 +2550,24 @@
   <pc:docChgLst>
     <pc:chgData name="Neta Becker" userId="cef0aa30-4247-4db8-9bc0-d63efc0d3a53" providerId="ADAL" clId="{8E39725F-6EEF-4D4D-92C3-0465B79E9629}"/>
     <pc:docChg chg="undo custSel addSld delSld modSld modMainMaster">
-      <pc:chgData name="Neta Becker" userId="cef0aa30-4247-4db8-9bc0-d63efc0d3a53" providerId="ADAL" clId="{8E39725F-6EEF-4D4D-92C3-0465B79E9629}" dt="2024-05-19T19:28:36.309" v="1879" actId="20577"/>
+      <pc:chgData name="Neta Becker" userId="cef0aa30-4247-4db8-9bc0-d63efc0d3a53" providerId="ADAL" clId="{8E39725F-6EEF-4D4D-92C3-0465B79E9629}" dt="2024-05-23T19:40:20.901" v="2008" actId="20577"/>
       <pc:docMkLst>
         <pc:docMk/>
       </pc:docMkLst>
-      <pc:sldChg chg="addSp delSp setBg delDesignElem">
-        <pc:chgData name="Neta Becker" userId="cef0aa30-4247-4db8-9bc0-d63efc0d3a53" providerId="ADAL" clId="{8E39725F-6EEF-4D4D-92C3-0465B79E9629}" dt="2024-05-18T10:29:19.955" v="31"/>
+      <pc:sldChg chg="addSp delSp modSp mod setBg delDesignElem">
+        <pc:chgData name="Neta Becker" userId="cef0aa30-4247-4db8-9bc0-d63efc0d3a53" providerId="ADAL" clId="{8E39725F-6EEF-4D4D-92C3-0465B79E9629}" dt="2024-05-23T19:39:47.943" v="2006" actId="404"/>
         <pc:sldMkLst>
           <pc:docMk/>
           <pc:sldMk cId="2179648205" sldId="256"/>
         </pc:sldMkLst>
+        <pc:spChg chg="mod">
+          <ac:chgData name="Neta Becker" userId="cef0aa30-4247-4db8-9bc0-d63efc0d3a53" providerId="ADAL" clId="{8E39725F-6EEF-4D4D-92C3-0465B79E9629}" dt="2024-05-23T19:39:47.943" v="2006" actId="404"/>
+          <ac:spMkLst>
+            <pc:docMk/>
+            <pc:sldMk cId="2179648205" sldId="256"/>
+            <ac:spMk id="2" creationId="{672AD88C-22F7-6099-31A3-259788130B42}"/>
+          </ac:spMkLst>
+        </pc:spChg>
         <pc:spChg chg="add del">
           <ac:chgData name="Neta Becker" userId="cef0aa30-4247-4db8-9bc0-d63efc0d3a53" providerId="ADAL" clId="{8E39725F-6EEF-4D4D-92C3-0465B79E9629}" dt="2024-05-18T08:20:44.648" v="28"/>
           <ac:spMkLst>
@@ -2679,8 +2687,8 @@
           </ac:spMkLst>
         </pc:spChg>
       </pc:sldChg>
-      <pc:sldChg chg="addSp modSp mod setBg">
-        <pc:chgData name="Neta Becker" userId="cef0aa30-4247-4db8-9bc0-d63efc0d3a53" providerId="ADAL" clId="{8E39725F-6EEF-4D4D-92C3-0465B79E9629}" dt="2024-05-18T11:27:56.147" v="596" actId="167"/>
+      <pc:sldChg chg="addSp modSp mod setBg modNotesTx">
+        <pc:chgData name="Neta Becker" userId="cef0aa30-4247-4db8-9bc0-d63efc0d3a53" providerId="ADAL" clId="{8E39725F-6EEF-4D4D-92C3-0465B79E9629}" dt="2024-05-23T19:40:20.901" v="2008" actId="20577"/>
         <pc:sldMkLst>
           <pc:docMk/>
           <pc:sldMk cId="461867753" sldId="261"/>
@@ -3374,8 +3382,8 @@
           </ac:spMkLst>
         </pc:spChg>
       </pc:sldChg>
-      <pc:sldChg chg="addSp delSp modSp add mod setBg">
-        <pc:chgData name="Neta Becker" userId="cef0aa30-4247-4db8-9bc0-d63efc0d3a53" providerId="ADAL" clId="{8E39725F-6EEF-4D4D-92C3-0465B79E9629}" dt="2024-05-18T11:30:50.971" v="734"/>
+      <pc:sldChg chg="addSp delSp modSp add mod setBg modNotesTx">
+        <pc:chgData name="Neta Becker" userId="cef0aa30-4247-4db8-9bc0-d63efc0d3a53" providerId="ADAL" clId="{8E39725F-6EEF-4D4D-92C3-0465B79E9629}" dt="2024-05-23T19:40:16.516" v="2007" actId="20577"/>
         <pc:sldMkLst>
           <pc:docMk/>
           <pc:sldMk cId="473798661" sldId="313"/>
@@ -9318,7 +9326,7 @@
           <a:p>
             <a:fld id="{00F3AC2B-0516-4C3C-9B21-3C09651EECE3}" type="datetimeFigureOut">
               <a:rPr lang="en-IL" smtClean="0"/>
-              <a:t>19/05/2024</a:t>
+              <a:t>23/05/2024</a:t>
             </a:fld>
             <a:endParaRPr lang="en-IL"/>
           </a:p>
@@ -10151,96 +10159,6 @@
           <a:lstStyle/>
           <a:p>
             <a:pPr algn="r" rtl="1"/>
-            <a:r>
-              <a:rPr lang="he-IL" dirty="0"/>
-              <a:t>רצו לבדוק: </a:t>
-            </a:r>
-          </a:p>
-          <a:p>
-            <a:pPr marL="228600" indent="-228600" algn="r" rtl="1">
-              <a:buAutoNum type="arabicPeriod"/>
-            </a:pPr>
-            <a:r>
-              <a:rPr lang="he-IL" dirty="0"/>
-              <a:t>השפעת מספר הגזירה על התוצאות</a:t>
-            </a:r>
-          </a:p>
-          <a:p>
-            <a:pPr marL="228600" indent="-228600" algn="r" rtl="1">
-              <a:buAutoNum type="arabicPeriod"/>
-            </a:pPr>
-            <a:r>
-              <a:rPr lang="he-IL" dirty="0" err="1"/>
-              <a:t>רובאסטיות</a:t>
-            </a:r>
-            <a:r>
-              <a:rPr lang="he-IL" dirty="0"/>
-              <a:t> ביחס </a:t>
-            </a:r>
-            <a:r>
-              <a:rPr lang="he-IL" dirty="0" err="1"/>
-              <a:t>לנורמל</a:t>
-            </a:r>
-            <a:r>
-              <a:rPr lang="he-IL" dirty="0"/>
-              <a:t> </a:t>
-            </a:r>
-            <a:r>
-              <a:rPr lang="en-US" dirty="0"/>
-              <a:t>L1</a:t>
-            </a:r>
-            <a:r>
-              <a:rPr lang="he-IL" dirty="0"/>
-              <a:t> לעומת </a:t>
-            </a:r>
-            <a:r>
-              <a:rPr lang="en-US" dirty="0"/>
-              <a:t>L2</a:t>
-            </a:r>
-            <a:r>
-              <a:rPr lang="he-IL" dirty="0"/>
-              <a:t>.</a:t>
-            </a:r>
-          </a:p>
-          <a:p>
-            <a:pPr marL="228600" indent="-228600" algn="r" rtl="1">
-              <a:buAutoNum type="arabicPeriod"/>
-            </a:pPr>
-            <a:r>
-              <a:rPr lang="he-IL" dirty="0"/>
-              <a:t>השפעת אלפא (</a:t>
-            </a:r>
-            <a:r>
-              <a:rPr lang="en-US" dirty="0"/>
-              <a:t>over relaxation parameter</a:t>
-            </a:r>
-            <a:r>
-              <a:rPr lang="he-IL" dirty="0"/>
-              <a:t>)</a:t>
-            </a:r>
-          </a:p>
-          <a:p>
-            <a:pPr algn="r" rtl="1"/>
-            <a:endParaRPr lang="en-US" dirty="0"/>
-          </a:p>
-          <a:p>
-            <a:pPr algn="r" rtl="1"/>
-            <a:endParaRPr lang="en-US" dirty="0"/>
-          </a:p>
-          <a:p>
-            <a:pPr algn="r" rtl="1"/>
-            <a:r>
-              <a:rPr lang="en-US" dirty="0"/>
-              <a:t>1st-order methods are more </a:t>
-            </a:r>
-            <a:r>
-              <a:rPr lang="en-US" dirty="0" err="1"/>
-              <a:t>dependant</a:t>
-            </a:r>
-            <a:r>
-              <a:rPr lang="en-US" dirty="0"/>
-              <a:t> on initial alignments between images so are more suitable when an affine linear pre-registration is avail- able, which is not the case for higher-order methods.</a:t>
-            </a:r>
             <a:endParaRPr lang="en-IL" dirty="0"/>
           </a:p>
         </p:txBody>
@@ -10324,29 +10242,6 @@
         <p:txBody>
           <a:bodyPr/>
           <a:lstStyle/>
-          <a:p>
-            <a:pPr marL="0" marR="0" lvl="0" indent="0" algn="l" defTabSz="914400" rtl="0" eaLnBrk="1" fontAlgn="auto" latinLnBrk="0" hangingPunct="1">
-              <a:lnSpc>
-                <a:spcPct val="100000"/>
-              </a:lnSpc>
-              <a:spcBef>
-                <a:spcPts val="0"/>
-              </a:spcBef>
-              <a:spcAft>
-                <a:spcPts val="0"/>
-              </a:spcAft>
-              <a:buClrTx/>
-              <a:buSzTx/>
-              <a:buFontTx/>
-              <a:buNone/>
-              <a:tabLst/>
-              <a:defRPr/>
-            </a:pPr>
-            <a:r>
-              <a:rPr lang="en-US" sz="1200" dirty="0"/>
-              <a:t>We are planning to perform object tracking by using the algorithm presented in the paper to predict the changes in the object’s form between frames.</a:t>
-            </a:r>
-          </a:p>
           <a:p>
             <a:endParaRPr lang="en-IL" dirty="0"/>
           </a:p>
@@ -11029,7 +10924,7 @@
           <a:p>
             <a:fld id="{7E48F360-3E34-44F2-B2D1-F60E60B25061}" type="datetimeFigureOut">
               <a:rPr lang="en-US" smtClean="0"/>
-              <a:t>5/19/2024</a:t>
+              <a:t>5/23/2024</a:t>
             </a:fld>
             <a:endParaRPr lang="en-US"/>
           </a:p>
@@ -11231,7 +11126,7 @@
           <a:p>
             <a:fld id="{7E48F360-3E34-44F2-B2D1-F60E60B25061}" type="datetimeFigureOut">
               <a:rPr lang="en-US" smtClean="0"/>
-              <a:t>5/19/2024</a:t>
+              <a:t>5/23/2024</a:t>
             </a:fld>
             <a:endParaRPr lang="en-US"/>
           </a:p>
@@ -11411,7 +11306,7 @@
           <a:p>
             <a:fld id="{7E48F360-3E34-44F2-B2D1-F60E60B25061}" type="datetimeFigureOut">
               <a:rPr lang="en-US" smtClean="0"/>
-              <a:t>5/19/2024</a:t>
+              <a:t>5/23/2024</a:t>
             </a:fld>
             <a:endParaRPr lang="en-US"/>
           </a:p>
@@ -13732,7 +13627,7 @@
           <a:p>
             <a:fld id="{7E48F360-3E34-44F2-B2D1-F60E60B25061}" type="datetimeFigureOut">
               <a:rPr lang="en-US" smtClean="0"/>
-              <a:t>5/19/2024</a:t>
+              <a:t>5/23/2024</a:t>
             </a:fld>
             <a:endParaRPr lang="en-US"/>
           </a:p>
@@ -14312,7 +14207,7 @@
           <a:p>
             <a:fld id="{7E48F360-3E34-44F2-B2D1-F60E60B25061}" type="datetimeFigureOut">
               <a:rPr lang="en-US" smtClean="0"/>
-              <a:t>5/19/2024</a:t>
+              <a:t>5/23/2024</a:t>
             </a:fld>
             <a:endParaRPr lang="en-US"/>
           </a:p>
@@ -14614,7 +14509,7 @@
           <a:p>
             <a:fld id="{7E48F360-3E34-44F2-B2D1-F60E60B25061}" type="datetimeFigureOut">
               <a:rPr lang="en-US" smtClean="0"/>
-              <a:t>5/19/2024</a:t>
+              <a:t>5/23/2024</a:t>
             </a:fld>
             <a:endParaRPr lang="en-US"/>
           </a:p>
@@ -15051,7 +14946,7 @@
           <a:p>
             <a:fld id="{7E48F360-3E34-44F2-B2D1-F60E60B25061}" type="datetimeFigureOut">
               <a:rPr lang="en-US" smtClean="0"/>
-              <a:t>5/19/2024</a:t>
+              <a:t>5/23/2024</a:t>
             </a:fld>
             <a:endParaRPr lang="en-US"/>
           </a:p>
@@ -15169,7 +15064,7 @@
           <a:p>
             <a:fld id="{7E48F360-3E34-44F2-B2D1-F60E60B25061}" type="datetimeFigureOut">
               <a:rPr lang="en-US" smtClean="0"/>
-              <a:t>5/19/2024</a:t>
+              <a:t>5/23/2024</a:t>
             </a:fld>
             <a:endParaRPr lang="en-US"/>
           </a:p>
@@ -15264,7 +15159,7 @@
           <a:p>
             <a:fld id="{7E48F360-3E34-44F2-B2D1-F60E60B25061}" type="datetimeFigureOut">
               <a:rPr lang="en-US" smtClean="0"/>
-              <a:t>5/19/2024</a:t>
+              <a:t>5/23/2024</a:t>
             </a:fld>
             <a:endParaRPr lang="en-US"/>
           </a:p>
@@ -15608,7 +15503,7 @@
           <a:p>
             <a:fld id="{7E48F360-3E34-44F2-B2D1-F60E60B25061}" type="datetimeFigureOut">
               <a:rPr lang="en-US" smtClean="0"/>
-              <a:t>5/19/2024</a:t>
+              <a:t>5/23/2024</a:t>
             </a:fld>
             <a:endParaRPr lang="en-US"/>
           </a:p>
@@ -15997,7 +15892,7 @@
           <a:p>
             <a:fld id="{7E48F360-3E34-44F2-B2D1-F60E60B25061}" type="datetimeFigureOut">
               <a:rPr lang="en-US" smtClean="0"/>
-              <a:t>5/19/2024</a:t>
+              <a:t>5/23/2024</a:t>
             </a:fld>
             <a:endParaRPr lang="en-US"/>
           </a:p>
@@ -16305,7 +16200,7 @@
           <a:p>
             <a:fld id="{7E48F360-3E34-44F2-B2D1-F60E60B25061}" type="datetimeFigureOut">
               <a:rPr lang="en-US" smtClean="0"/>
-              <a:t>5/19/2024</a:t>
+              <a:t>5/23/2024</a:t>
             </a:fld>
             <a:endParaRPr lang="en-US"/>
           </a:p>
@@ -17193,59 +17088,78 @@
               </a:rPr>
             </a:br>
             <a:br>
-              <a:rPr lang="en-US" sz="4000" dirty="0">
+              <a:rPr lang="en-US" sz="2000" dirty="0">
                 <a:latin typeface="Calibri" panose="020F0502020204030204" pitchFamily="34" charset="0"/>
                 <a:cs typeface="Calibri" panose="020F0502020204030204" pitchFamily="34" charset="0"/>
               </a:rPr>
             </a:br>
             <a:r>
-              <a:rPr lang="en-US" sz="4000">
+              <a:rPr lang="en-US" sz="3200" dirty="0">
                 <a:latin typeface="Calibri" panose="020F0502020204030204" pitchFamily="34" charset="0"/>
                 <a:cs typeface="Calibri" panose="020F0502020204030204" pitchFamily="34" charset="0"/>
               </a:rPr>
               <a:t>By </a:t>
             </a:r>
             <a:r>
-              <a:rPr lang="en-US" sz="4000" err="1">
+              <a:rPr lang="en-US" sz="3200" dirty="0" err="1">
                 <a:latin typeface="Calibri" panose="020F0502020204030204" pitchFamily="34" charset="0"/>
                 <a:cs typeface="Calibri" panose="020F0502020204030204" pitchFamily="34" charset="0"/>
               </a:rPr>
               <a:t>Jinming</a:t>
             </a:r>
             <a:r>
-              <a:rPr lang="en-US" sz="4000">
+              <a:rPr lang="en-US" sz="3200" dirty="0">
                 <a:latin typeface="Calibri" panose="020F0502020204030204" pitchFamily="34" charset="0"/>
                 <a:cs typeface="Calibri" panose="020F0502020204030204" pitchFamily="34" charset="0"/>
               </a:rPr>
               <a:t> Duan, Xi Jia, Joseph Bartlett, </a:t>
             </a:r>
             <a:r>
-              <a:rPr lang="en-US" sz="4000" err="1">
+              <a:rPr lang="en-US" sz="3200" dirty="0" err="1">
                 <a:latin typeface="Calibri" panose="020F0502020204030204" pitchFamily="34" charset="0"/>
                 <a:cs typeface="Calibri" panose="020F0502020204030204" pitchFamily="34" charset="0"/>
               </a:rPr>
               <a:t>Wenqi</a:t>
             </a:r>
             <a:r>
-              <a:rPr lang="en-US" sz="4000">
+              <a:rPr lang="en-US" sz="3200" dirty="0">
                 <a:latin typeface="Calibri" panose="020F0502020204030204" pitchFamily="34" charset="0"/>
                 <a:cs typeface="Calibri" panose="020F0502020204030204" pitchFamily="34" charset="0"/>
               </a:rPr>
               <a:t> Lu, </a:t>
             </a:r>
             <a:r>
-              <a:rPr lang="en-US" sz="4000" err="1">
+              <a:rPr lang="en-US" sz="3200" dirty="0" err="1">
                 <a:latin typeface="Calibri" panose="020F0502020204030204" pitchFamily="34" charset="0"/>
                 <a:cs typeface="Calibri" panose="020F0502020204030204" pitchFamily="34" charset="0"/>
               </a:rPr>
               <a:t>Zhaowen</a:t>
             </a:r>
             <a:r>
-              <a:rPr lang="en-US" sz="4000">
+              <a:rPr lang="en-US" sz="3200" dirty="0">
                 <a:latin typeface="Calibri" panose="020F0502020204030204" pitchFamily="34" charset="0"/>
                 <a:cs typeface="Calibri" panose="020F0502020204030204" pitchFamily="34" charset="0"/>
               </a:rPr>
               <a:t> Qiu</a:t>
+            </a:r>
+            <a:br>
+              <a:rPr lang="en-US" sz="3200" dirty="0">
+                <a:latin typeface="Calibri" panose="020F0502020204030204" pitchFamily="34" charset="0"/>
+                <a:cs typeface="Calibri" panose="020F0502020204030204" pitchFamily="34" charset="0"/>
+              </a:rPr>
+            </a:br>
+            <a:br>
+              <a:rPr lang="en-US" sz="800" dirty="0">
+                <a:latin typeface="Calibri" panose="020F0502020204030204" pitchFamily="34" charset="0"/>
+                <a:cs typeface="Calibri" panose="020F0502020204030204" pitchFamily="34" charset="0"/>
+              </a:rPr>
+            </a:br>
+            <a:r>
+              <a:rPr lang="en-US" sz="2000" dirty="0">
+                <a:latin typeface="Calibri" panose="020F0502020204030204" pitchFamily="34" charset="0"/>
+                <a:cs typeface="Calibri" panose="020F0502020204030204" pitchFamily="34" charset="0"/>
+              </a:rPr>
+              <a:t>published on Science direct, 2023</a:t>
             </a:r>
             <a:endParaRPr lang="en-US" sz="4000" dirty="0">
               <a:latin typeface="Calibri" panose="020F0502020204030204" pitchFamily="34" charset="0"/>
@@ -17316,7 +17230,7 @@
               <a:t> Lior </a:t>
             </a:r>
             <a:r>
-              <a:rPr lang="en-US" sz="2000">
+              <a:rPr lang="en-US" sz="2000" dirty="0" err="1">
                 <a:latin typeface="Calibri" panose="020F0502020204030204" pitchFamily="34" charset="0"/>
                 <a:cs typeface="Calibri" panose="020F0502020204030204" pitchFamily="34" charset="0"/>
               </a:rPr>

</xml_diff>